<commit_message>
Some uncommitted changes added
</commit_message>
<xml_diff>
--- a/Literature Survery/Presentations/Flood Prediction using NARX and SVM.pptx
+++ b/Literature Survery/Presentations/Flood Prediction using NARX and SVM.pptx
@@ -1,40 +1,40 @@
 
 <file path=ppt/presentation.xml><?xml version="1.0" encoding="utf-8"?>
-<p:presentation xmlns:a="http://schemas.openxmlformats.org/drawingml/2006/main" xmlns:r="http://schemas.openxmlformats.org/officeDocument/2006/relationships" xmlns:mc="http://schemas.openxmlformats.org/markup-compatibility/2006" xmlns:mv="urn:schemas-microsoft-com:mac:vml" xmlns:p="http://schemas.openxmlformats.org/presentationml/2006/main" xmlns:c="http://schemas.openxmlformats.org/drawingml/2006/chart" xmlns:dgm="http://schemas.openxmlformats.org/drawingml/2006/diagram" xmlns:o="urn:schemas-microsoft-com:office:office" xmlns:v="urn:schemas-microsoft-com:vml" xmlns:pvml="urn:schemas-microsoft-com:office:powerpoint" xmlns:com="http://schemas.openxmlformats.org/drawingml/2006/compatibility" xmlns:p14="http://schemas.microsoft.com/office/powerpoint/2010/main" xmlns:p15="http://schemas.microsoft.com/office/powerpoint/2012/main" xmlns:ahyp="http://schemas.microsoft.com/office/drawing/2018/hyperlinkcolor" autoCompressPictures="0" embedTrueTypeFonts="1" strictFirstAndLastChars="0" saveSubsetFonts="1">
+<p:presentation xmlns:a="http://schemas.openxmlformats.org/drawingml/2006/main" xmlns:r="http://schemas.openxmlformats.org/officeDocument/2006/relationships" xmlns:p="http://schemas.openxmlformats.org/presentationml/2006/main" strictFirstAndLastChars="0" embedTrueTypeFonts="1" saveSubsetFonts="1" autoCompressPictures="0">
   <p:sldMasterIdLst>
-    <p:sldMasterId id="2147483659" r:id="rId4"/>
+    <p:sldMasterId id="2147483659" r:id="rId1"/>
   </p:sldMasterIdLst>
   <p:notesMasterIdLst>
-    <p:notesMasterId r:id="rId5"/>
+    <p:notesMasterId r:id="rId10"/>
   </p:notesMasterIdLst>
   <p:sldIdLst>
-    <p:sldId id="256" r:id="rId6"/>
-    <p:sldId id="257" r:id="rId7"/>
-    <p:sldId id="258" r:id="rId8"/>
-    <p:sldId id="259" r:id="rId9"/>
-    <p:sldId id="260" r:id="rId10"/>
-    <p:sldId id="261" r:id="rId11"/>
-    <p:sldId id="262" r:id="rId12"/>
-    <p:sldId id="263" r:id="rId13"/>
+    <p:sldId id="256" r:id="rId2"/>
+    <p:sldId id="257" r:id="rId3"/>
+    <p:sldId id="258" r:id="rId4"/>
+    <p:sldId id="259" r:id="rId5"/>
+    <p:sldId id="260" r:id="rId6"/>
+    <p:sldId id="261" r:id="rId7"/>
+    <p:sldId id="262" r:id="rId8"/>
+    <p:sldId id="263" r:id="rId9"/>
   </p:sldIdLst>
-  <p:sldSz cy="5143500" cx="9144000"/>
+  <p:sldSz cx="9144000" cy="5143500" type="screen16x9"/>
   <p:notesSz cx="6858000" cy="9144000"/>
   <p:embeddedFontLst>
     <p:embeddedFont>
-      <p:font typeface="Roboto Slab"/>
-      <p:regular r:id="rId14"/>
-      <p:bold r:id="rId15"/>
+      <p:font typeface="Roboto Slab" panose="020B0604020202020204" charset="0"/>
+      <p:regular r:id="rId11"/>
+      <p:bold r:id="rId12"/>
     </p:embeddedFont>
     <p:embeddedFont>
-      <p:font typeface="Roboto"/>
-      <p:regular r:id="rId16"/>
-      <p:bold r:id="rId17"/>
-      <p:italic r:id="rId18"/>
-      <p:boldItalic r:id="rId19"/>
+      <p:font typeface="Roboto" panose="020B0604020202020204" charset="0"/>
+      <p:regular r:id="rId13"/>
+      <p:bold r:id="rId14"/>
+      <p:italic r:id="rId15"/>
+      <p:boldItalic r:id="rId16"/>
     </p:embeddedFont>
   </p:embeddedFontLst>
   <p:defaultTextStyle>
-    <a:defPPr lvl="0" marR="0" rtl="0" algn="l">
+    <a:defPPr marR="0" lvl="0" algn="l" rtl="0">
       <a:lnSpc>
         <a:spcPct val="100000"/>
       </a:lnSpc>
@@ -45,7 +45,7 @@
         <a:spcPts val="0"/>
       </a:spcAft>
     </a:defPPr>
-    <a:lvl1pPr lvl="0" marR="0" rtl="0" algn="l">
+    <a:lvl1pPr marR="0" lvl="0" algn="l" rtl="0">
       <a:lnSpc>
         <a:spcPct val="100000"/>
       </a:lnSpc>
@@ -59,7 +59,7 @@
         <a:srgbClr val="000000"/>
       </a:buClr>
       <a:buFont typeface="Arial"/>
-      <a:defRPr b="0" i="0" sz="1400" u="none" cap="none" strike="noStrike">
+      <a:defRPr sz="1400" b="0" i="0" u="none" strike="noStrike" cap="none">
         <a:solidFill>
           <a:srgbClr val="000000"/>
         </a:solidFill>
@@ -69,7 +69,7 @@
         <a:sym typeface="Arial"/>
       </a:defRPr>
     </a:lvl1pPr>
-    <a:lvl2pPr lvl="1" marR="0" rtl="0" algn="l">
+    <a:lvl2pPr marR="0" lvl="1" algn="l" rtl="0">
       <a:lnSpc>
         <a:spcPct val="100000"/>
       </a:lnSpc>
@@ -83,7 +83,7 @@
         <a:srgbClr val="000000"/>
       </a:buClr>
       <a:buFont typeface="Arial"/>
-      <a:defRPr b="0" i="0" sz="1400" u="none" cap="none" strike="noStrike">
+      <a:defRPr sz="1400" b="0" i="0" u="none" strike="noStrike" cap="none">
         <a:solidFill>
           <a:srgbClr val="000000"/>
         </a:solidFill>
@@ -93,7 +93,7 @@
         <a:sym typeface="Arial"/>
       </a:defRPr>
     </a:lvl2pPr>
-    <a:lvl3pPr lvl="2" marR="0" rtl="0" algn="l">
+    <a:lvl3pPr marR="0" lvl="2" algn="l" rtl="0">
       <a:lnSpc>
         <a:spcPct val="100000"/>
       </a:lnSpc>
@@ -107,7 +107,7 @@
         <a:srgbClr val="000000"/>
       </a:buClr>
       <a:buFont typeface="Arial"/>
-      <a:defRPr b="0" i="0" sz="1400" u="none" cap="none" strike="noStrike">
+      <a:defRPr sz="1400" b="0" i="0" u="none" strike="noStrike" cap="none">
         <a:solidFill>
           <a:srgbClr val="000000"/>
         </a:solidFill>
@@ -117,7 +117,7 @@
         <a:sym typeface="Arial"/>
       </a:defRPr>
     </a:lvl3pPr>
-    <a:lvl4pPr lvl="3" marR="0" rtl="0" algn="l">
+    <a:lvl4pPr marR="0" lvl="3" algn="l" rtl="0">
       <a:lnSpc>
         <a:spcPct val="100000"/>
       </a:lnSpc>
@@ -131,7 +131,7 @@
         <a:srgbClr val="000000"/>
       </a:buClr>
       <a:buFont typeface="Arial"/>
-      <a:defRPr b="0" i="0" sz="1400" u="none" cap="none" strike="noStrike">
+      <a:defRPr sz="1400" b="0" i="0" u="none" strike="noStrike" cap="none">
         <a:solidFill>
           <a:srgbClr val="000000"/>
         </a:solidFill>
@@ -141,7 +141,7 @@
         <a:sym typeface="Arial"/>
       </a:defRPr>
     </a:lvl4pPr>
-    <a:lvl5pPr lvl="4" marR="0" rtl="0" algn="l">
+    <a:lvl5pPr marR="0" lvl="4" algn="l" rtl="0">
       <a:lnSpc>
         <a:spcPct val="100000"/>
       </a:lnSpc>
@@ -155,7 +155,7 @@
         <a:srgbClr val="000000"/>
       </a:buClr>
       <a:buFont typeface="Arial"/>
-      <a:defRPr b="0" i="0" sz="1400" u="none" cap="none" strike="noStrike">
+      <a:defRPr sz="1400" b="0" i="0" u="none" strike="noStrike" cap="none">
         <a:solidFill>
           <a:srgbClr val="000000"/>
         </a:solidFill>
@@ -165,7 +165,7 @@
         <a:sym typeface="Arial"/>
       </a:defRPr>
     </a:lvl5pPr>
-    <a:lvl6pPr lvl="5" marR="0" rtl="0" algn="l">
+    <a:lvl6pPr marR="0" lvl="5" algn="l" rtl="0">
       <a:lnSpc>
         <a:spcPct val="100000"/>
       </a:lnSpc>
@@ -179,7 +179,7 @@
         <a:srgbClr val="000000"/>
       </a:buClr>
       <a:buFont typeface="Arial"/>
-      <a:defRPr b="0" i="0" sz="1400" u="none" cap="none" strike="noStrike">
+      <a:defRPr sz="1400" b="0" i="0" u="none" strike="noStrike" cap="none">
         <a:solidFill>
           <a:srgbClr val="000000"/>
         </a:solidFill>
@@ -189,7 +189,7 @@
         <a:sym typeface="Arial"/>
       </a:defRPr>
     </a:lvl6pPr>
-    <a:lvl7pPr lvl="6" marR="0" rtl="0" algn="l">
+    <a:lvl7pPr marR="0" lvl="6" algn="l" rtl="0">
       <a:lnSpc>
         <a:spcPct val="100000"/>
       </a:lnSpc>
@@ -203,7 +203,7 @@
         <a:srgbClr val="000000"/>
       </a:buClr>
       <a:buFont typeface="Arial"/>
-      <a:defRPr b="0" i="0" sz="1400" u="none" cap="none" strike="noStrike">
+      <a:defRPr sz="1400" b="0" i="0" u="none" strike="noStrike" cap="none">
         <a:solidFill>
           <a:srgbClr val="000000"/>
         </a:solidFill>
@@ -213,7 +213,7 @@
         <a:sym typeface="Arial"/>
       </a:defRPr>
     </a:lvl7pPr>
-    <a:lvl8pPr lvl="7" marR="0" rtl="0" algn="l">
+    <a:lvl8pPr marR="0" lvl="7" algn="l" rtl="0">
       <a:lnSpc>
         <a:spcPct val="100000"/>
       </a:lnSpc>
@@ -227,7 +227,7 @@
         <a:srgbClr val="000000"/>
       </a:buClr>
       <a:buFont typeface="Arial"/>
-      <a:defRPr b="0" i="0" sz="1400" u="none" cap="none" strike="noStrike">
+      <a:defRPr sz="1400" b="0" i="0" u="none" strike="noStrike" cap="none">
         <a:solidFill>
           <a:srgbClr val="000000"/>
         </a:solidFill>
@@ -237,7 +237,7 @@
         <a:sym typeface="Arial"/>
       </a:defRPr>
     </a:lvl8pPr>
-    <a:lvl9pPr lvl="8" marR="0" rtl="0" algn="l">
+    <a:lvl9pPr marR="0" lvl="8" algn="l" rtl="0">
       <a:lnSpc>
         <a:spcPct val="100000"/>
       </a:lnSpc>
@@ -251,7 +251,7 @@
         <a:srgbClr val="000000"/>
       </a:buClr>
       <a:buFont typeface="Arial"/>
-      <a:defRPr b="0" i="0" sz="1400" u="none" cap="none" strike="noStrike">
+      <a:defRPr sz="1400" b="0" i="0" u="none" strike="noStrike" cap="none">
         <a:solidFill>
           <a:srgbClr val="000000"/>
         </a:solidFill>
@@ -264,7 +264,7 @@
   </p:defaultTextStyle>
   <p:extLst>
     <p:ext uri="{EFAFB233-063F-42B5-8137-9DF3F51BA10A}">
-      <p15:sldGuideLst>
+      <p15:sldGuideLst xmlns:p15="http://schemas.microsoft.com/office/powerpoint/2012/main">
         <p15:guide id="1" orient="horz" pos="1620">
           <p15:clr>
             <a:srgbClr val="A4A3A4"/>
@@ -282,11 +282,16 @@
 </file>
 
 <file path=ppt/notesMasters/notesMaster1.xml><?xml version="1.0" encoding="utf-8"?>
-<p:notesMaster xmlns:a="http://schemas.openxmlformats.org/drawingml/2006/main" xmlns:r="http://schemas.openxmlformats.org/officeDocument/2006/relationships" xmlns:mc="http://schemas.openxmlformats.org/markup-compatibility/2006" xmlns:mv="urn:schemas-microsoft-com:mac:vml" xmlns:p="http://schemas.openxmlformats.org/presentationml/2006/main" xmlns:c="http://schemas.openxmlformats.org/drawingml/2006/chart" xmlns:dgm="http://schemas.openxmlformats.org/drawingml/2006/diagram" xmlns:o="urn:schemas-microsoft-com:office:office" xmlns:v="urn:schemas-microsoft-com:vml" xmlns:pvml="urn:schemas-microsoft-com:office:powerpoint" xmlns:com="http://schemas.openxmlformats.org/drawingml/2006/compatibility" xmlns:p14="http://schemas.microsoft.com/office/powerpoint/2010/main" xmlns:p15="http://schemas.microsoft.com/office/powerpoint/2012/main" xmlns:ahyp="http://schemas.microsoft.com/office/drawing/2018/hyperlinkcolor">
+<p:notesMaster xmlns:a="http://schemas.openxmlformats.org/drawingml/2006/main" xmlns:r="http://schemas.openxmlformats.org/officeDocument/2006/relationships" xmlns:p="http://schemas.openxmlformats.org/presentationml/2006/main">
   <p:cSld>
+    <p:bg>
+      <p:bgRef idx="1001">
+        <a:schemeClr val="bg1"/>
+      </p:bgRef>
+    </p:bg>
     <p:spTree>
       <p:nvGrpSpPr>
-        <p:cNvPr id="2" name="Shape 2"/>
+        <p:cNvPr id="1" name="Shape 2"/>
         <p:cNvGrpSpPr/>
         <p:nvPr/>
       </p:nvGrpSpPr>
@@ -301,9 +306,11 @@
       <p:sp>
         <p:nvSpPr>
           <p:cNvPr id="3" name="Google Shape;3;n"/>
-          <p:cNvSpPr/>
+          <p:cNvSpPr>
+            <a:spLocks noGrp="1" noRot="1" noChangeAspect="1"/>
+          </p:cNvSpPr>
           <p:nvPr>
-            <p:ph idx="2" type="sldImg"/>
+            <p:ph type="sldImg" idx="2"/>
           </p:nvPr>
         </p:nvSpPr>
         <p:spPr>
@@ -312,9 +319,13 @@
             <a:ext cx="6096075" cy="3429000"/>
           </a:xfrm>
           <a:custGeom>
-            <a:rect b="b" l="l" r="r" t="t"/>
+            <a:avLst/>
+            <a:gdLst/>
+            <a:ahLst/>
+            <a:cxnLst/>
+            <a:rect l="l" t="t" r="r" b="b"/>
             <a:pathLst>
-              <a:path extrusionOk="0" h="120000" w="120000">
+              <a:path w="120000" h="120000" extrusionOk="0">
                 <a:moveTo>
                   <a:pt x="0" y="0"/>
                 </a:moveTo>
@@ -332,23 +343,25 @@
             </a:pathLst>
           </a:custGeom>
           <a:noFill/>
-          <a:ln cap="flat" cmpd="sng" w="9525">
+          <a:ln w="9525" cap="flat" cmpd="sng">
             <a:solidFill>
               <a:srgbClr val="000000"/>
             </a:solidFill>
             <a:prstDash val="solid"/>
             <a:round/>
-            <a:headEnd len="sm" w="sm" type="none"/>
-            <a:tailEnd len="sm" w="sm" type="none"/>
+            <a:headEnd type="none" w="sm" len="sm"/>
+            <a:tailEnd type="none" w="sm" len="sm"/>
           </a:ln>
         </p:spPr>
       </p:sp>
       <p:sp>
         <p:nvSpPr>
           <p:cNvPr id="4" name="Google Shape;4;n"/>
-          <p:cNvSpPr txBox="1"/>
+          <p:cNvSpPr txBox="1">
+            <a:spLocks noGrp="1"/>
+          </p:cNvSpPr>
           <p:nvPr>
-            <p:ph idx="1" type="body"/>
+            <p:ph type="body" idx="1"/>
           </p:nvPr>
         </p:nvSpPr>
         <p:spPr>
@@ -365,11 +378,11 @@
           </a:ln>
         </p:spPr>
         <p:txBody>
-          <a:bodyPr anchorCtr="0" anchor="t" bIns="91425" lIns="91425" spcFirstLastPara="1" rIns="91425" wrap="square" tIns="91425">
+          <a:bodyPr spcFirstLastPara="1" wrap="square" lIns="91425" tIns="91425" rIns="91425" bIns="91425" anchor="t" anchorCtr="0">
             <a:noAutofit/>
           </a:bodyPr>
           <a:lstStyle>
-            <a:lvl1pPr indent="-317500" lvl="0" marL="457200">
+            <a:lvl1pPr marL="457200" lvl="0" indent="-317500">
               <a:spcBef>
                 <a:spcPts val="0"/>
               </a:spcBef>
@@ -380,7 +393,7 @@
               <a:buChar char="●"/>
               <a:defRPr sz="1100"/>
             </a:lvl1pPr>
-            <a:lvl2pPr indent="-317500" lvl="1" marL="914400">
+            <a:lvl2pPr marL="914400" lvl="1" indent="-317500">
               <a:spcBef>
                 <a:spcPts val="0"/>
               </a:spcBef>
@@ -391,7 +404,7 @@
               <a:buChar char="○"/>
               <a:defRPr sz="1100"/>
             </a:lvl2pPr>
-            <a:lvl3pPr indent="-317500" lvl="2" marL="1371600">
+            <a:lvl3pPr marL="1371600" lvl="2" indent="-317500">
               <a:spcBef>
                 <a:spcPts val="0"/>
               </a:spcBef>
@@ -402,7 +415,7 @@
               <a:buChar char="■"/>
               <a:defRPr sz="1100"/>
             </a:lvl3pPr>
-            <a:lvl4pPr indent="-317500" lvl="3" marL="1828800">
+            <a:lvl4pPr marL="1828800" lvl="3" indent="-317500">
               <a:spcBef>
                 <a:spcPts val="0"/>
               </a:spcBef>
@@ -413,7 +426,7 @@
               <a:buChar char="●"/>
               <a:defRPr sz="1100"/>
             </a:lvl4pPr>
-            <a:lvl5pPr indent="-317500" lvl="4" marL="2286000">
+            <a:lvl5pPr marL="2286000" lvl="4" indent="-317500">
               <a:spcBef>
                 <a:spcPts val="0"/>
               </a:spcBef>
@@ -424,7 +437,7 @@
               <a:buChar char="○"/>
               <a:defRPr sz="1100"/>
             </a:lvl5pPr>
-            <a:lvl6pPr indent="-317500" lvl="5" marL="2743200">
+            <a:lvl6pPr marL="2743200" lvl="5" indent="-317500">
               <a:spcBef>
                 <a:spcPts val="0"/>
               </a:spcBef>
@@ -435,7 +448,7 @@
               <a:buChar char="■"/>
               <a:defRPr sz="1100"/>
             </a:lvl6pPr>
-            <a:lvl7pPr indent="-317500" lvl="6" marL="3200400">
+            <a:lvl7pPr marL="3200400" lvl="6" indent="-317500">
               <a:spcBef>
                 <a:spcPts val="0"/>
               </a:spcBef>
@@ -446,7 +459,7 @@
               <a:buChar char="●"/>
               <a:defRPr sz="1100"/>
             </a:lvl7pPr>
-            <a:lvl8pPr indent="-317500" lvl="7" marL="3657600">
+            <a:lvl8pPr marL="3657600" lvl="7" indent="-317500">
               <a:spcBef>
                 <a:spcPts val="0"/>
               </a:spcBef>
@@ -457,7 +470,7 @@
               <a:buChar char="○"/>
               <a:defRPr sz="1100"/>
             </a:lvl8pPr>
-            <a:lvl9pPr indent="-317500" lvl="8" marL="4114800">
+            <a:lvl9pPr marL="4114800" lvl="8" indent="-317500">
               <a:spcBef>
                 <a:spcPts val="0"/>
               </a:spcBef>
@@ -469,14 +482,16 @@
               <a:defRPr sz="1100"/>
             </a:lvl9pPr>
           </a:lstStyle>
-          <a:p/>
+          <a:p>
+            <a:endParaRPr/>
+          </a:p>
         </p:txBody>
       </p:sp>
     </p:spTree>
   </p:cSld>
-  <p:clrMap accent1="accent1" accent2="accent2" accent3="accent3" accent4="accent4" accent5="accent5" accent6="accent6" bg1="lt1" bg2="dk2" tx1="dk1" tx2="lt2" folHlink="folHlink" hlink="hlink"/>
+  <p:clrMap bg1="lt1" tx1="dk1" bg2="dk2" tx2="lt2" accent1="accent1" accent2="accent2" accent3="accent3" accent4="accent4" accent5="accent5" accent6="accent6" hlink="hlink" folHlink="folHlink"/>
   <p:notesStyle>
-    <a:defPPr lvl="0" marR="0" rtl="0" algn="l">
+    <a:defPPr marR="0" lvl="0" algn="l" rtl="0">
       <a:lnSpc>
         <a:spcPct val="100000"/>
       </a:lnSpc>
@@ -487,7 +502,7 @@
         <a:spcPts val="0"/>
       </a:spcAft>
     </a:defPPr>
-    <a:lvl1pPr lvl="0" marR="0" rtl="0" algn="l">
+    <a:lvl1pPr marR="0" lvl="0" algn="l" rtl="0">
       <a:lnSpc>
         <a:spcPct val="100000"/>
       </a:lnSpc>
@@ -501,7 +516,7 @@
         <a:srgbClr val="000000"/>
       </a:buClr>
       <a:buFont typeface="Arial"/>
-      <a:defRPr b="0" i="0" sz="1400" u="none" cap="none" strike="noStrike">
+      <a:defRPr sz="1400" b="0" i="0" u="none" strike="noStrike" cap="none">
         <a:solidFill>
           <a:srgbClr val="000000"/>
         </a:solidFill>
@@ -511,7 +526,7 @@
         <a:sym typeface="Arial"/>
       </a:defRPr>
     </a:lvl1pPr>
-    <a:lvl2pPr lvl="1" marR="0" rtl="0" algn="l">
+    <a:lvl2pPr marR="0" lvl="1" algn="l" rtl="0">
       <a:lnSpc>
         <a:spcPct val="100000"/>
       </a:lnSpc>
@@ -525,7 +540,7 @@
         <a:srgbClr val="000000"/>
       </a:buClr>
       <a:buFont typeface="Arial"/>
-      <a:defRPr b="0" i="0" sz="1400" u="none" cap="none" strike="noStrike">
+      <a:defRPr sz="1400" b="0" i="0" u="none" strike="noStrike" cap="none">
         <a:solidFill>
           <a:srgbClr val="000000"/>
         </a:solidFill>
@@ -535,7 +550,7 @@
         <a:sym typeface="Arial"/>
       </a:defRPr>
     </a:lvl2pPr>
-    <a:lvl3pPr lvl="2" marR="0" rtl="0" algn="l">
+    <a:lvl3pPr marR="0" lvl="2" algn="l" rtl="0">
       <a:lnSpc>
         <a:spcPct val="100000"/>
       </a:lnSpc>
@@ -549,7 +564,7 @@
         <a:srgbClr val="000000"/>
       </a:buClr>
       <a:buFont typeface="Arial"/>
-      <a:defRPr b="0" i="0" sz="1400" u="none" cap="none" strike="noStrike">
+      <a:defRPr sz="1400" b="0" i="0" u="none" strike="noStrike" cap="none">
         <a:solidFill>
           <a:srgbClr val="000000"/>
         </a:solidFill>
@@ -559,7 +574,7 @@
         <a:sym typeface="Arial"/>
       </a:defRPr>
     </a:lvl3pPr>
-    <a:lvl4pPr lvl="3" marR="0" rtl="0" algn="l">
+    <a:lvl4pPr marR="0" lvl="3" algn="l" rtl="0">
       <a:lnSpc>
         <a:spcPct val="100000"/>
       </a:lnSpc>
@@ -573,7 +588,7 @@
         <a:srgbClr val="000000"/>
       </a:buClr>
       <a:buFont typeface="Arial"/>
-      <a:defRPr b="0" i="0" sz="1400" u="none" cap="none" strike="noStrike">
+      <a:defRPr sz="1400" b="0" i="0" u="none" strike="noStrike" cap="none">
         <a:solidFill>
           <a:srgbClr val="000000"/>
         </a:solidFill>
@@ -583,7 +598,7 @@
         <a:sym typeface="Arial"/>
       </a:defRPr>
     </a:lvl4pPr>
-    <a:lvl5pPr lvl="4" marR="0" rtl="0" algn="l">
+    <a:lvl5pPr marR="0" lvl="4" algn="l" rtl="0">
       <a:lnSpc>
         <a:spcPct val="100000"/>
       </a:lnSpc>
@@ -597,7 +612,7 @@
         <a:srgbClr val="000000"/>
       </a:buClr>
       <a:buFont typeface="Arial"/>
-      <a:defRPr b="0" i="0" sz="1400" u="none" cap="none" strike="noStrike">
+      <a:defRPr sz="1400" b="0" i="0" u="none" strike="noStrike" cap="none">
         <a:solidFill>
           <a:srgbClr val="000000"/>
         </a:solidFill>
@@ -607,7 +622,7 @@
         <a:sym typeface="Arial"/>
       </a:defRPr>
     </a:lvl5pPr>
-    <a:lvl6pPr lvl="5" marR="0" rtl="0" algn="l">
+    <a:lvl6pPr marR="0" lvl="5" algn="l" rtl="0">
       <a:lnSpc>
         <a:spcPct val="100000"/>
       </a:lnSpc>
@@ -621,7 +636,7 @@
         <a:srgbClr val="000000"/>
       </a:buClr>
       <a:buFont typeface="Arial"/>
-      <a:defRPr b="0" i="0" sz="1400" u="none" cap="none" strike="noStrike">
+      <a:defRPr sz="1400" b="0" i="0" u="none" strike="noStrike" cap="none">
         <a:solidFill>
           <a:srgbClr val="000000"/>
         </a:solidFill>
@@ -631,7 +646,7 @@
         <a:sym typeface="Arial"/>
       </a:defRPr>
     </a:lvl6pPr>
-    <a:lvl7pPr lvl="6" marR="0" rtl="0" algn="l">
+    <a:lvl7pPr marR="0" lvl="6" algn="l" rtl="0">
       <a:lnSpc>
         <a:spcPct val="100000"/>
       </a:lnSpc>
@@ -645,7 +660,7 @@
         <a:srgbClr val="000000"/>
       </a:buClr>
       <a:buFont typeface="Arial"/>
-      <a:defRPr b="0" i="0" sz="1400" u="none" cap="none" strike="noStrike">
+      <a:defRPr sz="1400" b="0" i="0" u="none" strike="noStrike" cap="none">
         <a:solidFill>
           <a:srgbClr val="000000"/>
         </a:solidFill>
@@ -655,7 +670,7 @@
         <a:sym typeface="Arial"/>
       </a:defRPr>
     </a:lvl7pPr>
-    <a:lvl8pPr lvl="7" marR="0" rtl="0" algn="l">
+    <a:lvl8pPr marR="0" lvl="7" algn="l" rtl="0">
       <a:lnSpc>
         <a:spcPct val="100000"/>
       </a:lnSpc>
@@ -669,7 +684,7 @@
         <a:srgbClr val="000000"/>
       </a:buClr>
       <a:buFont typeface="Arial"/>
-      <a:defRPr b="0" i="0" sz="1400" u="none" cap="none" strike="noStrike">
+      <a:defRPr sz="1400" b="0" i="0" u="none" strike="noStrike" cap="none">
         <a:solidFill>
           <a:srgbClr val="000000"/>
         </a:solidFill>
@@ -679,7 +694,7 @@
         <a:sym typeface="Arial"/>
       </a:defRPr>
     </a:lvl8pPr>
-    <a:lvl9pPr lvl="8" marR="0" rtl="0" algn="l">
+    <a:lvl9pPr marR="0" lvl="8" algn="l" rtl="0">
       <a:lnSpc>
         <a:spcPct val="100000"/>
       </a:lnSpc>
@@ -693,7 +708,7 @@
         <a:srgbClr val="000000"/>
       </a:buClr>
       <a:buFont typeface="Arial"/>
-      <a:defRPr b="0" i="0" sz="1400" u="none" cap="none" strike="noStrike">
+      <a:defRPr sz="1400" b="0" i="0" u="none" strike="noStrike" cap="none">
         <a:solidFill>
           <a:srgbClr val="000000"/>
         </a:solidFill>
@@ -708,11 +723,11 @@
 </file>
 
 <file path=ppt/notesSlides/notesSlide1.xml><?xml version="1.0" encoding="utf-8"?>
-<p:notes xmlns:a="http://schemas.openxmlformats.org/drawingml/2006/main" xmlns:r="http://schemas.openxmlformats.org/officeDocument/2006/relationships" xmlns:mc="http://schemas.openxmlformats.org/markup-compatibility/2006" xmlns:mv="urn:schemas-microsoft-com:mac:vml" xmlns:p="http://schemas.openxmlformats.org/presentationml/2006/main" xmlns:c="http://schemas.openxmlformats.org/drawingml/2006/chart" xmlns:dgm="http://schemas.openxmlformats.org/drawingml/2006/diagram" xmlns:o="urn:schemas-microsoft-com:office:office" xmlns:v="urn:schemas-microsoft-com:vml" xmlns:pvml="urn:schemas-microsoft-com:office:powerpoint" xmlns:com="http://schemas.openxmlformats.org/drawingml/2006/compatibility" xmlns:p14="http://schemas.microsoft.com/office/powerpoint/2010/main" xmlns:p15="http://schemas.microsoft.com/office/powerpoint/2012/main" xmlns:ahyp="http://schemas.microsoft.com/office/drawing/2018/hyperlinkcolor" showMasterPhAnim="0" showMasterSp="0">
+<p:notes xmlns:a="http://schemas.openxmlformats.org/drawingml/2006/main" xmlns:r="http://schemas.openxmlformats.org/officeDocument/2006/relationships" xmlns:p="http://schemas.openxmlformats.org/presentationml/2006/main" showMasterSp="0" showMasterPhAnim="0">
   <p:cSld>
     <p:spTree>
       <p:nvGrpSpPr>
-        <p:cNvPr id="59" name="Shape 59"/>
+        <p:cNvPr id="1" name="Shape 59"/>
         <p:cNvGrpSpPr/>
         <p:nvPr/>
       </p:nvGrpSpPr>
@@ -727,9 +742,11 @@
       <p:sp>
         <p:nvSpPr>
           <p:cNvPr id="60" name="Google Shape;60;gc6f75fceb_0_0:notes"/>
-          <p:cNvSpPr/>
+          <p:cNvSpPr>
+            <a:spLocks noGrp="1" noRot="1" noChangeAspect="1"/>
+          </p:cNvSpPr>
           <p:nvPr>
-            <p:ph idx="2" type="sldImg"/>
+            <p:ph type="sldImg" idx="2"/>
           </p:nvPr>
         </p:nvSpPr>
         <p:spPr>
@@ -738,9 +755,13 @@
             <a:ext cx="6096000" cy="3429000"/>
           </a:xfrm>
           <a:custGeom>
-            <a:rect b="b" l="l" r="r" t="t"/>
+            <a:avLst/>
+            <a:gdLst/>
+            <a:ahLst/>
+            <a:cxnLst/>
+            <a:rect l="l" t="t" r="r" b="b"/>
             <a:pathLst>
-              <a:path extrusionOk="0" h="120000" w="120000">
+              <a:path w="120000" h="120000" extrusionOk="0">
                 <a:moveTo>
                   <a:pt x="0" y="0"/>
                 </a:moveTo>
@@ -762,9 +783,11 @@
       <p:sp>
         <p:nvSpPr>
           <p:cNvPr id="61" name="Google Shape;61;gc6f75fceb_0_0:notes"/>
-          <p:cNvSpPr txBox="1"/>
+          <p:cNvSpPr txBox="1">
+            <a:spLocks noGrp="1"/>
+          </p:cNvSpPr>
           <p:nvPr>
-            <p:ph idx="1" type="body"/>
+            <p:ph type="body" idx="1"/>
           </p:nvPr>
         </p:nvSpPr>
         <p:spPr>
@@ -777,12 +800,12 @@
           </a:prstGeom>
         </p:spPr>
         <p:txBody>
-          <a:bodyPr anchorCtr="0" anchor="t" bIns="91425" lIns="91425" spcFirstLastPara="1" rIns="91425" wrap="square" tIns="91425">
+          <a:bodyPr spcFirstLastPara="1" wrap="square" lIns="91425" tIns="91425" rIns="91425" bIns="91425" anchor="t" anchorCtr="0">
             <a:noAutofit/>
           </a:bodyPr>
           <a:lstStyle/>
           <a:p>
-            <a:pPr indent="0" lvl="0" marL="0" rtl="0" algn="l">
+            <a:pPr marL="0" lvl="0" indent="0" algn="l" rtl="0">
               <a:spcBef>
                 <a:spcPts val="0"/>
               </a:spcBef>
@@ -791,9 +814,6 @@
               </a:spcAft>
               <a:buNone/>
             </a:pPr>
-            <a:r>
-              <a:t/>
-            </a:r>
             <a:endParaRPr/>
           </a:p>
         </p:txBody>
@@ -807,11 +827,11 @@
 </file>
 
 <file path=ppt/notesSlides/notesSlide2.xml><?xml version="1.0" encoding="utf-8"?>
-<p:notes xmlns:a="http://schemas.openxmlformats.org/drawingml/2006/main" xmlns:r="http://schemas.openxmlformats.org/officeDocument/2006/relationships" xmlns:mc="http://schemas.openxmlformats.org/markup-compatibility/2006" xmlns:mv="urn:schemas-microsoft-com:mac:vml" xmlns:p="http://schemas.openxmlformats.org/presentationml/2006/main" xmlns:c="http://schemas.openxmlformats.org/drawingml/2006/chart" xmlns:dgm="http://schemas.openxmlformats.org/drawingml/2006/diagram" xmlns:o="urn:schemas-microsoft-com:office:office" xmlns:v="urn:schemas-microsoft-com:vml" xmlns:pvml="urn:schemas-microsoft-com:office:powerpoint" xmlns:com="http://schemas.openxmlformats.org/drawingml/2006/compatibility" xmlns:p14="http://schemas.microsoft.com/office/powerpoint/2010/main" xmlns:p15="http://schemas.microsoft.com/office/powerpoint/2012/main" xmlns:ahyp="http://schemas.microsoft.com/office/drawing/2018/hyperlinkcolor" showMasterPhAnim="0" showMasterSp="0">
+<p:notes xmlns:a="http://schemas.openxmlformats.org/drawingml/2006/main" xmlns:r="http://schemas.openxmlformats.org/officeDocument/2006/relationships" xmlns:p="http://schemas.openxmlformats.org/presentationml/2006/main" showMasterSp="0" showMasterPhAnim="0">
   <p:cSld>
     <p:spTree>
       <p:nvGrpSpPr>
-        <p:cNvPr id="65" name="Shape 65"/>
+        <p:cNvPr id="1" name="Shape 65"/>
         <p:cNvGrpSpPr/>
         <p:nvPr/>
       </p:nvGrpSpPr>
@@ -826,9 +846,11 @@
       <p:sp>
         <p:nvSpPr>
           <p:cNvPr id="66" name="Google Shape;66;gc6f75fceb_0_10:notes"/>
-          <p:cNvSpPr/>
+          <p:cNvSpPr>
+            <a:spLocks noGrp="1" noRot="1" noChangeAspect="1"/>
+          </p:cNvSpPr>
           <p:nvPr>
-            <p:ph idx="2" type="sldImg"/>
+            <p:ph type="sldImg" idx="2"/>
           </p:nvPr>
         </p:nvSpPr>
         <p:spPr>
@@ -837,9 +859,13 @@
             <a:ext cx="6096000" cy="3429000"/>
           </a:xfrm>
           <a:custGeom>
-            <a:rect b="b" l="l" r="r" t="t"/>
+            <a:avLst/>
+            <a:gdLst/>
+            <a:ahLst/>
+            <a:cxnLst/>
+            <a:rect l="l" t="t" r="r" b="b"/>
             <a:pathLst>
-              <a:path extrusionOk="0" h="120000" w="120000">
+              <a:path w="120000" h="120000" extrusionOk="0">
                 <a:moveTo>
                   <a:pt x="0" y="0"/>
                 </a:moveTo>
@@ -861,9 +887,11 @@
       <p:sp>
         <p:nvSpPr>
           <p:cNvPr id="67" name="Google Shape;67;gc6f75fceb_0_10:notes"/>
-          <p:cNvSpPr txBox="1"/>
+          <p:cNvSpPr txBox="1">
+            <a:spLocks noGrp="1"/>
+          </p:cNvSpPr>
           <p:nvPr>
-            <p:ph idx="1" type="body"/>
+            <p:ph type="body" idx="1"/>
           </p:nvPr>
         </p:nvSpPr>
         <p:spPr>
@@ -876,12 +904,12 @@
           </a:prstGeom>
         </p:spPr>
         <p:txBody>
-          <a:bodyPr anchorCtr="0" anchor="t" bIns="91425" lIns="91425" spcFirstLastPara="1" rIns="91425" wrap="square" tIns="91425">
+          <a:bodyPr spcFirstLastPara="1" wrap="square" lIns="91425" tIns="91425" rIns="91425" bIns="91425" anchor="t" anchorCtr="0">
             <a:noAutofit/>
           </a:bodyPr>
           <a:lstStyle/>
           <a:p>
-            <a:pPr indent="0" lvl="0" marL="0" rtl="0" algn="l">
+            <a:pPr marL="0" lvl="0" indent="0" algn="l" rtl="0">
               <a:spcBef>
                 <a:spcPts val="0"/>
               </a:spcBef>
@@ -890,9 +918,6 @@
               </a:spcAft>
               <a:buNone/>
             </a:pPr>
-            <a:r>
-              <a:t/>
-            </a:r>
             <a:endParaRPr/>
           </a:p>
         </p:txBody>
@@ -906,11 +931,11 @@
 </file>
 
 <file path=ppt/notesSlides/notesSlide3.xml><?xml version="1.0" encoding="utf-8"?>
-<p:notes xmlns:a="http://schemas.openxmlformats.org/drawingml/2006/main" xmlns:r="http://schemas.openxmlformats.org/officeDocument/2006/relationships" xmlns:mc="http://schemas.openxmlformats.org/markup-compatibility/2006" xmlns:mv="urn:schemas-microsoft-com:mac:vml" xmlns:p="http://schemas.openxmlformats.org/presentationml/2006/main" xmlns:c="http://schemas.openxmlformats.org/drawingml/2006/chart" xmlns:dgm="http://schemas.openxmlformats.org/drawingml/2006/diagram" xmlns:o="urn:schemas-microsoft-com:office:office" xmlns:v="urn:schemas-microsoft-com:vml" xmlns:pvml="urn:schemas-microsoft-com:office:powerpoint" xmlns:com="http://schemas.openxmlformats.org/drawingml/2006/compatibility" xmlns:p14="http://schemas.microsoft.com/office/powerpoint/2010/main" xmlns:p15="http://schemas.microsoft.com/office/powerpoint/2012/main" xmlns:ahyp="http://schemas.microsoft.com/office/drawing/2018/hyperlinkcolor" showMasterPhAnim="0" showMasterSp="0">
+<p:notes xmlns:a="http://schemas.openxmlformats.org/drawingml/2006/main" xmlns:r="http://schemas.openxmlformats.org/officeDocument/2006/relationships" xmlns:p="http://schemas.openxmlformats.org/presentationml/2006/main" showMasterSp="0" showMasterPhAnim="0">
   <p:cSld>
     <p:spTree>
       <p:nvGrpSpPr>
-        <p:cNvPr id="71" name="Shape 71"/>
+        <p:cNvPr id="1" name="Shape 71"/>
         <p:cNvGrpSpPr/>
         <p:nvPr/>
       </p:nvGrpSpPr>
@@ -925,20 +950,26 @@
       <p:sp>
         <p:nvSpPr>
           <p:cNvPr id="72" name="Google Shape;72;gc6f75fceb_0_16:notes"/>
-          <p:cNvSpPr/>
+          <p:cNvSpPr>
+            <a:spLocks noGrp="1" noRot="1" noChangeAspect="1"/>
+          </p:cNvSpPr>
           <p:nvPr>
-            <p:ph idx="2" type="sldImg"/>
+            <p:ph type="sldImg" idx="2"/>
           </p:nvPr>
         </p:nvSpPr>
         <p:spPr>
           <a:xfrm>
-            <a:off x="381188" y="685800"/>
-            <a:ext cx="6096300" cy="3429000"/>
+            <a:off x="381000" y="685800"/>
+            <a:ext cx="6096000" cy="3429000"/>
           </a:xfrm>
           <a:custGeom>
-            <a:rect b="b" l="l" r="r" t="t"/>
+            <a:avLst/>
+            <a:gdLst/>
+            <a:ahLst/>
+            <a:cxnLst/>
+            <a:rect l="l" t="t" r="r" b="b"/>
             <a:pathLst>
-              <a:path extrusionOk="0" h="120000" w="120000">
+              <a:path w="120000" h="120000" extrusionOk="0">
                 <a:moveTo>
                   <a:pt x="0" y="0"/>
                 </a:moveTo>
@@ -960,9 +991,11 @@
       <p:sp>
         <p:nvSpPr>
           <p:cNvPr id="73" name="Google Shape;73;gc6f75fceb_0_16:notes"/>
-          <p:cNvSpPr txBox="1"/>
+          <p:cNvSpPr txBox="1">
+            <a:spLocks noGrp="1"/>
+          </p:cNvSpPr>
           <p:nvPr>
-            <p:ph idx="1" type="body"/>
+            <p:ph type="body" idx="1"/>
           </p:nvPr>
         </p:nvSpPr>
         <p:spPr>
@@ -975,12 +1008,12 @@
           </a:prstGeom>
         </p:spPr>
         <p:txBody>
-          <a:bodyPr anchorCtr="0" anchor="t" bIns="91425" lIns="91425" spcFirstLastPara="1" rIns="91425" wrap="square" tIns="91425">
+          <a:bodyPr spcFirstLastPara="1" wrap="square" lIns="91425" tIns="91425" rIns="91425" bIns="91425" anchor="t" anchorCtr="0">
             <a:noAutofit/>
           </a:bodyPr>
           <a:lstStyle/>
           <a:p>
-            <a:pPr indent="0" lvl="0" marL="0" rtl="0" algn="l">
+            <a:pPr marL="0" lvl="0" indent="0" algn="l" rtl="0">
               <a:spcBef>
                 <a:spcPts val="0"/>
               </a:spcBef>
@@ -989,9 +1022,6 @@
               </a:spcAft>
               <a:buNone/>
             </a:pPr>
-            <a:r>
-              <a:t/>
-            </a:r>
             <a:endParaRPr/>
           </a:p>
         </p:txBody>
@@ -1005,11 +1035,11 @@
 </file>
 
 <file path=ppt/notesSlides/notesSlide4.xml><?xml version="1.0" encoding="utf-8"?>
-<p:notes xmlns:a="http://schemas.openxmlformats.org/drawingml/2006/main" xmlns:r="http://schemas.openxmlformats.org/officeDocument/2006/relationships" xmlns:mc="http://schemas.openxmlformats.org/markup-compatibility/2006" xmlns:mv="urn:schemas-microsoft-com:mac:vml" xmlns:p="http://schemas.openxmlformats.org/presentationml/2006/main" xmlns:c="http://schemas.openxmlformats.org/drawingml/2006/chart" xmlns:dgm="http://schemas.openxmlformats.org/drawingml/2006/diagram" xmlns:o="urn:schemas-microsoft-com:office:office" xmlns:v="urn:schemas-microsoft-com:vml" xmlns:pvml="urn:schemas-microsoft-com:office:powerpoint" xmlns:com="http://schemas.openxmlformats.org/drawingml/2006/compatibility" xmlns:p14="http://schemas.microsoft.com/office/powerpoint/2010/main" xmlns:p15="http://schemas.microsoft.com/office/powerpoint/2012/main" xmlns:ahyp="http://schemas.microsoft.com/office/drawing/2018/hyperlinkcolor" showMasterPhAnim="0" showMasterSp="0">
+<p:notes xmlns:a="http://schemas.openxmlformats.org/drawingml/2006/main" xmlns:r="http://schemas.openxmlformats.org/officeDocument/2006/relationships" xmlns:p="http://schemas.openxmlformats.org/presentationml/2006/main" showMasterSp="0" showMasterPhAnim="0">
   <p:cSld>
     <p:spTree>
       <p:nvGrpSpPr>
-        <p:cNvPr id="82" name="Shape 82"/>
+        <p:cNvPr id="1" name="Shape 82"/>
         <p:cNvGrpSpPr/>
         <p:nvPr/>
       </p:nvGrpSpPr>
@@ -1024,9 +1054,11 @@
       <p:sp>
         <p:nvSpPr>
           <p:cNvPr id="83" name="Google Shape;83;gb2f0a2a28c_0_9:notes"/>
-          <p:cNvSpPr/>
+          <p:cNvSpPr>
+            <a:spLocks noGrp="1" noRot="1" noChangeAspect="1"/>
+          </p:cNvSpPr>
           <p:nvPr>
-            <p:ph idx="2" type="sldImg"/>
+            <p:ph type="sldImg" idx="2"/>
           </p:nvPr>
         </p:nvSpPr>
         <p:spPr>
@@ -1035,9 +1067,13 @@
             <a:ext cx="6096000" cy="3429000"/>
           </a:xfrm>
           <a:custGeom>
-            <a:rect b="b" l="l" r="r" t="t"/>
+            <a:avLst/>
+            <a:gdLst/>
+            <a:ahLst/>
+            <a:cxnLst/>
+            <a:rect l="l" t="t" r="r" b="b"/>
             <a:pathLst>
-              <a:path extrusionOk="0" h="120000" w="120000">
+              <a:path w="120000" h="120000" extrusionOk="0">
                 <a:moveTo>
                   <a:pt x="0" y="0"/>
                 </a:moveTo>
@@ -1059,9 +1095,11 @@
       <p:sp>
         <p:nvSpPr>
           <p:cNvPr id="84" name="Google Shape;84;gb2f0a2a28c_0_9:notes"/>
-          <p:cNvSpPr txBox="1"/>
+          <p:cNvSpPr txBox="1">
+            <a:spLocks noGrp="1"/>
+          </p:cNvSpPr>
           <p:nvPr>
-            <p:ph idx="1" type="body"/>
+            <p:ph type="body" idx="1"/>
           </p:nvPr>
         </p:nvSpPr>
         <p:spPr>
@@ -1074,12 +1112,12 @@
           </a:prstGeom>
         </p:spPr>
         <p:txBody>
-          <a:bodyPr anchorCtr="0" anchor="t" bIns="91425" lIns="91425" spcFirstLastPara="1" rIns="91425" wrap="square" tIns="91425">
+          <a:bodyPr spcFirstLastPara="1" wrap="square" lIns="91425" tIns="91425" rIns="91425" bIns="91425" anchor="t" anchorCtr="0">
             <a:noAutofit/>
           </a:bodyPr>
           <a:lstStyle/>
           <a:p>
-            <a:pPr indent="0" lvl="0" marL="0" rtl="0" algn="l">
+            <a:pPr marL="0" lvl="0" indent="0" algn="l" rtl="0">
               <a:spcBef>
                 <a:spcPts val="0"/>
               </a:spcBef>
@@ -1116,11 +1154,11 @@
 </file>
 
 <file path=ppt/notesSlides/notesSlide5.xml><?xml version="1.0" encoding="utf-8"?>
-<p:notes xmlns:a="http://schemas.openxmlformats.org/drawingml/2006/main" xmlns:r="http://schemas.openxmlformats.org/officeDocument/2006/relationships" xmlns:mc="http://schemas.openxmlformats.org/markup-compatibility/2006" xmlns:mv="urn:schemas-microsoft-com:mac:vml" xmlns:p="http://schemas.openxmlformats.org/presentationml/2006/main" xmlns:c="http://schemas.openxmlformats.org/drawingml/2006/chart" xmlns:dgm="http://schemas.openxmlformats.org/drawingml/2006/diagram" xmlns:o="urn:schemas-microsoft-com:office:office" xmlns:v="urn:schemas-microsoft-com:vml" xmlns:pvml="urn:schemas-microsoft-com:office:powerpoint" xmlns:com="http://schemas.openxmlformats.org/drawingml/2006/compatibility" xmlns:p14="http://schemas.microsoft.com/office/powerpoint/2010/main" xmlns:p15="http://schemas.microsoft.com/office/powerpoint/2012/main" xmlns:ahyp="http://schemas.microsoft.com/office/drawing/2018/hyperlinkcolor" showMasterPhAnim="0" showMasterSp="0">
+<p:notes xmlns:a="http://schemas.openxmlformats.org/drawingml/2006/main" xmlns:r="http://schemas.openxmlformats.org/officeDocument/2006/relationships" xmlns:p="http://schemas.openxmlformats.org/presentationml/2006/main" showMasterSp="0" showMasterPhAnim="0">
   <p:cSld>
     <p:spTree>
       <p:nvGrpSpPr>
-        <p:cNvPr id="88" name="Shape 88"/>
+        <p:cNvPr id="1" name="Shape 88"/>
         <p:cNvGrpSpPr/>
         <p:nvPr/>
       </p:nvGrpSpPr>
@@ -1135,9 +1173,11 @@
       <p:sp>
         <p:nvSpPr>
           <p:cNvPr id="89" name="Google Shape;89;gc6f75fceb_0_60:notes"/>
-          <p:cNvSpPr/>
+          <p:cNvSpPr>
+            <a:spLocks noGrp="1" noRot="1" noChangeAspect="1"/>
+          </p:cNvSpPr>
           <p:nvPr>
-            <p:ph idx="2" type="sldImg"/>
+            <p:ph type="sldImg" idx="2"/>
           </p:nvPr>
         </p:nvSpPr>
         <p:spPr>
@@ -1146,9 +1186,13 @@
             <a:ext cx="6096000" cy="3429000"/>
           </a:xfrm>
           <a:custGeom>
-            <a:rect b="b" l="l" r="r" t="t"/>
+            <a:avLst/>
+            <a:gdLst/>
+            <a:ahLst/>
+            <a:cxnLst/>
+            <a:rect l="l" t="t" r="r" b="b"/>
             <a:pathLst>
-              <a:path extrusionOk="0" h="120000" w="120000">
+              <a:path w="120000" h="120000" extrusionOk="0">
                 <a:moveTo>
                   <a:pt x="0" y="0"/>
                 </a:moveTo>
@@ -1170,9 +1214,11 @@
       <p:sp>
         <p:nvSpPr>
           <p:cNvPr id="90" name="Google Shape;90;gc6f75fceb_0_60:notes"/>
-          <p:cNvSpPr txBox="1"/>
+          <p:cNvSpPr txBox="1">
+            <a:spLocks noGrp="1"/>
+          </p:cNvSpPr>
           <p:nvPr>
-            <p:ph idx="1" type="body"/>
+            <p:ph type="body" idx="1"/>
           </p:nvPr>
         </p:nvSpPr>
         <p:spPr>
@@ -1185,12 +1231,12 @@
           </a:prstGeom>
         </p:spPr>
         <p:txBody>
-          <a:bodyPr anchorCtr="0" anchor="t" bIns="91425" lIns="91425" spcFirstLastPara="1" rIns="91425" wrap="square" tIns="91425">
+          <a:bodyPr spcFirstLastPara="1" wrap="square" lIns="91425" tIns="91425" rIns="91425" bIns="91425" anchor="t" anchorCtr="0">
             <a:noAutofit/>
           </a:bodyPr>
           <a:lstStyle/>
           <a:p>
-            <a:pPr indent="0" lvl="0" marL="0" rtl="0" algn="l">
+            <a:pPr marL="0" lvl="0" indent="0" algn="l" rtl="0">
               <a:spcBef>
                 <a:spcPts val="0"/>
               </a:spcBef>
@@ -1199,9 +1245,6 @@
               </a:spcAft>
               <a:buNone/>
             </a:pPr>
-            <a:r>
-              <a:t/>
-            </a:r>
             <a:endParaRPr/>
           </a:p>
         </p:txBody>
@@ -1215,11 +1258,11 @@
 </file>
 
 <file path=ppt/notesSlides/notesSlide6.xml><?xml version="1.0" encoding="utf-8"?>
-<p:notes xmlns:a="http://schemas.openxmlformats.org/drawingml/2006/main" xmlns:r="http://schemas.openxmlformats.org/officeDocument/2006/relationships" xmlns:mc="http://schemas.openxmlformats.org/markup-compatibility/2006" xmlns:mv="urn:schemas-microsoft-com:mac:vml" xmlns:p="http://schemas.openxmlformats.org/presentationml/2006/main" xmlns:c="http://schemas.openxmlformats.org/drawingml/2006/chart" xmlns:dgm="http://schemas.openxmlformats.org/drawingml/2006/diagram" xmlns:o="urn:schemas-microsoft-com:office:office" xmlns:v="urn:schemas-microsoft-com:vml" xmlns:pvml="urn:schemas-microsoft-com:office:powerpoint" xmlns:com="http://schemas.openxmlformats.org/drawingml/2006/compatibility" xmlns:p14="http://schemas.microsoft.com/office/powerpoint/2010/main" xmlns:p15="http://schemas.microsoft.com/office/powerpoint/2012/main" xmlns:ahyp="http://schemas.microsoft.com/office/drawing/2018/hyperlinkcolor" showMasterPhAnim="0" showMasterSp="0">
+<p:notes xmlns:a="http://schemas.openxmlformats.org/drawingml/2006/main" xmlns:r="http://schemas.openxmlformats.org/officeDocument/2006/relationships" xmlns:p="http://schemas.openxmlformats.org/presentationml/2006/main" showMasterSp="0" showMasterPhAnim="0">
   <p:cSld>
     <p:spTree>
       <p:nvGrpSpPr>
-        <p:cNvPr id="94" name="Shape 94"/>
+        <p:cNvPr id="1" name="Shape 94"/>
         <p:cNvGrpSpPr/>
         <p:nvPr/>
       </p:nvGrpSpPr>
@@ -1234,9 +1277,11 @@
       <p:sp>
         <p:nvSpPr>
           <p:cNvPr id="95" name="Google Shape;95;gb2f0a2a28c_0_34:notes"/>
-          <p:cNvSpPr/>
+          <p:cNvSpPr>
+            <a:spLocks noGrp="1" noRot="1" noChangeAspect="1"/>
+          </p:cNvSpPr>
           <p:nvPr>
-            <p:ph idx="2" type="sldImg"/>
+            <p:ph type="sldImg" idx="2"/>
           </p:nvPr>
         </p:nvSpPr>
         <p:spPr>
@@ -1245,9 +1290,13 @@
             <a:ext cx="6096000" cy="3429000"/>
           </a:xfrm>
           <a:custGeom>
-            <a:rect b="b" l="l" r="r" t="t"/>
+            <a:avLst/>
+            <a:gdLst/>
+            <a:ahLst/>
+            <a:cxnLst/>
+            <a:rect l="l" t="t" r="r" b="b"/>
             <a:pathLst>
-              <a:path extrusionOk="0" h="120000" w="120000">
+              <a:path w="120000" h="120000" extrusionOk="0">
                 <a:moveTo>
                   <a:pt x="0" y="0"/>
                 </a:moveTo>
@@ -1269,9 +1318,11 @@
       <p:sp>
         <p:nvSpPr>
           <p:cNvPr id="96" name="Google Shape;96;gb2f0a2a28c_0_34:notes"/>
-          <p:cNvSpPr txBox="1"/>
+          <p:cNvSpPr txBox="1">
+            <a:spLocks noGrp="1"/>
+          </p:cNvSpPr>
           <p:nvPr>
-            <p:ph idx="1" type="body"/>
+            <p:ph type="body" idx="1"/>
           </p:nvPr>
         </p:nvSpPr>
         <p:spPr>
@@ -1284,12 +1335,12 @@
           </a:prstGeom>
         </p:spPr>
         <p:txBody>
-          <a:bodyPr anchorCtr="0" anchor="t" bIns="91425" lIns="91425" spcFirstLastPara="1" rIns="91425" wrap="square" tIns="91425">
+          <a:bodyPr spcFirstLastPara="1" wrap="square" lIns="91425" tIns="91425" rIns="91425" bIns="91425" anchor="t" anchorCtr="0">
             <a:noAutofit/>
           </a:bodyPr>
           <a:lstStyle/>
           <a:p>
-            <a:pPr indent="0" lvl="0" marL="0" rtl="0" algn="l">
+            <a:pPr marL="0" lvl="0" indent="0" algn="l" rtl="0">
               <a:spcBef>
                 <a:spcPts val="0"/>
               </a:spcBef>
@@ -1298,9 +1349,6 @@
               </a:spcAft>
               <a:buNone/>
             </a:pPr>
-            <a:r>
-              <a:t/>
-            </a:r>
             <a:endParaRPr/>
           </a:p>
         </p:txBody>
@@ -1314,11 +1362,11 @@
 </file>
 
 <file path=ppt/notesSlides/notesSlide7.xml><?xml version="1.0" encoding="utf-8"?>
-<p:notes xmlns:a="http://schemas.openxmlformats.org/drawingml/2006/main" xmlns:r="http://schemas.openxmlformats.org/officeDocument/2006/relationships" xmlns:mc="http://schemas.openxmlformats.org/markup-compatibility/2006" xmlns:mv="urn:schemas-microsoft-com:mac:vml" xmlns:p="http://schemas.openxmlformats.org/presentationml/2006/main" xmlns:c="http://schemas.openxmlformats.org/drawingml/2006/chart" xmlns:dgm="http://schemas.openxmlformats.org/drawingml/2006/diagram" xmlns:o="urn:schemas-microsoft-com:office:office" xmlns:v="urn:schemas-microsoft-com:vml" xmlns:pvml="urn:schemas-microsoft-com:office:powerpoint" xmlns:com="http://schemas.openxmlformats.org/drawingml/2006/compatibility" xmlns:p14="http://schemas.microsoft.com/office/powerpoint/2010/main" xmlns:p15="http://schemas.microsoft.com/office/powerpoint/2012/main" xmlns:ahyp="http://schemas.microsoft.com/office/drawing/2018/hyperlinkcolor" showMasterPhAnim="0" showMasterSp="0">
+<p:notes xmlns:a="http://schemas.openxmlformats.org/drawingml/2006/main" xmlns:r="http://schemas.openxmlformats.org/officeDocument/2006/relationships" xmlns:p="http://schemas.openxmlformats.org/presentationml/2006/main" showMasterSp="0" showMasterPhAnim="0">
   <p:cSld>
     <p:spTree>
       <p:nvGrpSpPr>
-        <p:cNvPr id="100" name="Shape 100"/>
+        <p:cNvPr id="1" name="Shape 100"/>
         <p:cNvGrpSpPr/>
         <p:nvPr/>
       </p:nvGrpSpPr>
@@ -1333,9 +1381,11 @@
       <p:sp>
         <p:nvSpPr>
           <p:cNvPr id="101" name="Google Shape;101;gb2f0a2a28c_0_51:notes"/>
-          <p:cNvSpPr/>
+          <p:cNvSpPr>
+            <a:spLocks noGrp="1" noRot="1" noChangeAspect="1"/>
+          </p:cNvSpPr>
           <p:nvPr>
-            <p:ph idx="2" type="sldImg"/>
+            <p:ph type="sldImg" idx="2"/>
           </p:nvPr>
         </p:nvSpPr>
         <p:spPr>
@@ -1344,9 +1394,13 @@
             <a:ext cx="6096000" cy="3429000"/>
           </a:xfrm>
           <a:custGeom>
-            <a:rect b="b" l="l" r="r" t="t"/>
+            <a:avLst/>
+            <a:gdLst/>
+            <a:ahLst/>
+            <a:cxnLst/>
+            <a:rect l="l" t="t" r="r" b="b"/>
             <a:pathLst>
-              <a:path extrusionOk="0" h="120000" w="120000">
+              <a:path w="120000" h="120000" extrusionOk="0">
                 <a:moveTo>
                   <a:pt x="0" y="0"/>
                 </a:moveTo>
@@ -1368,9 +1422,11 @@
       <p:sp>
         <p:nvSpPr>
           <p:cNvPr id="102" name="Google Shape;102;gb2f0a2a28c_0_51:notes"/>
-          <p:cNvSpPr txBox="1"/>
+          <p:cNvSpPr txBox="1">
+            <a:spLocks noGrp="1"/>
+          </p:cNvSpPr>
           <p:nvPr>
-            <p:ph idx="1" type="body"/>
+            <p:ph type="body" idx="1"/>
           </p:nvPr>
         </p:nvSpPr>
         <p:spPr>
@@ -1383,12 +1439,12 @@
           </a:prstGeom>
         </p:spPr>
         <p:txBody>
-          <a:bodyPr anchorCtr="0" anchor="t" bIns="91425" lIns="91425" spcFirstLastPara="1" rIns="91425" wrap="square" tIns="91425">
+          <a:bodyPr spcFirstLastPara="1" wrap="square" lIns="91425" tIns="91425" rIns="91425" bIns="91425" anchor="t" anchorCtr="0">
             <a:noAutofit/>
           </a:bodyPr>
           <a:lstStyle/>
           <a:p>
-            <a:pPr indent="0" lvl="0" marL="0" rtl="0" algn="l">
+            <a:pPr marL="0" lvl="0" indent="0" algn="l" rtl="0">
               <a:spcBef>
                 <a:spcPts val="0"/>
               </a:spcBef>
@@ -1425,11 +1481,11 @@
 </file>
 
 <file path=ppt/notesSlides/notesSlide8.xml><?xml version="1.0" encoding="utf-8"?>
-<p:notes xmlns:a="http://schemas.openxmlformats.org/drawingml/2006/main" xmlns:r="http://schemas.openxmlformats.org/officeDocument/2006/relationships" xmlns:mc="http://schemas.openxmlformats.org/markup-compatibility/2006" xmlns:mv="urn:schemas-microsoft-com:mac:vml" xmlns:p="http://schemas.openxmlformats.org/presentationml/2006/main" xmlns:c="http://schemas.openxmlformats.org/drawingml/2006/chart" xmlns:dgm="http://schemas.openxmlformats.org/drawingml/2006/diagram" xmlns:o="urn:schemas-microsoft-com:office:office" xmlns:v="urn:schemas-microsoft-com:vml" xmlns:pvml="urn:schemas-microsoft-com:office:powerpoint" xmlns:com="http://schemas.openxmlformats.org/drawingml/2006/compatibility" xmlns:p14="http://schemas.microsoft.com/office/powerpoint/2010/main" xmlns:p15="http://schemas.microsoft.com/office/powerpoint/2012/main" xmlns:ahyp="http://schemas.microsoft.com/office/drawing/2018/hyperlinkcolor" showMasterPhAnim="0" showMasterSp="0">
+<p:notes xmlns:a="http://schemas.openxmlformats.org/drawingml/2006/main" xmlns:r="http://schemas.openxmlformats.org/officeDocument/2006/relationships" xmlns:p="http://schemas.openxmlformats.org/presentationml/2006/main" showMasterSp="0" showMasterPhAnim="0">
   <p:cSld>
     <p:spTree>
       <p:nvGrpSpPr>
-        <p:cNvPr id="106" name="Shape 106"/>
+        <p:cNvPr id="1" name="Shape 106"/>
         <p:cNvGrpSpPr/>
         <p:nvPr/>
       </p:nvGrpSpPr>
@@ -1444,9 +1500,11 @@
       <p:sp>
         <p:nvSpPr>
           <p:cNvPr id="107" name="Google Shape;107;gb2f0a2a28c_0_57:notes"/>
-          <p:cNvSpPr/>
+          <p:cNvSpPr>
+            <a:spLocks noGrp="1" noRot="1" noChangeAspect="1"/>
+          </p:cNvSpPr>
           <p:nvPr>
-            <p:ph idx="2" type="sldImg"/>
+            <p:ph type="sldImg" idx="2"/>
           </p:nvPr>
         </p:nvSpPr>
         <p:spPr>
@@ -1455,9 +1513,13 @@
             <a:ext cx="6096000" cy="3429000"/>
           </a:xfrm>
           <a:custGeom>
-            <a:rect b="b" l="l" r="r" t="t"/>
+            <a:avLst/>
+            <a:gdLst/>
+            <a:ahLst/>
+            <a:cxnLst/>
+            <a:rect l="l" t="t" r="r" b="b"/>
             <a:pathLst>
-              <a:path extrusionOk="0" h="120000" w="120000">
+              <a:path w="120000" h="120000" extrusionOk="0">
                 <a:moveTo>
                   <a:pt x="0" y="0"/>
                 </a:moveTo>
@@ -1479,9 +1541,11 @@
       <p:sp>
         <p:nvSpPr>
           <p:cNvPr id="108" name="Google Shape;108;gb2f0a2a28c_0_57:notes"/>
-          <p:cNvSpPr txBox="1"/>
+          <p:cNvSpPr txBox="1">
+            <a:spLocks noGrp="1"/>
+          </p:cNvSpPr>
           <p:nvPr>
-            <p:ph idx="1" type="body"/>
+            <p:ph type="body" idx="1"/>
           </p:nvPr>
         </p:nvSpPr>
         <p:spPr>
@@ -1494,12 +1558,12 @@
           </a:prstGeom>
         </p:spPr>
         <p:txBody>
-          <a:bodyPr anchorCtr="0" anchor="t" bIns="91425" lIns="91425" spcFirstLastPara="1" rIns="91425" wrap="square" tIns="91425">
+          <a:bodyPr spcFirstLastPara="1" wrap="square" lIns="91425" tIns="91425" rIns="91425" bIns="91425" anchor="t" anchorCtr="0">
             <a:noAutofit/>
           </a:bodyPr>
           <a:lstStyle/>
           <a:p>
-            <a:pPr indent="0" lvl="0" marL="0" rtl="0" algn="l">
+            <a:pPr marL="0" lvl="0" indent="0" algn="l" rtl="0">
               <a:spcBef>
                 <a:spcPts val="0"/>
               </a:spcBef>
@@ -1508,9 +1572,6 @@
               </a:spcAft>
               <a:buNone/>
             </a:pPr>
-            <a:r>
-              <a:t/>
-            </a:r>
             <a:endParaRPr/>
           </a:p>
         </p:txBody>
@@ -1524,11 +1585,11 @@
 </file>
 
 <file path=ppt/slideLayouts/slideLayout1.xml><?xml version="1.0" encoding="utf-8"?>
-<p:sldLayout xmlns:a="http://schemas.openxmlformats.org/drawingml/2006/main" xmlns:r="http://schemas.openxmlformats.org/officeDocument/2006/relationships" xmlns:mc="http://schemas.openxmlformats.org/markup-compatibility/2006" xmlns:mv="urn:schemas-microsoft-com:mac:vml" xmlns:p="http://schemas.openxmlformats.org/presentationml/2006/main" xmlns:c="http://schemas.openxmlformats.org/drawingml/2006/chart" xmlns:dgm="http://schemas.openxmlformats.org/drawingml/2006/diagram" xmlns:o="urn:schemas-microsoft-com:office:office" xmlns:v="urn:schemas-microsoft-com:vml" xmlns:pvml="urn:schemas-microsoft-com:office:powerpoint" xmlns:com="http://schemas.openxmlformats.org/drawingml/2006/compatibility" xmlns:p14="http://schemas.microsoft.com/office/powerpoint/2010/main" xmlns:p15="http://schemas.microsoft.com/office/powerpoint/2012/main" xmlns:ahyp="http://schemas.microsoft.com/office/drawing/2018/hyperlinkcolor" matchingName="Title slide" type="title">
+<p:sldLayout xmlns:a="http://schemas.openxmlformats.org/drawingml/2006/main" xmlns:r="http://schemas.openxmlformats.org/officeDocument/2006/relationships" xmlns:p="http://schemas.openxmlformats.org/presentationml/2006/main" matchingName="Title slide" type="title">
   <p:cSld name="TITLE">
     <p:spTree>
       <p:nvGrpSpPr>
-        <p:cNvPr id="9" name="Shape 9"/>
+        <p:cNvPr id="1" name="Shape 9"/>
         <p:cNvGrpSpPr/>
         <p:nvPr/>
       </p:nvGrpSpPr>
@@ -1552,9 +1613,13 @@
             <a:ext cx="1081625" cy="1124950"/>
           </a:xfrm>
           <a:custGeom>
-            <a:rect b="b" l="l" r="r" t="t"/>
+            <a:avLst/>
+            <a:gdLst/>
+            <a:ahLst/>
+            <a:cxnLst/>
+            <a:rect l="l" t="t" r="r" b="b"/>
             <a:pathLst>
-              <a:path extrusionOk="0" h="44998" w="43265">
+              <a:path w="43265" h="44998" extrusionOk="0">
                 <a:moveTo>
                   <a:pt x="0" y="44998"/>
                 </a:moveTo>
@@ -1568,14 +1633,14 @@
             </a:pathLst>
           </a:custGeom>
           <a:noFill/>
-          <a:ln cap="flat" cmpd="sng" w="28575">
+          <a:ln w="28575" cap="flat" cmpd="sng">
             <a:solidFill>
               <a:schemeClr val="accent5"/>
             </a:solidFill>
             <a:prstDash val="solid"/>
             <a:miter lim="8000"/>
-            <a:headEnd len="sm" w="sm" type="none"/>
-            <a:tailEnd len="sm" w="sm" type="none"/>
+            <a:headEnd type="none" w="sm" len="sm"/>
+            <a:tailEnd type="none" w="sm" len="sm"/>
           </a:ln>
         </p:spPr>
       </p:sp>
@@ -1591,9 +1656,13 @@
             <a:ext cx="1081625" cy="1124950"/>
           </a:xfrm>
           <a:custGeom>
-            <a:rect b="b" l="l" r="r" t="t"/>
+            <a:avLst/>
+            <a:gdLst/>
+            <a:ahLst/>
+            <a:cxnLst/>
+            <a:rect l="l" t="t" r="r" b="b"/>
             <a:pathLst>
-              <a:path extrusionOk="0" h="44998" w="43265">
+              <a:path w="43265" h="44998" extrusionOk="0">
                 <a:moveTo>
                   <a:pt x="0" y="44998"/>
                 </a:moveTo>
@@ -1607,14 +1676,14 @@
             </a:pathLst>
           </a:custGeom>
           <a:noFill/>
-          <a:ln cap="flat" cmpd="sng" w="28575">
+          <a:ln w="28575" cap="flat" cmpd="sng">
             <a:solidFill>
               <a:schemeClr val="accent5"/>
             </a:solidFill>
             <a:prstDash val="solid"/>
             <a:miter lim="8000"/>
-            <a:headEnd len="sm" w="sm" type="none"/>
-            <a:tailEnd len="sm" w="sm" type="none"/>
+            <a:headEnd type="none" w="sm" len="sm"/>
+            <a:tailEnd type="none" w="sm" len="sm"/>
           </a:ln>
         </p:spPr>
       </p:sp>
@@ -1633,21 +1702,23 @@
             <a:avLst/>
           </a:prstGeom>
           <a:noFill/>
-          <a:ln cap="flat" cmpd="sng" w="38100">
+          <a:ln w="38100" cap="flat" cmpd="sng">
             <a:solidFill>
               <a:schemeClr val="accent4"/>
             </a:solidFill>
             <a:prstDash val="solid"/>
             <a:round/>
-            <a:headEnd len="sm" w="sm" type="none"/>
-            <a:tailEnd len="sm" w="sm" type="none"/>
+            <a:headEnd type="none" w="sm" len="sm"/>
+            <a:tailEnd type="none" w="sm" len="sm"/>
           </a:ln>
         </p:spPr>
       </p:cxnSp>
       <p:sp>
         <p:nvSpPr>
           <p:cNvPr id="13" name="Google Shape;13;p2"/>
-          <p:cNvSpPr txBox="1"/>
+          <p:cNvSpPr txBox="1">
+            <a:spLocks noGrp="1"/>
+          </p:cNvSpPr>
           <p:nvPr>
             <p:ph type="ctrTitle"/>
           </p:nvPr>
@@ -1662,7 +1733,7 @@
           </a:prstGeom>
         </p:spPr>
         <p:txBody>
-          <a:bodyPr anchorCtr="0" anchor="b" bIns="91425" lIns="91425" spcFirstLastPara="1" rIns="91425" wrap="square" tIns="91425">
+          <a:bodyPr spcFirstLastPara="1" wrap="square" lIns="91425" tIns="91425" rIns="91425" bIns="91425" anchor="b" anchorCtr="0">
             <a:noAutofit/>
           </a:bodyPr>
           <a:lstStyle>
@@ -1766,15 +1837,19 @@
               <a:defRPr sz="4000"/>
             </a:lvl9pPr>
           </a:lstStyle>
-          <a:p/>
+          <a:p>
+            <a:endParaRPr/>
+          </a:p>
         </p:txBody>
       </p:sp>
       <p:sp>
         <p:nvSpPr>
           <p:cNvPr id="14" name="Google Shape;14;p2"/>
-          <p:cNvSpPr txBox="1"/>
+          <p:cNvSpPr txBox="1">
+            <a:spLocks noGrp="1"/>
+          </p:cNvSpPr>
           <p:nvPr>
-            <p:ph idx="1" type="subTitle"/>
+            <p:ph type="subTitle" idx="1"/>
           </p:nvPr>
         </p:nvSpPr>
         <p:spPr>
@@ -1787,7 +1862,7 @@
           </a:prstGeom>
         </p:spPr>
         <p:txBody>
-          <a:bodyPr anchorCtr="0" anchor="t" bIns="91425" lIns="91425" spcFirstLastPara="1" rIns="91425" wrap="square" tIns="91425">
+          <a:bodyPr spcFirstLastPara="1" wrap="square" lIns="91425" tIns="91425" rIns="91425" bIns="91425" anchor="t" anchorCtr="0">
             <a:noAutofit/>
           </a:bodyPr>
           <a:lstStyle>
@@ -2026,15 +2101,19 @@
               </a:defRPr>
             </a:lvl9pPr>
           </a:lstStyle>
-          <a:p/>
+          <a:p>
+            <a:endParaRPr/>
+          </a:p>
         </p:txBody>
       </p:sp>
       <p:sp>
         <p:nvSpPr>
           <p:cNvPr id="15" name="Google Shape;15;p2"/>
-          <p:cNvSpPr txBox="1"/>
+          <p:cNvSpPr txBox="1">
+            <a:spLocks noGrp="1"/>
+          </p:cNvSpPr>
           <p:nvPr>
-            <p:ph idx="12" type="sldNum"/>
+            <p:ph type="sldNum" idx="12"/>
           </p:nvPr>
         </p:nvSpPr>
         <p:spPr>
@@ -2047,7 +2126,7 @@
           </a:prstGeom>
         </p:spPr>
         <p:txBody>
-          <a:bodyPr anchorCtr="0" anchor="ctr" bIns="91425" lIns="91425" spcFirstLastPara="1" rIns="91425" wrap="square" tIns="91425">
+          <a:bodyPr spcFirstLastPara="1" wrap="square" lIns="91425" tIns="91425" rIns="91425" bIns="91425" anchor="ctr" anchorCtr="0">
             <a:noAutofit/>
           </a:bodyPr>
           <a:lstStyle>
@@ -2089,7 +2168,7 @@
             </a:lvl9pPr>
           </a:lstStyle>
           <a:p>
-            <a:pPr indent="0" lvl="0" marL="0" rtl="0" algn="r">
+            <a:pPr marL="0" lvl="0" indent="0" algn="r" rtl="0">
               <a:spcBef>
                 <a:spcPts val="0"/>
               </a:spcBef>
@@ -2115,11 +2194,11 @@
 </file>
 
 <file path=ppt/slideLayouts/slideLayout10.xml><?xml version="1.0" encoding="utf-8"?>
-<p:sldLayout xmlns:a="http://schemas.openxmlformats.org/drawingml/2006/main" xmlns:r="http://schemas.openxmlformats.org/officeDocument/2006/relationships" xmlns:mc="http://schemas.openxmlformats.org/markup-compatibility/2006" xmlns:mv="urn:schemas-microsoft-com:mac:vml" xmlns:p="http://schemas.openxmlformats.org/presentationml/2006/main" xmlns:c="http://schemas.openxmlformats.org/drawingml/2006/chart" xmlns:dgm="http://schemas.openxmlformats.org/drawingml/2006/diagram" xmlns:o="urn:schemas-microsoft-com:office:office" xmlns:v="urn:schemas-microsoft-com:vml" xmlns:pvml="urn:schemas-microsoft-com:office:powerpoint" xmlns:com="http://schemas.openxmlformats.org/drawingml/2006/compatibility" xmlns:p14="http://schemas.microsoft.com/office/powerpoint/2010/main" xmlns:p15="http://schemas.microsoft.com/office/powerpoint/2012/main" xmlns:ahyp="http://schemas.microsoft.com/office/drawing/2018/hyperlinkcolor" matchingName="Big number">
+<p:sldLayout xmlns:a="http://schemas.openxmlformats.org/drawingml/2006/main" xmlns:r="http://schemas.openxmlformats.org/officeDocument/2006/relationships" xmlns:p="http://schemas.openxmlformats.org/presentationml/2006/main" matchingName="Big number">
   <p:cSld name="BIG_NUMBER">
     <p:spTree>
       <p:nvGrpSpPr>
-        <p:cNvPr id="52" name="Shape 52"/>
+        <p:cNvPr id="1" name="Shape 52"/>
         <p:cNvGrpSpPr/>
         <p:nvPr/>
       </p:nvGrpSpPr>
@@ -2153,12 +2232,12 @@
           </a:ln>
         </p:spPr>
         <p:txBody>
-          <a:bodyPr anchorCtr="0" anchor="ctr" bIns="91425" lIns="91425" spcFirstLastPara="1" rIns="91425" wrap="square" tIns="91425">
+          <a:bodyPr spcFirstLastPara="1" wrap="square" lIns="91425" tIns="91425" rIns="91425" bIns="91425" anchor="ctr" anchorCtr="0">
             <a:noAutofit/>
           </a:bodyPr>
           <a:lstStyle/>
           <a:p>
-            <a:pPr indent="0" lvl="0" marL="0" rtl="0" algn="l">
+            <a:pPr marL="0" lvl="0" indent="0" algn="l" rtl="0">
               <a:spcBef>
                 <a:spcPts val="0"/>
               </a:spcBef>
@@ -2167,9 +2246,6 @@
               </a:spcAft>
               <a:buNone/>
             </a:pPr>
-            <a:r>
-              <a:t/>
-            </a:r>
             <a:endParaRPr/>
           </a:p>
         </p:txBody>
@@ -2177,9 +2253,11 @@
       <p:sp>
         <p:nvSpPr>
           <p:cNvPr id="54" name="Google Shape;54;p11"/>
-          <p:cNvSpPr txBox="1"/>
+          <p:cNvSpPr txBox="1">
+            <a:spLocks noGrp="1"/>
+          </p:cNvSpPr>
           <p:nvPr>
-            <p:ph hasCustomPrompt="1" type="title"/>
+            <p:ph type="title" hasCustomPrompt="1"/>
           </p:nvPr>
         </p:nvSpPr>
         <p:spPr>
@@ -2192,7 +2270,7 @@
           </a:prstGeom>
         </p:spPr>
         <p:txBody>
-          <a:bodyPr anchorCtr="0" anchor="ctr" bIns="91425" lIns="91425" spcFirstLastPara="1" rIns="91425" wrap="square" tIns="91425">
+          <a:bodyPr spcFirstLastPara="1" wrap="square" lIns="91425" tIns="91425" rIns="91425" bIns="91425" anchor="ctr" anchorCtr="0">
             <a:noAutofit/>
           </a:bodyPr>
           <a:lstStyle>
@@ -2369,9 +2447,11 @@
       <p:sp>
         <p:nvSpPr>
           <p:cNvPr id="55" name="Google Shape;55;p11"/>
-          <p:cNvSpPr txBox="1"/>
+          <p:cNvSpPr txBox="1">
+            <a:spLocks noGrp="1"/>
+          </p:cNvSpPr>
           <p:nvPr>
-            <p:ph idx="1" type="body"/>
+            <p:ph type="body" idx="1"/>
           </p:nvPr>
         </p:nvSpPr>
         <p:spPr>
@@ -2384,11 +2464,11 @@
           </a:prstGeom>
         </p:spPr>
         <p:txBody>
-          <a:bodyPr anchorCtr="0" anchor="t" bIns="91425" lIns="91425" spcFirstLastPara="1" rIns="91425" wrap="square" tIns="91425">
+          <a:bodyPr spcFirstLastPara="1" wrap="square" lIns="91425" tIns="91425" rIns="91425" bIns="91425" anchor="t" anchorCtr="0">
             <a:noAutofit/>
           </a:bodyPr>
           <a:lstStyle>
-            <a:lvl1pPr indent="-342900" lvl="0" marL="457200" algn="ctr">
+            <a:lvl1pPr marL="457200" lvl="0" indent="-342900" algn="ctr">
               <a:spcBef>
                 <a:spcPts val="0"/>
               </a:spcBef>
@@ -2399,7 +2479,7 @@
               <a:buChar char="●"/>
               <a:defRPr/>
             </a:lvl1pPr>
-            <a:lvl2pPr indent="-317500" lvl="1" marL="914400" algn="ctr">
+            <a:lvl2pPr marL="914400" lvl="1" indent="-317500" algn="ctr">
               <a:spcBef>
                 <a:spcPts val="1600"/>
               </a:spcBef>
@@ -2410,7 +2490,7 @@
               <a:buChar char="○"/>
               <a:defRPr/>
             </a:lvl2pPr>
-            <a:lvl3pPr indent="-317500" lvl="2" marL="1371600" algn="ctr">
+            <a:lvl3pPr marL="1371600" lvl="2" indent="-317500" algn="ctr">
               <a:spcBef>
                 <a:spcPts val="1600"/>
               </a:spcBef>
@@ -2421,7 +2501,7 @@
               <a:buChar char="■"/>
               <a:defRPr/>
             </a:lvl3pPr>
-            <a:lvl4pPr indent="-317500" lvl="3" marL="1828800" algn="ctr">
+            <a:lvl4pPr marL="1828800" lvl="3" indent="-317500" algn="ctr">
               <a:spcBef>
                 <a:spcPts val="1600"/>
               </a:spcBef>
@@ -2432,7 +2512,7 @@
               <a:buChar char="●"/>
               <a:defRPr/>
             </a:lvl4pPr>
-            <a:lvl5pPr indent="-317500" lvl="4" marL="2286000" algn="ctr">
+            <a:lvl5pPr marL="2286000" lvl="4" indent="-317500" algn="ctr">
               <a:spcBef>
                 <a:spcPts val="1600"/>
               </a:spcBef>
@@ -2443,7 +2523,7 @@
               <a:buChar char="○"/>
               <a:defRPr/>
             </a:lvl5pPr>
-            <a:lvl6pPr indent="-317500" lvl="5" marL="2743200" algn="ctr">
+            <a:lvl6pPr marL="2743200" lvl="5" indent="-317500" algn="ctr">
               <a:spcBef>
                 <a:spcPts val="1600"/>
               </a:spcBef>
@@ -2454,7 +2534,7 @@
               <a:buChar char="■"/>
               <a:defRPr/>
             </a:lvl6pPr>
-            <a:lvl7pPr indent="-317500" lvl="6" marL="3200400" algn="ctr">
+            <a:lvl7pPr marL="3200400" lvl="6" indent="-317500" algn="ctr">
               <a:spcBef>
                 <a:spcPts val="1600"/>
               </a:spcBef>
@@ -2465,7 +2545,7 @@
               <a:buChar char="●"/>
               <a:defRPr/>
             </a:lvl7pPr>
-            <a:lvl8pPr indent="-317500" lvl="7" marL="3657600" algn="ctr">
+            <a:lvl8pPr marL="3657600" lvl="7" indent="-317500" algn="ctr">
               <a:spcBef>
                 <a:spcPts val="1600"/>
               </a:spcBef>
@@ -2476,7 +2556,7 @@
               <a:buChar char="○"/>
               <a:defRPr/>
             </a:lvl8pPr>
-            <a:lvl9pPr indent="-317500" lvl="8" marL="4114800" algn="ctr">
+            <a:lvl9pPr marL="4114800" lvl="8" indent="-317500" algn="ctr">
               <a:spcBef>
                 <a:spcPts val="1600"/>
               </a:spcBef>
@@ -2488,15 +2568,19 @@
               <a:defRPr/>
             </a:lvl9pPr>
           </a:lstStyle>
-          <a:p/>
+          <a:p>
+            <a:endParaRPr/>
+          </a:p>
         </p:txBody>
       </p:sp>
       <p:sp>
         <p:nvSpPr>
           <p:cNvPr id="56" name="Google Shape;56;p11"/>
-          <p:cNvSpPr txBox="1"/>
+          <p:cNvSpPr txBox="1">
+            <a:spLocks noGrp="1"/>
+          </p:cNvSpPr>
           <p:nvPr>
-            <p:ph idx="12" type="sldNum"/>
+            <p:ph type="sldNum" idx="12"/>
           </p:nvPr>
         </p:nvSpPr>
         <p:spPr>
@@ -2509,7 +2593,7 @@
           </a:prstGeom>
         </p:spPr>
         <p:txBody>
-          <a:bodyPr anchorCtr="0" anchor="ctr" bIns="91425" lIns="91425" spcFirstLastPara="1" rIns="91425" wrap="square" tIns="91425">
+          <a:bodyPr spcFirstLastPara="1" wrap="square" lIns="91425" tIns="91425" rIns="91425" bIns="91425" anchor="ctr" anchorCtr="0">
             <a:noAutofit/>
           </a:bodyPr>
           <a:lstStyle>
@@ -2551,7 +2635,7 @@
             </a:lvl9pPr>
           </a:lstStyle>
           <a:p>
-            <a:pPr indent="0" lvl="0" marL="0" rtl="0" algn="r">
+            <a:pPr marL="0" lvl="0" indent="0" algn="r" rtl="0">
               <a:spcBef>
                 <a:spcPts val="0"/>
               </a:spcBef>
@@ -2577,11 +2661,11 @@
 </file>
 
 <file path=ppt/slideLayouts/slideLayout11.xml><?xml version="1.0" encoding="utf-8"?>
-<p:sldLayout xmlns:a="http://schemas.openxmlformats.org/drawingml/2006/main" xmlns:r="http://schemas.openxmlformats.org/officeDocument/2006/relationships" xmlns:mc="http://schemas.openxmlformats.org/markup-compatibility/2006" xmlns:mv="urn:schemas-microsoft-com:mac:vml" xmlns:p="http://schemas.openxmlformats.org/presentationml/2006/main" xmlns:c="http://schemas.openxmlformats.org/drawingml/2006/chart" xmlns:dgm="http://schemas.openxmlformats.org/drawingml/2006/diagram" xmlns:o="urn:schemas-microsoft-com:office:office" xmlns:v="urn:schemas-microsoft-com:vml" xmlns:pvml="urn:schemas-microsoft-com:office:powerpoint" xmlns:com="http://schemas.openxmlformats.org/drawingml/2006/compatibility" xmlns:p14="http://schemas.microsoft.com/office/powerpoint/2010/main" xmlns:p15="http://schemas.microsoft.com/office/powerpoint/2012/main" xmlns:ahyp="http://schemas.microsoft.com/office/drawing/2018/hyperlinkcolor" matchingName="Blank" type="blank">
+<p:sldLayout xmlns:a="http://schemas.openxmlformats.org/drawingml/2006/main" xmlns:r="http://schemas.openxmlformats.org/officeDocument/2006/relationships" xmlns:p="http://schemas.openxmlformats.org/presentationml/2006/main" matchingName="Blank" type="blank">
   <p:cSld name="BLANK">
     <p:spTree>
       <p:nvGrpSpPr>
-        <p:cNvPr id="57" name="Shape 57"/>
+        <p:cNvPr id="1" name="Shape 57"/>
         <p:cNvGrpSpPr/>
         <p:nvPr/>
       </p:nvGrpSpPr>
@@ -2596,9 +2680,11 @@
       <p:sp>
         <p:nvSpPr>
           <p:cNvPr id="58" name="Google Shape;58;p12"/>
-          <p:cNvSpPr txBox="1"/>
+          <p:cNvSpPr txBox="1">
+            <a:spLocks noGrp="1"/>
+          </p:cNvSpPr>
           <p:nvPr>
-            <p:ph idx="12" type="sldNum"/>
+            <p:ph type="sldNum" idx="12"/>
           </p:nvPr>
         </p:nvSpPr>
         <p:spPr>
@@ -2611,7 +2697,7 @@
           </a:prstGeom>
         </p:spPr>
         <p:txBody>
-          <a:bodyPr anchorCtr="0" anchor="ctr" bIns="91425" lIns="91425" spcFirstLastPara="1" rIns="91425" wrap="square" tIns="91425">
+          <a:bodyPr spcFirstLastPara="1" wrap="square" lIns="91425" tIns="91425" rIns="91425" bIns="91425" anchor="ctr" anchorCtr="0">
             <a:noAutofit/>
           </a:bodyPr>
           <a:lstStyle>
@@ -2653,7 +2739,7 @@
             </a:lvl9pPr>
           </a:lstStyle>
           <a:p>
-            <a:pPr indent="0" lvl="0" marL="0" rtl="0" algn="r">
+            <a:pPr marL="0" lvl="0" indent="0" algn="r" rtl="0">
               <a:spcBef>
                 <a:spcPts val="0"/>
               </a:spcBef>
@@ -2679,11 +2765,11 @@
 </file>
 
 <file path=ppt/slideLayouts/slideLayout2.xml><?xml version="1.0" encoding="utf-8"?>
-<p:sldLayout xmlns:a="http://schemas.openxmlformats.org/drawingml/2006/main" xmlns:r="http://schemas.openxmlformats.org/officeDocument/2006/relationships" xmlns:mc="http://schemas.openxmlformats.org/markup-compatibility/2006" xmlns:mv="urn:schemas-microsoft-com:mac:vml" xmlns:p="http://schemas.openxmlformats.org/presentationml/2006/main" xmlns:c="http://schemas.openxmlformats.org/drawingml/2006/chart" xmlns:dgm="http://schemas.openxmlformats.org/drawingml/2006/diagram" xmlns:o="urn:schemas-microsoft-com:office:office" xmlns:v="urn:schemas-microsoft-com:vml" xmlns:pvml="urn:schemas-microsoft-com:office:powerpoint" xmlns:com="http://schemas.openxmlformats.org/drawingml/2006/compatibility" xmlns:p14="http://schemas.microsoft.com/office/powerpoint/2010/main" xmlns:p15="http://schemas.microsoft.com/office/powerpoint/2012/main" xmlns:ahyp="http://schemas.microsoft.com/office/drawing/2018/hyperlinkcolor" matchingName="Section header" type="secHead">
+<p:sldLayout xmlns:a="http://schemas.openxmlformats.org/drawingml/2006/main" xmlns:r="http://schemas.openxmlformats.org/officeDocument/2006/relationships" xmlns:p="http://schemas.openxmlformats.org/presentationml/2006/main" matchingName="Section header" type="secHead">
   <p:cSld name="SECTION_HEADER">
     <p:spTree>
       <p:nvGrpSpPr>
-        <p:cNvPr id="16" name="Shape 16"/>
+        <p:cNvPr id="1" name="Shape 16"/>
         <p:cNvGrpSpPr/>
         <p:nvPr/>
       </p:nvGrpSpPr>
@@ -2710,21 +2796,23 @@
             <a:avLst/>
           </a:prstGeom>
           <a:noFill/>
-          <a:ln cap="flat" cmpd="sng" w="38100">
+          <a:ln w="38100" cap="flat" cmpd="sng">
             <a:solidFill>
               <a:schemeClr val="accent4"/>
             </a:solidFill>
             <a:prstDash val="solid"/>
             <a:round/>
-            <a:headEnd len="sm" w="sm" type="none"/>
-            <a:tailEnd len="sm" w="sm" type="none"/>
+            <a:headEnd type="none" w="sm" len="sm"/>
+            <a:tailEnd type="none" w="sm" len="sm"/>
           </a:ln>
         </p:spPr>
       </p:cxnSp>
       <p:sp>
         <p:nvSpPr>
           <p:cNvPr id="18" name="Google Shape;18;p3"/>
-          <p:cNvSpPr txBox="1"/>
+          <p:cNvSpPr txBox="1">
+            <a:spLocks noGrp="1"/>
+          </p:cNvSpPr>
           <p:nvPr>
             <p:ph type="title"/>
           </p:nvPr>
@@ -2739,7 +2827,7 @@
           </a:prstGeom>
         </p:spPr>
         <p:txBody>
-          <a:bodyPr anchorCtr="0" anchor="b" bIns="91425" lIns="91425" spcFirstLastPara="1" rIns="91425" wrap="square" tIns="91425">
+          <a:bodyPr spcFirstLastPara="1" wrap="square" lIns="91425" tIns="91425" rIns="91425" bIns="91425" anchor="b" anchorCtr="0">
             <a:noAutofit/>
           </a:bodyPr>
           <a:lstStyle>
@@ -2843,15 +2931,19 @@
               <a:defRPr sz="4800"/>
             </a:lvl9pPr>
           </a:lstStyle>
-          <a:p/>
+          <a:p>
+            <a:endParaRPr/>
+          </a:p>
         </p:txBody>
       </p:sp>
       <p:sp>
         <p:nvSpPr>
           <p:cNvPr id="19" name="Google Shape;19;p3"/>
-          <p:cNvSpPr txBox="1"/>
+          <p:cNvSpPr txBox="1">
+            <a:spLocks noGrp="1"/>
+          </p:cNvSpPr>
           <p:nvPr>
-            <p:ph idx="12" type="sldNum"/>
+            <p:ph type="sldNum" idx="12"/>
           </p:nvPr>
         </p:nvSpPr>
         <p:spPr>
@@ -2864,7 +2956,7 @@
           </a:prstGeom>
         </p:spPr>
         <p:txBody>
-          <a:bodyPr anchorCtr="0" anchor="ctr" bIns="91425" lIns="91425" spcFirstLastPara="1" rIns="91425" wrap="square" tIns="91425">
+          <a:bodyPr spcFirstLastPara="1" wrap="square" lIns="91425" tIns="91425" rIns="91425" bIns="91425" anchor="ctr" anchorCtr="0">
             <a:noAutofit/>
           </a:bodyPr>
           <a:lstStyle>
@@ -2906,7 +2998,7 @@
             </a:lvl9pPr>
           </a:lstStyle>
           <a:p>
-            <a:pPr indent="0" lvl="0" marL="0" rtl="0" algn="r">
+            <a:pPr marL="0" lvl="0" indent="0" algn="r" rtl="0">
               <a:spcBef>
                 <a:spcPts val="0"/>
               </a:spcBef>
@@ -2932,11 +3024,11 @@
 </file>
 
 <file path=ppt/slideLayouts/slideLayout3.xml><?xml version="1.0" encoding="utf-8"?>
-<p:sldLayout xmlns:a="http://schemas.openxmlformats.org/drawingml/2006/main" xmlns:r="http://schemas.openxmlformats.org/officeDocument/2006/relationships" xmlns:mc="http://schemas.openxmlformats.org/markup-compatibility/2006" xmlns:mv="urn:schemas-microsoft-com:mac:vml" xmlns:p="http://schemas.openxmlformats.org/presentationml/2006/main" xmlns:c="http://schemas.openxmlformats.org/drawingml/2006/chart" xmlns:dgm="http://schemas.openxmlformats.org/drawingml/2006/diagram" xmlns:o="urn:schemas-microsoft-com:office:office" xmlns:v="urn:schemas-microsoft-com:vml" xmlns:pvml="urn:schemas-microsoft-com:office:powerpoint" xmlns:com="http://schemas.openxmlformats.org/drawingml/2006/compatibility" xmlns:p14="http://schemas.microsoft.com/office/powerpoint/2010/main" xmlns:p15="http://schemas.microsoft.com/office/powerpoint/2012/main" xmlns:ahyp="http://schemas.microsoft.com/office/drawing/2018/hyperlinkcolor" matchingName="Title and body" type="tx">
+<p:sldLayout xmlns:a="http://schemas.openxmlformats.org/drawingml/2006/main" xmlns:r="http://schemas.openxmlformats.org/officeDocument/2006/relationships" xmlns:p="http://schemas.openxmlformats.org/presentationml/2006/main" matchingName="Title and body" type="tx">
   <p:cSld name="TITLE_AND_BODY">
     <p:spTree>
       <p:nvGrpSpPr>
-        <p:cNvPr id="20" name="Shape 20"/>
+        <p:cNvPr id="1" name="Shape 20"/>
         <p:cNvGrpSpPr/>
         <p:nvPr/>
       </p:nvGrpSpPr>
@@ -2963,21 +3055,23 @@
             <a:avLst/>
           </a:prstGeom>
           <a:noFill/>
-          <a:ln cap="flat" cmpd="sng" w="38100">
+          <a:ln w="38100" cap="flat" cmpd="sng">
             <a:solidFill>
               <a:schemeClr val="accent4"/>
             </a:solidFill>
             <a:prstDash val="solid"/>
             <a:round/>
-            <a:headEnd len="sm" w="sm" type="none"/>
-            <a:tailEnd len="sm" w="sm" type="none"/>
+            <a:headEnd type="none" w="sm" len="sm"/>
+            <a:tailEnd type="none" w="sm" len="sm"/>
           </a:ln>
         </p:spPr>
       </p:cxnSp>
       <p:sp>
         <p:nvSpPr>
           <p:cNvPr id="22" name="Google Shape;22;p4"/>
-          <p:cNvSpPr txBox="1"/>
+          <p:cNvSpPr txBox="1">
+            <a:spLocks noGrp="1"/>
+          </p:cNvSpPr>
           <p:nvPr>
             <p:ph type="title"/>
           </p:nvPr>
@@ -2992,7 +3086,7 @@
           </a:prstGeom>
         </p:spPr>
         <p:txBody>
-          <a:bodyPr anchorCtr="0" anchor="b" bIns="91425" lIns="91425" spcFirstLastPara="1" rIns="91425" wrap="square" tIns="91425">
+          <a:bodyPr spcFirstLastPara="1" wrap="square" lIns="91425" tIns="91425" rIns="91425" bIns="91425" anchor="b" anchorCtr="0">
             <a:noAutofit/>
           </a:bodyPr>
           <a:lstStyle>
@@ -3096,15 +3190,19 @@
               <a:defRPr/>
             </a:lvl9pPr>
           </a:lstStyle>
-          <a:p/>
+          <a:p>
+            <a:endParaRPr/>
+          </a:p>
         </p:txBody>
       </p:sp>
       <p:sp>
         <p:nvSpPr>
           <p:cNvPr id="23" name="Google Shape;23;p4"/>
-          <p:cNvSpPr txBox="1"/>
+          <p:cNvSpPr txBox="1">
+            <a:spLocks noGrp="1"/>
+          </p:cNvSpPr>
           <p:nvPr>
-            <p:ph idx="1" type="body"/>
+            <p:ph type="body" idx="1"/>
           </p:nvPr>
         </p:nvSpPr>
         <p:spPr>
@@ -3117,11 +3215,11 @@
           </a:prstGeom>
         </p:spPr>
         <p:txBody>
-          <a:bodyPr anchorCtr="0" anchor="t" bIns="91425" lIns="91425" spcFirstLastPara="1" rIns="91425" wrap="square" tIns="91425">
+          <a:bodyPr spcFirstLastPara="1" wrap="square" lIns="91425" tIns="91425" rIns="91425" bIns="91425" anchor="t" anchorCtr="0">
             <a:noAutofit/>
           </a:bodyPr>
           <a:lstStyle>
-            <a:lvl1pPr indent="-342900" lvl="0" marL="457200">
+            <a:lvl1pPr marL="457200" lvl="0" indent="-342900">
               <a:spcBef>
                 <a:spcPts val="0"/>
               </a:spcBef>
@@ -3132,7 +3230,7 @@
               <a:buChar char="●"/>
               <a:defRPr/>
             </a:lvl1pPr>
-            <a:lvl2pPr indent="-317500" lvl="1" marL="914400">
+            <a:lvl2pPr marL="914400" lvl="1" indent="-317500">
               <a:spcBef>
                 <a:spcPts val="1600"/>
               </a:spcBef>
@@ -3143,7 +3241,7 @@
               <a:buChar char="○"/>
               <a:defRPr/>
             </a:lvl2pPr>
-            <a:lvl3pPr indent="-317500" lvl="2" marL="1371600">
+            <a:lvl3pPr marL="1371600" lvl="2" indent="-317500">
               <a:spcBef>
                 <a:spcPts val="1600"/>
               </a:spcBef>
@@ -3154,7 +3252,7 @@
               <a:buChar char="■"/>
               <a:defRPr/>
             </a:lvl3pPr>
-            <a:lvl4pPr indent="-317500" lvl="3" marL="1828800">
+            <a:lvl4pPr marL="1828800" lvl="3" indent="-317500">
               <a:spcBef>
                 <a:spcPts val="1600"/>
               </a:spcBef>
@@ -3165,7 +3263,7 @@
               <a:buChar char="●"/>
               <a:defRPr/>
             </a:lvl4pPr>
-            <a:lvl5pPr indent="-317500" lvl="4" marL="2286000">
+            <a:lvl5pPr marL="2286000" lvl="4" indent="-317500">
               <a:spcBef>
                 <a:spcPts val="1600"/>
               </a:spcBef>
@@ -3176,7 +3274,7 @@
               <a:buChar char="○"/>
               <a:defRPr/>
             </a:lvl5pPr>
-            <a:lvl6pPr indent="-317500" lvl="5" marL="2743200">
+            <a:lvl6pPr marL="2743200" lvl="5" indent="-317500">
               <a:spcBef>
                 <a:spcPts val="1600"/>
               </a:spcBef>
@@ -3187,7 +3285,7 @@
               <a:buChar char="■"/>
               <a:defRPr/>
             </a:lvl6pPr>
-            <a:lvl7pPr indent="-317500" lvl="6" marL="3200400">
+            <a:lvl7pPr marL="3200400" lvl="6" indent="-317500">
               <a:spcBef>
                 <a:spcPts val="1600"/>
               </a:spcBef>
@@ -3198,7 +3296,7 @@
               <a:buChar char="●"/>
               <a:defRPr/>
             </a:lvl7pPr>
-            <a:lvl8pPr indent="-317500" lvl="7" marL="3657600">
+            <a:lvl8pPr marL="3657600" lvl="7" indent="-317500">
               <a:spcBef>
                 <a:spcPts val="1600"/>
               </a:spcBef>
@@ -3209,7 +3307,7 @@
               <a:buChar char="○"/>
               <a:defRPr/>
             </a:lvl8pPr>
-            <a:lvl9pPr indent="-317500" lvl="8" marL="4114800">
+            <a:lvl9pPr marL="4114800" lvl="8" indent="-317500">
               <a:spcBef>
                 <a:spcPts val="1600"/>
               </a:spcBef>
@@ -3221,15 +3319,19 @@
               <a:defRPr/>
             </a:lvl9pPr>
           </a:lstStyle>
-          <a:p/>
+          <a:p>
+            <a:endParaRPr/>
+          </a:p>
         </p:txBody>
       </p:sp>
       <p:sp>
         <p:nvSpPr>
           <p:cNvPr id="24" name="Google Shape;24;p4"/>
-          <p:cNvSpPr txBox="1"/>
+          <p:cNvSpPr txBox="1">
+            <a:spLocks noGrp="1"/>
+          </p:cNvSpPr>
           <p:nvPr>
-            <p:ph idx="12" type="sldNum"/>
+            <p:ph type="sldNum" idx="12"/>
           </p:nvPr>
         </p:nvSpPr>
         <p:spPr>
@@ -3242,7 +3344,7 @@
           </a:prstGeom>
         </p:spPr>
         <p:txBody>
-          <a:bodyPr anchorCtr="0" anchor="ctr" bIns="91425" lIns="91425" spcFirstLastPara="1" rIns="91425" wrap="square" tIns="91425">
+          <a:bodyPr spcFirstLastPara="1" wrap="square" lIns="91425" tIns="91425" rIns="91425" bIns="91425" anchor="ctr" anchorCtr="0">
             <a:noAutofit/>
           </a:bodyPr>
           <a:lstStyle>
@@ -3284,7 +3386,7 @@
             </a:lvl9pPr>
           </a:lstStyle>
           <a:p>
-            <a:pPr indent="0" lvl="0" marL="0" rtl="0" algn="r">
+            <a:pPr marL="0" lvl="0" indent="0" algn="r" rtl="0">
               <a:spcBef>
                 <a:spcPts val="0"/>
               </a:spcBef>
@@ -3310,11 +3412,11 @@
 </file>
 
 <file path=ppt/slideLayouts/slideLayout4.xml><?xml version="1.0" encoding="utf-8"?>
-<p:sldLayout xmlns:a="http://schemas.openxmlformats.org/drawingml/2006/main" xmlns:r="http://schemas.openxmlformats.org/officeDocument/2006/relationships" xmlns:mc="http://schemas.openxmlformats.org/markup-compatibility/2006" xmlns:mv="urn:schemas-microsoft-com:mac:vml" xmlns:p="http://schemas.openxmlformats.org/presentationml/2006/main" xmlns:c="http://schemas.openxmlformats.org/drawingml/2006/chart" xmlns:dgm="http://schemas.openxmlformats.org/drawingml/2006/diagram" xmlns:o="urn:schemas-microsoft-com:office:office" xmlns:v="urn:schemas-microsoft-com:vml" xmlns:pvml="urn:schemas-microsoft-com:office:powerpoint" xmlns:com="http://schemas.openxmlformats.org/drawingml/2006/compatibility" xmlns:p14="http://schemas.microsoft.com/office/powerpoint/2010/main" xmlns:p15="http://schemas.microsoft.com/office/powerpoint/2012/main" xmlns:ahyp="http://schemas.microsoft.com/office/drawing/2018/hyperlinkcolor" matchingName="Title and two columns" type="twoColTx">
+<p:sldLayout xmlns:a="http://schemas.openxmlformats.org/drawingml/2006/main" xmlns:r="http://schemas.openxmlformats.org/officeDocument/2006/relationships" xmlns:p="http://schemas.openxmlformats.org/presentationml/2006/main" matchingName="Title and two columns" type="twoColTx">
   <p:cSld name="TITLE_AND_TWO_COLUMNS">
     <p:spTree>
       <p:nvGrpSpPr>
-        <p:cNvPr id="25" name="Shape 25"/>
+        <p:cNvPr id="1" name="Shape 25"/>
         <p:cNvGrpSpPr/>
         <p:nvPr/>
       </p:nvGrpSpPr>
@@ -3341,21 +3443,23 @@
             <a:avLst/>
           </a:prstGeom>
           <a:noFill/>
-          <a:ln cap="flat" cmpd="sng" w="38100">
+          <a:ln w="38100" cap="flat" cmpd="sng">
             <a:solidFill>
               <a:schemeClr val="accent4"/>
             </a:solidFill>
             <a:prstDash val="solid"/>
             <a:round/>
-            <a:headEnd len="sm" w="sm" type="none"/>
-            <a:tailEnd len="sm" w="sm" type="none"/>
+            <a:headEnd type="none" w="sm" len="sm"/>
+            <a:tailEnd type="none" w="sm" len="sm"/>
           </a:ln>
         </p:spPr>
       </p:cxnSp>
       <p:sp>
         <p:nvSpPr>
           <p:cNvPr id="27" name="Google Shape;27;p5"/>
-          <p:cNvSpPr txBox="1"/>
+          <p:cNvSpPr txBox="1">
+            <a:spLocks noGrp="1"/>
+          </p:cNvSpPr>
           <p:nvPr>
             <p:ph type="title"/>
           </p:nvPr>
@@ -3370,7 +3474,7 @@
           </a:prstGeom>
         </p:spPr>
         <p:txBody>
-          <a:bodyPr anchorCtr="0" anchor="b" bIns="91425" lIns="91425" spcFirstLastPara="1" rIns="91425" wrap="square" tIns="91425">
+          <a:bodyPr spcFirstLastPara="1" wrap="square" lIns="91425" tIns="91425" rIns="91425" bIns="91425" anchor="b" anchorCtr="0">
             <a:noAutofit/>
           </a:bodyPr>
           <a:lstStyle>
@@ -3474,15 +3578,19 @@
               <a:defRPr/>
             </a:lvl9pPr>
           </a:lstStyle>
-          <a:p/>
+          <a:p>
+            <a:endParaRPr/>
+          </a:p>
         </p:txBody>
       </p:sp>
       <p:sp>
         <p:nvSpPr>
           <p:cNvPr id="28" name="Google Shape;28;p5"/>
-          <p:cNvSpPr txBox="1"/>
+          <p:cNvSpPr txBox="1">
+            <a:spLocks noGrp="1"/>
+          </p:cNvSpPr>
           <p:nvPr>
-            <p:ph idx="1" type="body"/>
+            <p:ph type="body" idx="1"/>
           </p:nvPr>
         </p:nvSpPr>
         <p:spPr>
@@ -3495,11 +3603,11 @@
           </a:prstGeom>
         </p:spPr>
         <p:txBody>
-          <a:bodyPr anchorCtr="0" anchor="t" bIns="91425" lIns="91425" spcFirstLastPara="1" rIns="91425" wrap="square" tIns="91425">
+          <a:bodyPr spcFirstLastPara="1" wrap="square" lIns="91425" tIns="91425" rIns="91425" bIns="91425" anchor="t" anchorCtr="0">
             <a:noAutofit/>
           </a:bodyPr>
           <a:lstStyle>
-            <a:lvl1pPr indent="-317500" lvl="0" marL="457200">
+            <a:lvl1pPr marL="457200" lvl="0" indent="-317500">
               <a:spcBef>
                 <a:spcPts val="0"/>
               </a:spcBef>
@@ -3510,7 +3618,7 @@
               <a:buChar char="●"/>
               <a:defRPr sz="1400"/>
             </a:lvl1pPr>
-            <a:lvl2pPr indent="-304800" lvl="1" marL="914400">
+            <a:lvl2pPr marL="914400" lvl="1" indent="-304800">
               <a:spcBef>
                 <a:spcPts val="1600"/>
               </a:spcBef>
@@ -3521,7 +3629,7 @@
               <a:buChar char="○"/>
               <a:defRPr sz="1200"/>
             </a:lvl2pPr>
-            <a:lvl3pPr indent="-304800" lvl="2" marL="1371600">
+            <a:lvl3pPr marL="1371600" lvl="2" indent="-304800">
               <a:spcBef>
                 <a:spcPts val="1600"/>
               </a:spcBef>
@@ -3532,7 +3640,7 @@
               <a:buChar char="■"/>
               <a:defRPr sz="1200"/>
             </a:lvl3pPr>
-            <a:lvl4pPr indent="-304800" lvl="3" marL="1828800">
+            <a:lvl4pPr marL="1828800" lvl="3" indent="-304800">
               <a:spcBef>
                 <a:spcPts val="1600"/>
               </a:spcBef>
@@ -3543,7 +3651,7 @@
               <a:buChar char="●"/>
               <a:defRPr sz="1200"/>
             </a:lvl4pPr>
-            <a:lvl5pPr indent="-304800" lvl="4" marL="2286000">
+            <a:lvl5pPr marL="2286000" lvl="4" indent="-304800">
               <a:spcBef>
                 <a:spcPts val="1600"/>
               </a:spcBef>
@@ -3554,7 +3662,7 @@
               <a:buChar char="○"/>
               <a:defRPr sz="1200"/>
             </a:lvl5pPr>
-            <a:lvl6pPr indent="-304800" lvl="5" marL="2743200">
+            <a:lvl6pPr marL="2743200" lvl="5" indent="-304800">
               <a:spcBef>
                 <a:spcPts val="1600"/>
               </a:spcBef>
@@ -3565,7 +3673,7 @@
               <a:buChar char="■"/>
               <a:defRPr sz="1200"/>
             </a:lvl6pPr>
-            <a:lvl7pPr indent="-304800" lvl="6" marL="3200400">
+            <a:lvl7pPr marL="3200400" lvl="6" indent="-304800">
               <a:spcBef>
                 <a:spcPts val="1600"/>
               </a:spcBef>
@@ -3576,7 +3684,7 @@
               <a:buChar char="●"/>
               <a:defRPr sz="1200"/>
             </a:lvl7pPr>
-            <a:lvl8pPr indent="-304800" lvl="7" marL="3657600">
+            <a:lvl8pPr marL="3657600" lvl="7" indent="-304800">
               <a:spcBef>
                 <a:spcPts val="1600"/>
               </a:spcBef>
@@ -3587,7 +3695,7 @@
               <a:buChar char="○"/>
               <a:defRPr sz="1200"/>
             </a:lvl8pPr>
-            <a:lvl9pPr indent="-304800" lvl="8" marL="4114800">
+            <a:lvl9pPr marL="4114800" lvl="8" indent="-304800">
               <a:spcBef>
                 <a:spcPts val="1600"/>
               </a:spcBef>
@@ -3599,15 +3707,19 @@
               <a:defRPr sz="1200"/>
             </a:lvl9pPr>
           </a:lstStyle>
-          <a:p/>
+          <a:p>
+            <a:endParaRPr/>
+          </a:p>
         </p:txBody>
       </p:sp>
       <p:sp>
         <p:nvSpPr>
           <p:cNvPr id="29" name="Google Shape;29;p5"/>
-          <p:cNvSpPr txBox="1"/>
+          <p:cNvSpPr txBox="1">
+            <a:spLocks noGrp="1"/>
+          </p:cNvSpPr>
           <p:nvPr>
-            <p:ph idx="2" type="body"/>
+            <p:ph type="body" idx="2"/>
           </p:nvPr>
         </p:nvSpPr>
         <p:spPr>
@@ -3620,11 +3732,11 @@
           </a:prstGeom>
         </p:spPr>
         <p:txBody>
-          <a:bodyPr anchorCtr="0" anchor="t" bIns="91425" lIns="91425" spcFirstLastPara="1" rIns="91425" wrap="square" tIns="91425">
+          <a:bodyPr spcFirstLastPara="1" wrap="square" lIns="91425" tIns="91425" rIns="91425" bIns="91425" anchor="t" anchorCtr="0">
             <a:noAutofit/>
           </a:bodyPr>
           <a:lstStyle>
-            <a:lvl1pPr indent="-317500" lvl="0" marL="457200">
+            <a:lvl1pPr marL="457200" lvl="0" indent="-317500">
               <a:spcBef>
                 <a:spcPts val="0"/>
               </a:spcBef>
@@ -3635,7 +3747,7 @@
               <a:buChar char="●"/>
               <a:defRPr sz="1400"/>
             </a:lvl1pPr>
-            <a:lvl2pPr indent="-304800" lvl="1" marL="914400">
+            <a:lvl2pPr marL="914400" lvl="1" indent="-304800">
               <a:spcBef>
                 <a:spcPts val="1600"/>
               </a:spcBef>
@@ -3646,7 +3758,7 @@
               <a:buChar char="○"/>
               <a:defRPr sz="1200"/>
             </a:lvl2pPr>
-            <a:lvl3pPr indent="-304800" lvl="2" marL="1371600">
+            <a:lvl3pPr marL="1371600" lvl="2" indent="-304800">
               <a:spcBef>
                 <a:spcPts val="1600"/>
               </a:spcBef>
@@ -3657,7 +3769,7 @@
               <a:buChar char="■"/>
               <a:defRPr sz="1200"/>
             </a:lvl3pPr>
-            <a:lvl4pPr indent="-304800" lvl="3" marL="1828800">
+            <a:lvl4pPr marL="1828800" lvl="3" indent="-304800">
               <a:spcBef>
                 <a:spcPts val="1600"/>
               </a:spcBef>
@@ -3668,7 +3780,7 @@
               <a:buChar char="●"/>
               <a:defRPr sz="1200"/>
             </a:lvl4pPr>
-            <a:lvl5pPr indent="-304800" lvl="4" marL="2286000">
+            <a:lvl5pPr marL="2286000" lvl="4" indent="-304800">
               <a:spcBef>
                 <a:spcPts val="1600"/>
               </a:spcBef>
@@ -3679,7 +3791,7 @@
               <a:buChar char="○"/>
               <a:defRPr sz="1200"/>
             </a:lvl5pPr>
-            <a:lvl6pPr indent="-304800" lvl="5" marL="2743200">
+            <a:lvl6pPr marL="2743200" lvl="5" indent="-304800">
               <a:spcBef>
                 <a:spcPts val="1600"/>
               </a:spcBef>
@@ -3690,7 +3802,7 @@
               <a:buChar char="■"/>
               <a:defRPr sz="1200"/>
             </a:lvl6pPr>
-            <a:lvl7pPr indent="-304800" lvl="6" marL="3200400">
+            <a:lvl7pPr marL="3200400" lvl="6" indent="-304800">
               <a:spcBef>
                 <a:spcPts val="1600"/>
               </a:spcBef>
@@ -3701,7 +3813,7 @@
               <a:buChar char="●"/>
               <a:defRPr sz="1200"/>
             </a:lvl7pPr>
-            <a:lvl8pPr indent="-304800" lvl="7" marL="3657600">
+            <a:lvl8pPr marL="3657600" lvl="7" indent="-304800">
               <a:spcBef>
                 <a:spcPts val="1600"/>
               </a:spcBef>
@@ -3712,7 +3824,7 @@
               <a:buChar char="○"/>
               <a:defRPr sz="1200"/>
             </a:lvl8pPr>
-            <a:lvl9pPr indent="-304800" lvl="8" marL="4114800">
+            <a:lvl9pPr marL="4114800" lvl="8" indent="-304800">
               <a:spcBef>
                 <a:spcPts val="1600"/>
               </a:spcBef>
@@ -3724,15 +3836,19 @@
               <a:defRPr sz="1200"/>
             </a:lvl9pPr>
           </a:lstStyle>
-          <a:p/>
+          <a:p>
+            <a:endParaRPr/>
+          </a:p>
         </p:txBody>
       </p:sp>
       <p:sp>
         <p:nvSpPr>
           <p:cNvPr id="30" name="Google Shape;30;p5"/>
-          <p:cNvSpPr txBox="1"/>
+          <p:cNvSpPr txBox="1">
+            <a:spLocks noGrp="1"/>
+          </p:cNvSpPr>
           <p:nvPr>
-            <p:ph idx="12" type="sldNum"/>
+            <p:ph type="sldNum" idx="12"/>
           </p:nvPr>
         </p:nvSpPr>
         <p:spPr>
@@ -3745,7 +3861,7 @@
           </a:prstGeom>
         </p:spPr>
         <p:txBody>
-          <a:bodyPr anchorCtr="0" anchor="ctr" bIns="91425" lIns="91425" spcFirstLastPara="1" rIns="91425" wrap="square" tIns="91425">
+          <a:bodyPr spcFirstLastPara="1" wrap="square" lIns="91425" tIns="91425" rIns="91425" bIns="91425" anchor="ctr" anchorCtr="0">
             <a:noAutofit/>
           </a:bodyPr>
           <a:lstStyle>
@@ -3787,7 +3903,7 @@
             </a:lvl9pPr>
           </a:lstStyle>
           <a:p>
-            <a:pPr indent="0" lvl="0" marL="0" rtl="0" algn="r">
+            <a:pPr marL="0" lvl="0" indent="0" algn="r" rtl="0">
               <a:spcBef>
                 <a:spcPts val="0"/>
               </a:spcBef>
@@ -3813,11 +3929,11 @@
 </file>
 
 <file path=ppt/slideLayouts/slideLayout5.xml><?xml version="1.0" encoding="utf-8"?>
-<p:sldLayout xmlns:a="http://schemas.openxmlformats.org/drawingml/2006/main" xmlns:r="http://schemas.openxmlformats.org/officeDocument/2006/relationships" xmlns:mc="http://schemas.openxmlformats.org/markup-compatibility/2006" xmlns:mv="urn:schemas-microsoft-com:mac:vml" xmlns:p="http://schemas.openxmlformats.org/presentationml/2006/main" xmlns:c="http://schemas.openxmlformats.org/drawingml/2006/chart" xmlns:dgm="http://schemas.openxmlformats.org/drawingml/2006/diagram" xmlns:o="urn:schemas-microsoft-com:office:office" xmlns:v="urn:schemas-microsoft-com:vml" xmlns:pvml="urn:schemas-microsoft-com:office:powerpoint" xmlns:com="http://schemas.openxmlformats.org/drawingml/2006/compatibility" xmlns:p14="http://schemas.microsoft.com/office/powerpoint/2010/main" xmlns:p15="http://schemas.microsoft.com/office/powerpoint/2012/main" xmlns:ahyp="http://schemas.microsoft.com/office/drawing/2018/hyperlinkcolor" matchingName="Title only" type="titleOnly">
+<p:sldLayout xmlns:a="http://schemas.openxmlformats.org/drawingml/2006/main" xmlns:r="http://schemas.openxmlformats.org/officeDocument/2006/relationships" xmlns:p="http://schemas.openxmlformats.org/presentationml/2006/main" matchingName="Title only" type="titleOnly">
   <p:cSld name="TITLE_ONLY">
     <p:spTree>
       <p:nvGrpSpPr>
-        <p:cNvPr id="31" name="Shape 31"/>
+        <p:cNvPr id="1" name="Shape 31"/>
         <p:cNvGrpSpPr/>
         <p:nvPr/>
       </p:nvGrpSpPr>
@@ -3832,7 +3948,9 @@
       <p:sp>
         <p:nvSpPr>
           <p:cNvPr id="32" name="Google Shape;32;p6"/>
-          <p:cNvSpPr txBox="1"/>
+          <p:cNvSpPr txBox="1">
+            <a:spLocks noGrp="1"/>
+          </p:cNvSpPr>
           <p:nvPr>
             <p:ph type="title"/>
           </p:nvPr>
@@ -3847,7 +3965,7 @@
           </a:prstGeom>
         </p:spPr>
         <p:txBody>
-          <a:bodyPr anchorCtr="0" anchor="b" bIns="91425" lIns="91425" spcFirstLastPara="1" rIns="91425" wrap="square" tIns="91425">
+          <a:bodyPr spcFirstLastPara="1" wrap="square" lIns="91425" tIns="91425" rIns="91425" bIns="91425" anchor="b" anchorCtr="0">
             <a:noAutofit/>
           </a:bodyPr>
           <a:lstStyle>
@@ -3951,15 +4069,19 @@
               <a:defRPr/>
             </a:lvl9pPr>
           </a:lstStyle>
-          <a:p/>
+          <a:p>
+            <a:endParaRPr/>
+          </a:p>
         </p:txBody>
       </p:sp>
       <p:sp>
         <p:nvSpPr>
           <p:cNvPr id="33" name="Google Shape;33;p6"/>
-          <p:cNvSpPr txBox="1"/>
+          <p:cNvSpPr txBox="1">
+            <a:spLocks noGrp="1"/>
+          </p:cNvSpPr>
           <p:nvPr>
-            <p:ph idx="12" type="sldNum"/>
+            <p:ph type="sldNum" idx="12"/>
           </p:nvPr>
         </p:nvSpPr>
         <p:spPr>
@@ -3972,7 +4094,7 @@
           </a:prstGeom>
         </p:spPr>
         <p:txBody>
-          <a:bodyPr anchorCtr="0" anchor="ctr" bIns="91425" lIns="91425" spcFirstLastPara="1" rIns="91425" wrap="square" tIns="91425">
+          <a:bodyPr spcFirstLastPara="1" wrap="square" lIns="91425" tIns="91425" rIns="91425" bIns="91425" anchor="ctr" anchorCtr="0">
             <a:noAutofit/>
           </a:bodyPr>
           <a:lstStyle>
@@ -4014,7 +4136,7 @@
             </a:lvl9pPr>
           </a:lstStyle>
           <a:p>
-            <a:pPr indent="0" lvl="0" marL="0" rtl="0" algn="r">
+            <a:pPr marL="0" lvl="0" indent="0" algn="r" rtl="0">
               <a:spcBef>
                 <a:spcPts val="0"/>
               </a:spcBef>
@@ -4040,11 +4162,11 @@
 </file>
 
 <file path=ppt/slideLayouts/slideLayout6.xml><?xml version="1.0" encoding="utf-8"?>
-<p:sldLayout xmlns:a="http://schemas.openxmlformats.org/drawingml/2006/main" xmlns:r="http://schemas.openxmlformats.org/officeDocument/2006/relationships" xmlns:mc="http://schemas.openxmlformats.org/markup-compatibility/2006" xmlns:mv="urn:schemas-microsoft-com:mac:vml" xmlns:p="http://schemas.openxmlformats.org/presentationml/2006/main" xmlns:c="http://schemas.openxmlformats.org/drawingml/2006/chart" xmlns:dgm="http://schemas.openxmlformats.org/drawingml/2006/diagram" xmlns:o="urn:schemas-microsoft-com:office:office" xmlns:v="urn:schemas-microsoft-com:vml" xmlns:pvml="urn:schemas-microsoft-com:office:powerpoint" xmlns:com="http://schemas.openxmlformats.org/drawingml/2006/compatibility" xmlns:p14="http://schemas.microsoft.com/office/powerpoint/2010/main" xmlns:p15="http://schemas.microsoft.com/office/powerpoint/2012/main" xmlns:ahyp="http://schemas.microsoft.com/office/drawing/2018/hyperlinkcolor" matchingName="One column text">
+<p:sldLayout xmlns:a="http://schemas.openxmlformats.org/drawingml/2006/main" xmlns:r="http://schemas.openxmlformats.org/officeDocument/2006/relationships" xmlns:p="http://schemas.openxmlformats.org/presentationml/2006/main" matchingName="One column text">
   <p:cSld name="ONE_COLUMN_TEXT">
     <p:spTree>
       <p:nvGrpSpPr>
-        <p:cNvPr id="34" name="Shape 34"/>
+        <p:cNvPr id="1" name="Shape 34"/>
         <p:cNvGrpSpPr/>
         <p:nvPr/>
       </p:nvGrpSpPr>
@@ -4071,21 +4193,23 @@
             <a:avLst/>
           </a:prstGeom>
           <a:noFill/>
-          <a:ln cap="flat" cmpd="sng" w="38100">
+          <a:ln w="38100" cap="flat" cmpd="sng">
             <a:solidFill>
               <a:schemeClr val="accent4"/>
             </a:solidFill>
             <a:prstDash val="solid"/>
             <a:round/>
-            <a:headEnd len="sm" w="sm" type="none"/>
-            <a:tailEnd len="sm" w="sm" type="none"/>
+            <a:headEnd type="none" w="sm" len="sm"/>
+            <a:tailEnd type="none" w="sm" len="sm"/>
           </a:ln>
         </p:spPr>
       </p:cxnSp>
       <p:sp>
         <p:nvSpPr>
           <p:cNvPr id="36" name="Google Shape;36;p7"/>
-          <p:cNvSpPr txBox="1"/>
+          <p:cNvSpPr txBox="1">
+            <a:spLocks noGrp="1"/>
+          </p:cNvSpPr>
           <p:nvPr>
             <p:ph type="title"/>
           </p:nvPr>
@@ -4100,7 +4224,7 @@
           </a:prstGeom>
         </p:spPr>
         <p:txBody>
-          <a:bodyPr anchorCtr="0" anchor="b" bIns="91425" lIns="91425" spcFirstLastPara="1" rIns="91425" wrap="square" tIns="91425">
+          <a:bodyPr spcFirstLastPara="1" wrap="square" lIns="91425" tIns="91425" rIns="91425" bIns="91425" anchor="b" anchorCtr="0">
             <a:noAutofit/>
           </a:bodyPr>
           <a:lstStyle>
@@ -4204,15 +4328,19 @@
               <a:defRPr sz="2400"/>
             </a:lvl9pPr>
           </a:lstStyle>
-          <a:p/>
+          <a:p>
+            <a:endParaRPr/>
+          </a:p>
         </p:txBody>
       </p:sp>
       <p:sp>
         <p:nvSpPr>
           <p:cNvPr id="37" name="Google Shape;37;p7"/>
-          <p:cNvSpPr txBox="1"/>
+          <p:cNvSpPr txBox="1">
+            <a:spLocks noGrp="1"/>
+          </p:cNvSpPr>
           <p:nvPr>
-            <p:ph idx="1" type="body"/>
+            <p:ph type="body" idx="1"/>
           </p:nvPr>
         </p:nvSpPr>
         <p:spPr>
@@ -4225,11 +4353,11 @@
           </a:prstGeom>
         </p:spPr>
         <p:txBody>
-          <a:bodyPr anchorCtr="0" anchor="t" bIns="91425" lIns="91425" spcFirstLastPara="1" rIns="91425" wrap="square" tIns="91425">
+          <a:bodyPr spcFirstLastPara="1" wrap="square" lIns="91425" tIns="91425" rIns="91425" bIns="91425" anchor="t" anchorCtr="0">
             <a:noAutofit/>
           </a:bodyPr>
           <a:lstStyle>
-            <a:lvl1pPr indent="-304800" lvl="0" marL="457200">
+            <a:lvl1pPr marL="457200" lvl="0" indent="-304800">
               <a:spcBef>
                 <a:spcPts val="0"/>
               </a:spcBef>
@@ -4240,7 +4368,7 @@
               <a:buChar char="●"/>
               <a:defRPr sz="1200"/>
             </a:lvl1pPr>
-            <a:lvl2pPr indent="-304800" lvl="1" marL="914400">
+            <a:lvl2pPr marL="914400" lvl="1" indent="-304800">
               <a:spcBef>
                 <a:spcPts val="1600"/>
               </a:spcBef>
@@ -4251,7 +4379,7 @@
               <a:buChar char="○"/>
               <a:defRPr sz="1200"/>
             </a:lvl2pPr>
-            <a:lvl3pPr indent="-304800" lvl="2" marL="1371600">
+            <a:lvl3pPr marL="1371600" lvl="2" indent="-304800">
               <a:spcBef>
                 <a:spcPts val="1600"/>
               </a:spcBef>
@@ -4262,7 +4390,7 @@
               <a:buChar char="■"/>
               <a:defRPr sz="1200"/>
             </a:lvl3pPr>
-            <a:lvl4pPr indent="-304800" lvl="3" marL="1828800">
+            <a:lvl4pPr marL="1828800" lvl="3" indent="-304800">
               <a:spcBef>
                 <a:spcPts val="1600"/>
               </a:spcBef>
@@ -4273,7 +4401,7 @@
               <a:buChar char="●"/>
               <a:defRPr sz="1200"/>
             </a:lvl4pPr>
-            <a:lvl5pPr indent="-304800" lvl="4" marL="2286000">
+            <a:lvl5pPr marL="2286000" lvl="4" indent="-304800">
               <a:spcBef>
                 <a:spcPts val="1600"/>
               </a:spcBef>
@@ -4284,7 +4412,7 @@
               <a:buChar char="○"/>
               <a:defRPr sz="1200"/>
             </a:lvl5pPr>
-            <a:lvl6pPr indent="-304800" lvl="5" marL="2743200">
+            <a:lvl6pPr marL="2743200" lvl="5" indent="-304800">
               <a:spcBef>
                 <a:spcPts val="1600"/>
               </a:spcBef>
@@ -4295,7 +4423,7 @@
               <a:buChar char="■"/>
               <a:defRPr sz="1200"/>
             </a:lvl6pPr>
-            <a:lvl7pPr indent="-304800" lvl="6" marL="3200400">
+            <a:lvl7pPr marL="3200400" lvl="6" indent="-304800">
               <a:spcBef>
                 <a:spcPts val="1600"/>
               </a:spcBef>
@@ -4306,7 +4434,7 @@
               <a:buChar char="●"/>
               <a:defRPr sz="1200"/>
             </a:lvl7pPr>
-            <a:lvl8pPr indent="-304800" lvl="7" marL="3657600">
+            <a:lvl8pPr marL="3657600" lvl="7" indent="-304800">
               <a:spcBef>
                 <a:spcPts val="1600"/>
               </a:spcBef>
@@ -4317,7 +4445,7 @@
               <a:buChar char="○"/>
               <a:defRPr sz="1200"/>
             </a:lvl8pPr>
-            <a:lvl9pPr indent="-304800" lvl="8" marL="4114800">
+            <a:lvl9pPr marL="4114800" lvl="8" indent="-304800">
               <a:spcBef>
                 <a:spcPts val="1600"/>
               </a:spcBef>
@@ -4329,15 +4457,19 @@
               <a:defRPr sz="1200"/>
             </a:lvl9pPr>
           </a:lstStyle>
-          <a:p/>
+          <a:p>
+            <a:endParaRPr/>
+          </a:p>
         </p:txBody>
       </p:sp>
       <p:sp>
         <p:nvSpPr>
           <p:cNvPr id="38" name="Google Shape;38;p7"/>
-          <p:cNvSpPr txBox="1"/>
+          <p:cNvSpPr txBox="1">
+            <a:spLocks noGrp="1"/>
+          </p:cNvSpPr>
           <p:nvPr>
-            <p:ph idx="12" type="sldNum"/>
+            <p:ph type="sldNum" idx="12"/>
           </p:nvPr>
         </p:nvSpPr>
         <p:spPr>
@@ -4350,7 +4482,7 @@
           </a:prstGeom>
         </p:spPr>
         <p:txBody>
-          <a:bodyPr anchorCtr="0" anchor="ctr" bIns="91425" lIns="91425" spcFirstLastPara="1" rIns="91425" wrap="square" tIns="91425">
+          <a:bodyPr spcFirstLastPara="1" wrap="square" lIns="91425" tIns="91425" rIns="91425" bIns="91425" anchor="ctr" anchorCtr="0">
             <a:noAutofit/>
           </a:bodyPr>
           <a:lstStyle>
@@ -4392,7 +4524,7 @@
             </a:lvl9pPr>
           </a:lstStyle>
           <a:p>
-            <a:pPr indent="0" lvl="0" marL="0" rtl="0" algn="r">
+            <a:pPr marL="0" lvl="0" indent="0" algn="r" rtl="0">
               <a:spcBef>
                 <a:spcPts val="0"/>
               </a:spcBef>
@@ -4418,11 +4550,11 @@
 </file>
 
 <file path=ppt/slideLayouts/slideLayout7.xml><?xml version="1.0" encoding="utf-8"?>
-<p:sldLayout xmlns:a="http://schemas.openxmlformats.org/drawingml/2006/main" xmlns:r="http://schemas.openxmlformats.org/officeDocument/2006/relationships" xmlns:mc="http://schemas.openxmlformats.org/markup-compatibility/2006" xmlns:mv="urn:schemas-microsoft-com:mac:vml" xmlns:p="http://schemas.openxmlformats.org/presentationml/2006/main" xmlns:c="http://schemas.openxmlformats.org/drawingml/2006/chart" xmlns:dgm="http://schemas.openxmlformats.org/drawingml/2006/diagram" xmlns:o="urn:schemas-microsoft-com:office:office" xmlns:v="urn:schemas-microsoft-com:vml" xmlns:pvml="urn:schemas-microsoft-com:office:powerpoint" xmlns:com="http://schemas.openxmlformats.org/drawingml/2006/compatibility" xmlns:p14="http://schemas.microsoft.com/office/powerpoint/2010/main" xmlns:p15="http://schemas.microsoft.com/office/powerpoint/2012/main" xmlns:ahyp="http://schemas.microsoft.com/office/drawing/2018/hyperlinkcolor" matchingName="Main point">
+<p:sldLayout xmlns:a="http://schemas.openxmlformats.org/drawingml/2006/main" xmlns:r="http://schemas.openxmlformats.org/officeDocument/2006/relationships" xmlns:p="http://schemas.openxmlformats.org/presentationml/2006/main" matchingName="Main point">
   <p:cSld name="MAIN_POINT">
     <p:spTree>
       <p:nvGrpSpPr>
-        <p:cNvPr id="39" name="Shape 39"/>
+        <p:cNvPr id="1" name="Shape 39"/>
         <p:cNvGrpSpPr/>
         <p:nvPr/>
       </p:nvGrpSpPr>
@@ -4437,7 +4569,9 @@
       <p:sp>
         <p:nvSpPr>
           <p:cNvPr id="40" name="Google Shape;40;p8"/>
-          <p:cNvSpPr txBox="1"/>
+          <p:cNvSpPr txBox="1">
+            <a:spLocks noGrp="1"/>
+          </p:cNvSpPr>
           <p:nvPr>
             <p:ph type="title"/>
           </p:nvPr>
@@ -4452,7 +4586,7 @@
           </a:prstGeom>
         </p:spPr>
         <p:txBody>
-          <a:bodyPr anchorCtr="0" anchor="ctr" bIns="91425" lIns="91425" spcFirstLastPara="1" rIns="91425" wrap="square" tIns="91425">
+          <a:bodyPr spcFirstLastPara="1" wrap="square" lIns="91425" tIns="91425" rIns="91425" bIns="91425" anchor="ctr" anchorCtr="0">
             <a:noAutofit/>
           </a:bodyPr>
           <a:lstStyle>
@@ -4556,15 +4690,19 @@
               <a:defRPr sz="4800"/>
             </a:lvl9pPr>
           </a:lstStyle>
-          <a:p/>
+          <a:p>
+            <a:endParaRPr/>
+          </a:p>
         </p:txBody>
       </p:sp>
       <p:sp>
         <p:nvSpPr>
           <p:cNvPr id="41" name="Google Shape;41;p8"/>
-          <p:cNvSpPr txBox="1"/>
+          <p:cNvSpPr txBox="1">
+            <a:spLocks noGrp="1"/>
+          </p:cNvSpPr>
           <p:nvPr>
-            <p:ph idx="12" type="sldNum"/>
+            <p:ph type="sldNum" idx="12"/>
           </p:nvPr>
         </p:nvSpPr>
         <p:spPr>
@@ -4577,7 +4715,7 @@
           </a:prstGeom>
         </p:spPr>
         <p:txBody>
-          <a:bodyPr anchorCtr="0" anchor="ctr" bIns="91425" lIns="91425" spcFirstLastPara="1" rIns="91425" wrap="square" tIns="91425">
+          <a:bodyPr spcFirstLastPara="1" wrap="square" lIns="91425" tIns="91425" rIns="91425" bIns="91425" anchor="ctr" anchorCtr="0">
             <a:noAutofit/>
           </a:bodyPr>
           <a:lstStyle>
@@ -4619,7 +4757,7 @@
             </a:lvl9pPr>
           </a:lstStyle>
           <a:p>
-            <a:pPr indent="0" lvl="0" marL="0" rtl="0" algn="r">
+            <a:pPr marL="0" lvl="0" indent="0" algn="r" rtl="0">
               <a:spcBef>
                 <a:spcPts val="0"/>
               </a:spcBef>
@@ -4645,11 +4783,11 @@
 </file>
 
 <file path=ppt/slideLayouts/slideLayout8.xml><?xml version="1.0" encoding="utf-8"?>
-<p:sldLayout xmlns:a="http://schemas.openxmlformats.org/drawingml/2006/main" xmlns:r="http://schemas.openxmlformats.org/officeDocument/2006/relationships" xmlns:mc="http://schemas.openxmlformats.org/markup-compatibility/2006" xmlns:mv="urn:schemas-microsoft-com:mac:vml" xmlns:p="http://schemas.openxmlformats.org/presentationml/2006/main" xmlns:c="http://schemas.openxmlformats.org/drawingml/2006/chart" xmlns:dgm="http://schemas.openxmlformats.org/drawingml/2006/diagram" xmlns:o="urn:schemas-microsoft-com:office:office" xmlns:v="urn:schemas-microsoft-com:vml" xmlns:pvml="urn:schemas-microsoft-com:office:powerpoint" xmlns:com="http://schemas.openxmlformats.org/drawingml/2006/compatibility" xmlns:p14="http://schemas.microsoft.com/office/powerpoint/2010/main" xmlns:p15="http://schemas.microsoft.com/office/powerpoint/2012/main" xmlns:ahyp="http://schemas.microsoft.com/office/drawing/2018/hyperlinkcolor" matchingName="Section title and description">
+<p:sldLayout xmlns:a="http://schemas.openxmlformats.org/drawingml/2006/main" xmlns:r="http://schemas.openxmlformats.org/officeDocument/2006/relationships" xmlns:p="http://schemas.openxmlformats.org/presentationml/2006/main" matchingName="Section title and description">
   <p:cSld name="SECTION_TITLE_AND_DESCRIPTION">
     <p:spTree>
       <p:nvGrpSpPr>
-        <p:cNvPr id="42" name="Shape 42"/>
+        <p:cNvPr id="1" name="Shape 42"/>
         <p:cNvGrpSpPr/>
         <p:nvPr/>
       </p:nvGrpSpPr>
@@ -4683,12 +4821,12 @@
           </a:ln>
         </p:spPr>
         <p:txBody>
-          <a:bodyPr anchorCtr="0" anchor="ctr" bIns="91425" lIns="91425" spcFirstLastPara="1" rIns="91425" wrap="square" tIns="91425">
+          <a:bodyPr spcFirstLastPara="1" wrap="square" lIns="91425" tIns="91425" rIns="91425" bIns="91425" anchor="ctr" anchorCtr="0">
             <a:noAutofit/>
           </a:bodyPr>
           <a:lstStyle/>
           <a:p>
-            <a:pPr indent="0" lvl="0" marL="0" rtl="0" algn="l">
+            <a:pPr marL="0" lvl="0" indent="0" algn="l" rtl="0">
               <a:spcBef>
                 <a:spcPts val="0"/>
               </a:spcBef>
@@ -4697,9 +4835,6 @@
               </a:spcAft>
               <a:buNone/>
             </a:pPr>
-            <a:r>
-              <a:t/>
-            </a:r>
             <a:endParaRPr/>
           </a:p>
         </p:txBody>
@@ -4719,21 +4854,23 @@
             <a:avLst/>
           </a:prstGeom>
           <a:noFill/>
-          <a:ln cap="flat" cmpd="sng" w="38100">
+          <a:ln w="38100" cap="flat" cmpd="sng">
             <a:solidFill>
               <a:schemeClr val="accent5"/>
             </a:solidFill>
             <a:prstDash val="solid"/>
             <a:round/>
-            <a:headEnd len="sm" w="sm" type="none"/>
-            <a:tailEnd len="sm" w="sm" type="none"/>
+            <a:headEnd type="none" w="sm" len="sm"/>
+            <a:tailEnd type="none" w="sm" len="sm"/>
           </a:ln>
         </p:spPr>
       </p:cxnSp>
       <p:sp>
         <p:nvSpPr>
           <p:cNvPr id="45" name="Google Shape;45;p9"/>
-          <p:cNvSpPr txBox="1"/>
+          <p:cNvSpPr txBox="1">
+            <a:spLocks noGrp="1"/>
+          </p:cNvSpPr>
           <p:nvPr>
             <p:ph type="title"/>
           </p:nvPr>
@@ -4748,7 +4885,7 @@
           </a:prstGeom>
         </p:spPr>
         <p:txBody>
-          <a:bodyPr anchorCtr="0" anchor="b" bIns="91425" lIns="91425" spcFirstLastPara="1" rIns="91425" wrap="square" tIns="91425">
+          <a:bodyPr spcFirstLastPara="1" wrap="square" lIns="91425" tIns="91425" rIns="91425" bIns="91425" anchor="b" anchorCtr="0">
             <a:noAutofit/>
           </a:bodyPr>
           <a:lstStyle>
@@ -4852,15 +4989,19 @@
               <a:defRPr sz="3800"/>
             </a:lvl9pPr>
           </a:lstStyle>
-          <a:p/>
+          <a:p>
+            <a:endParaRPr/>
+          </a:p>
         </p:txBody>
       </p:sp>
       <p:sp>
         <p:nvSpPr>
           <p:cNvPr id="46" name="Google Shape;46;p9"/>
-          <p:cNvSpPr txBox="1"/>
+          <p:cNvSpPr txBox="1">
+            <a:spLocks noGrp="1"/>
+          </p:cNvSpPr>
           <p:nvPr>
-            <p:ph idx="1" type="subTitle"/>
+            <p:ph type="subTitle" idx="1"/>
           </p:nvPr>
         </p:nvSpPr>
         <p:spPr>
@@ -4873,7 +5014,7 @@
           </a:prstGeom>
         </p:spPr>
         <p:txBody>
-          <a:bodyPr anchorCtr="0" anchor="t" bIns="91425" lIns="91425" spcFirstLastPara="1" rIns="91425" wrap="square" tIns="91425">
+          <a:bodyPr spcFirstLastPara="1" wrap="square" lIns="91425" tIns="91425" rIns="91425" bIns="91425" anchor="t" anchorCtr="0">
             <a:noAutofit/>
           </a:bodyPr>
           <a:lstStyle>
@@ -5067,15 +5208,19 @@
               </a:defRPr>
             </a:lvl9pPr>
           </a:lstStyle>
-          <a:p/>
+          <a:p>
+            <a:endParaRPr/>
+          </a:p>
         </p:txBody>
       </p:sp>
       <p:sp>
         <p:nvSpPr>
           <p:cNvPr id="47" name="Google Shape;47;p9"/>
-          <p:cNvSpPr txBox="1"/>
+          <p:cNvSpPr txBox="1">
+            <a:spLocks noGrp="1"/>
+          </p:cNvSpPr>
           <p:nvPr>
-            <p:ph idx="2" type="body"/>
+            <p:ph type="body" idx="2"/>
           </p:nvPr>
         </p:nvSpPr>
         <p:spPr>
@@ -5088,11 +5233,11 @@
           </a:prstGeom>
         </p:spPr>
         <p:txBody>
-          <a:bodyPr anchorCtr="0" anchor="ctr" bIns="91425" lIns="91425" spcFirstLastPara="1" rIns="91425" wrap="square" tIns="91425">
+          <a:bodyPr spcFirstLastPara="1" wrap="square" lIns="91425" tIns="91425" rIns="91425" bIns="91425" anchor="ctr" anchorCtr="0">
             <a:noAutofit/>
           </a:bodyPr>
           <a:lstStyle>
-            <a:lvl1pPr indent="-342900" lvl="0" marL="457200">
+            <a:lvl1pPr marL="457200" lvl="0" indent="-342900">
               <a:spcBef>
                 <a:spcPts val="0"/>
               </a:spcBef>
@@ -5103,7 +5248,7 @@
               <a:buChar char="●"/>
               <a:defRPr/>
             </a:lvl1pPr>
-            <a:lvl2pPr indent="-317500" lvl="1" marL="914400">
+            <a:lvl2pPr marL="914400" lvl="1" indent="-317500">
               <a:spcBef>
                 <a:spcPts val="1600"/>
               </a:spcBef>
@@ -5114,7 +5259,7 @@
               <a:buChar char="○"/>
               <a:defRPr/>
             </a:lvl2pPr>
-            <a:lvl3pPr indent="-317500" lvl="2" marL="1371600">
+            <a:lvl3pPr marL="1371600" lvl="2" indent="-317500">
               <a:spcBef>
                 <a:spcPts val="1600"/>
               </a:spcBef>
@@ -5125,7 +5270,7 @@
               <a:buChar char="■"/>
               <a:defRPr/>
             </a:lvl3pPr>
-            <a:lvl4pPr indent="-317500" lvl="3" marL="1828800">
+            <a:lvl4pPr marL="1828800" lvl="3" indent="-317500">
               <a:spcBef>
                 <a:spcPts val="1600"/>
               </a:spcBef>
@@ -5136,7 +5281,7 @@
               <a:buChar char="●"/>
               <a:defRPr/>
             </a:lvl4pPr>
-            <a:lvl5pPr indent="-317500" lvl="4" marL="2286000">
+            <a:lvl5pPr marL="2286000" lvl="4" indent="-317500">
               <a:spcBef>
                 <a:spcPts val="1600"/>
               </a:spcBef>
@@ -5147,7 +5292,7 @@
               <a:buChar char="○"/>
               <a:defRPr/>
             </a:lvl5pPr>
-            <a:lvl6pPr indent="-317500" lvl="5" marL="2743200">
+            <a:lvl6pPr marL="2743200" lvl="5" indent="-317500">
               <a:spcBef>
                 <a:spcPts val="1600"/>
               </a:spcBef>
@@ -5158,7 +5303,7 @@
               <a:buChar char="■"/>
               <a:defRPr/>
             </a:lvl6pPr>
-            <a:lvl7pPr indent="-317500" lvl="6" marL="3200400">
+            <a:lvl7pPr marL="3200400" lvl="6" indent="-317500">
               <a:spcBef>
                 <a:spcPts val="1600"/>
               </a:spcBef>
@@ -5169,7 +5314,7 @@
               <a:buChar char="●"/>
               <a:defRPr/>
             </a:lvl7pPr>
-            <a:lvl8pPr indent="-317500" lvl="7" marL="3657600">
+            <a:lvl8pPr marL="3657600" lvl="7" indent="-317500">
               <a:spcBef>
                 <a:spcPts val="1600"/>
               </a:spcBef>
@@ -5180,7 +5325,7 @@
               <a:buChar char="○"/>
               <a:defRPr/>
             </a:lvl8pPr>
-            <a:lvl9pPr indent="-317500" lvl="8" marL="4114800">
+            <a:lvl9pPr marL="4114800" lvl="8" indent="-317500">
               <a:spcBef>
                 <a:spcPts val="1600"/>
               </a:spcBef>
@@ -5192,15 +5337,19 @@
               <a:defRPr/>
             </a:lvl9pPr>
           </a:lstStyle>
-          <a:p/>
+          <a:p>
+            <a:endParaRPr/>
+          </a:p>
         </p:txBody>
       </p:sp>
       <p:sp>
         <p:nvSpPr>
           <p:cNvPr id="48" name="Google Shape;48;p9"/>
-          <p:cNvSpPr txBox="1"/>
+          <p:cNvSpPr txBox="1">
+            <a:spLocks noGrp="1"/>
+          </p:cNvSpPr>
           <p:nvPr>
-            <p:ph idx="12" type="sldNum"/>
+            <p:ph type="sldNum" idx="12"/>
           </p:nvPr>
         </p:nvSpPr>
         <p:spPr>
@@ -5213,7 +5362,7 @@
           </a:prstGeom>
         </p:spPr>
         <p:txBody>
-          <a:bodyPr anchorCtr="0" anchor="ctr" bIns="91425" lIns="91425" spcFirstLastPara="1" rIns="91425" wrap="square" tIns="91425">
+          <a:bodyPr spcFirstLastPara="1" wrap="square" lIns="91425" tIns="91425" rIns="91425" bIns="91425" anchor="ctr" anchorCtr="0">
             <a:noAutofit/>
           </a:bodyPr>
           <a:lstStyle>
@@ -5255,7 +5404,7 @@
             </a:lvl9pPr>
           </a:lstStyle>
           <a:p>
-            <a:pPr indent="0" lvl="0" marL="0" rtl="0" algn="r">
+            <a:pPr marL="0" lvl="0" indent="0" algn="r" rtl="0">
               <a:spcBef>
                 <a:spcPts val="0"/>
               </a:spcBef>
@@ -5281,11 +5430,11 @@
 </file>
 
 <file path=ppt/slideLayouts/slideLayout9.xml><?xml version="1.0" encoding="utf-8"?>
-<p:sldLayout xmlns:a="http://schemas.openxmlformats.org/drawingml/2006/main" xmlns:r="http://schemas.openxmlformats.org/officeDocument/2006/relationships" xmlns:mc="http://schemas.openxmlformats.org/markup-compatibility/2006" xmlns:mv="urn:schemas-microsoft-com:mac:vml" xmlns:p="http://schemas.openxmlformats.org/presentationml/2006/main" xmlns:c="http://schemas.openxmlformats.org/drawingml/2006/chart" xmlns:dgm="http://schemas.openxmlformats.org/drawingml/2006/diagram" xmlns:o="urn:schemas-microsoft-com:office:office" xmlns:v="urn:schemas-microsoft-com:vml" xmlns:pvml="urn:schemas-microsoft-com:office:powerpoint" xmlns:com="http://schemas.openxmlformats.org/drawingml/2006/compatibility" xmlns:p14="http://schemas.microsoft.com/office/powerpoint/2010/main" xmlns:p15="http://schemas.microsoft.com/office/powerpoint/2012/main" xmlns:ahyp="http://schemas.microsoft.com/office/drawing/2018/hyperlinkcolor" matchingName="Caption">
+<p:sldLayout xmlns:a="http://schemas.openxmlformats.org/drawingml/2006/main" xmlns:r="http://schemas.openxmlformats.org/officeDocument/2006/relationships" xmlns:p="http://schemas.openxmlformats.org/presentationml/2006/main" matchingName="Caption">
   <p:cSld name="CAPTION_ONLY">
     <p:spTree>
       <p:nvGrpSpPr>
-        <p:cNvPr id="49" name="Shape 49"/>
+        <p:cNvPr id="1" name="Shape 49"/>
         <p:cNvGrpSpPr/>
         <p:nvPr/>
       </p:nvGrpSpPr>
@@ -5300,9 +5449,11 @@
       <p:sp>
         <p:nvSpPr>
           <p:cNvPr id="50" name="Google Shape;50;p10"/>
-          <p:cNvSpPr txBox="1"/>
+          <p:cNvSpPr txBox="1">
+            <a:spLocks noGrp="1"/>
+          </p:cNvSpPr>
           <p:nvPr>
-            <p:ph idx="1" type="body"/>
+            <p:ph type="body" idx="1"/>
           </p:nvPr>
         </p:nvSpPr>
         <p:spPr>
@@ -5315,11 +5466,11 @@
           </a:prstGeom>
         </p:spPr>
         <p:txBody>
-          <a:bodyPr anchorCtr="0" anchor="ctr" bIns="91425" lIns="91425" spcFirstLastPara="1" rIns="91425" wrap="square" tIns="91425">
+          <a:bodyPr spcFirstLastPara="1" wrap="square" lIns="91425" tIns="91425" rIns="91425" bIns="91425" anchor="ctr" anchorCtr="0">
             <a:noAutofit/>
           </a:bodyPr>
           <a:lstStyle>
-            <a:lvl1pPr indent="-228600" lvl="0" marL="457200">
+            <a:lvl1pPr marL="457200" lvl="0" indent="-228600">
               <a:lnSpc>
                 <a:spcPct val="100000"/>
               </a:lnSpc>
@@ -5340,15 +5491,19 @@
               </a:defRPr>
             </a:lvl1pPr>
           </a:lstStyle>
-          <a:p/>
+          <a:p>
+            <a:endParaRPr/>
+          </a:p>
         </p:txBody>
       </p:sp>
       <p:sp>
         <p:nvSpPr>
           <p:cNvPr id="51" name="Google Shape;51;p10"/>
-          <p:cNvSpPr txBox="1"/>
+          <p:cNvSpPr txBox="1">
+            <a:spLocks noGrp="1"/>
+          </p:cNvSpPr>
           <p:nvPr>
-            <p:ph idx="12" type="sldNum"/>
+            <p:ph type="sldNum" idx="12"/>
           </p:nvPr>
         </p:nvSpPr>
         <p:spPr>
@@ -5361,7 +5516,7 @@
           </a:prstGeom>
         </p:spPr>
         <p:txBody>
-          <a:bodyPr anchorCtr="0" anchor="ctr" bIns="91425" lIns="91425" spcFirstLastPara="1" rIns="91425" wrap="square" tIns="91425">
+          <a:bodyPr spcFirstLastPara="1" wrap="square" lIns="91425" tIns="91425" rIns="91425" bIns="91425" anchor="ctr" anchorCtr="0">
             <a:noAutofit/>
           </a:bodyPr>
           <a:lstStyle>
@@ -5403,7 +5558,7 @@
             </a:lvl9pPr>
           </a:lstStyle>
           <a:p>
-            <a:pPr indent="0" lvl="0" marL="0" rtl="0" algn="r">
+            <a:pPr marL="0" lvl="0" indent="0" algn="r" rtl="0">
               <a:spcBef>
                 <a:spcPts val="0"/>
               </a:spcBef>
@@ -5429,18 +5584,19 @@
 </file>
 
 <file path=ppt/slideMasters/slideMaster1.xml><?xml version="1.0" encoding="utf-8"?>
-<p:sldMaster xmlns:a="http://schemas.openxmlformats.org/drawingml/2006/main" xmlns:r="http://schemas.openxmlformats.org/officeDocument/2006/relationships" xmlns:mc="http://schemas.openxmlformats.org/markup-compatibility/2006" xmlns:mv="urn:schemas-microsoft-com:mac:vml" xmlns:p="http://schemas.openxmlformats.org/presentationml/2006/main" xmlns:c="http://schemas.openxmlformats.org/drawingml/2006/chart" xmlns:dgm="http://schemas.openxmlformats.org/drawingml/2006/diagram" xmlns:o="urn:schemas-microsoft-com:office:office" xmlns:v="urn:schemas-microsoft-com:vml" xmlns:pvml="urn:schemas-microsoft-com:office:powerpoint" xmlns:com="http://schemas.openxmlformats.org/drawingml/2006/compatibility" xmlns:p14="http://schemas.microsoft.com/office/powerpoint/2010/main" xmlns:p15="http://schemas.microsoft.com/office/powerpoint/2012/main" xmlns:ahyp="http://schemas.microsoft.com/office/drawing/2018/hyperlinkcolor">
+<p:sldMaster xmlns:a="http://schemas.openxmlformats.org/drawingml/2006/main" xmlns:r="http://schemas.openxmlformats.org/officeDocument/2006/relationships" xmlns:p="http://schemas.openxmlformats.org/presentationml/2006/main">
   <p:cSld name="marina">
     <p:bg>
       <p:bgPr>
         <a:solidFill>
           <a:schemeClr val="lt1"/>
         </a:solidFill>
+        <a:effectLst/>
       </p:bgPr>
     </p:bg>
     <p:spTree>
       <p:nvGrpSpPr>
-        <p:cNvPr id="5" name="Shape 5"/>
+        <p:cNvPr id="1" name="Shape 5"/>
         <p:cNvGrpSpPr/>
         <p:nvPr/>
       </p:nvGrpSpPr>
@@ -5455,7 +5611,9 @@
       <p:sp>
         <p:nvSpPr>
           <p:cNvPr id="6" name="Google Shape;6;p1"/>
-          <p:cNvSpPr txBox="1"/>
+          <p:cNvSpPr txBox="1">
+            <a:spLocks noGrp="1"/>
+          </p:cNvSpPr>
           <p:nvPr>
             <p:ph type="title"/>
           </p:nvPr>
@@ -5474,7 +5632,7 @@
           </a:ln>
         </p:spPr>
         <p:txBody>
-          <a:bodyPr anchorCtr="0" anchor="b" bIns="91425" lIns="91425" spcFirstLastPara="1" rIns="91425" wrap="square" tIns="91425">
+          <a:bodyPr spcFirstLastPara="1" wrap="square" lIns="91425" tIns="91425" rIns="91425" bIns="91425" anchor="b" anchorCtr="0">
             <a:noAutofit/>
           </a:bodyPr>
           <a:lstStyle>
@@ -5686,15 +5844,19 @@
               </a:defRPr>
             </a:lvl9pPr>
           </a:lstStyle>
-          <a:p/>
+          <a:p>
+            <a:endParaRPr/>
+          </a:p>
         </p:txBody>
       </p:sp>
       <p:sp>
         <p:nvSpPr>
           <p:cNvPr id="7" name="Google Shape;7;p1"/>
-          <p:cNvSpPr txBox="1"/>
+          <p:cNvSpPr txBox="1">
+            <a:spLocks noGrp="1"/>
+          </p:cNvSpPr>
           <p:nvPr>
-            <p:ph idx="1" type="body"/>
+            <p:ph type="body" idx="1"/>
           </p:nvPr>
         </p:nvSpPr>
         <p:spPr>
@@ -5711,11 +5873,11 @@
           </a:ln>
         </p:spPr>
         <p:txBody>
-          <a:bodyPr anchorCtr="0" anchor="t" bIns="91425" lIns="91425" spcFirstLastPara="1" rIns="91425" wrap="square" tIns="91425">
+          <a:bodyPr spcFirstLastPara="1" wrap="square" lIns="91425" tIns="91425" rIns="91425" bIns="91425" anchor="t" anchorCtr="0">
             <a:noAutofit/>
           </a:bodyPr>
           <a:lstStyle>
-            <a:lvl1pPr indent="-342900" lvl="0" marL="457200">
+            <a:lvl1pPr marL="457200" lvl="0" indent="-342900">
               <a:lnSpc>
                 <a:spcPct val="115000"/>
               </a:lnSpc>
@@ -5741,7 +5903,7 @@
                 <a:sym typeface="Roboto"/>
               </a:defRPr>
             </a:lvl1pPr>
-            <a:lvl2pPr indent="-317500" lvl="1" marL="914400">
+            <a:lvl2pPr marL="914400" lvl="1" indent="-317500">
               <a:lnSpc>
                 <a:spcPct val="115000"/>
               </a:lnSpc>
@@ -5767,7 +5929,7 @@
                 <a:sym typeface="Roboto"/>
               </a:defRPr>
             </a:lvl2pPr>
-            <a:lvl3pPr indent="-317500" lvl="2" marL="1371600">
+            <a:lvl3pPr marL="1371600" lvl="2" indent="-317500">
               <a:lnSpc>
                 <a:spcPct val="115000"/>
               </a:lnSpc>
@@ -5793,7 +5955,7 @@
                 <a:sym typeface="Roboto"/>
               </a:defRPr>
             </a:lvl3pPr>
-            <a:lvl4pPr indent="-317500" lvl="3" marL="1828800">
+            <a:lvl4pPr marL="1828800" lvl="3" indent="-317500">
               <a:lnSpc>
                 <a:spcPct val="115000"/>
               </a:lnSpc>
@@ -5819,7 +5981,7 @@
                 <a:sym typeface="Roboto"/>
               </a:defRPr>
             </a:lvl4pPr>
-            <a:lvl5pPr indent="-317500" lvl="4" marL="2286000">
+            <a:lvl5pPr marL="2286000" lvl="4" indent="-317500">
               <a:lnSpc>
                 <a:spcPct val="115000"/>
               </a:lnSpc>
@@ -5845,7 +6007,7 @@
                 <a:sym typeface="Roboto"/>
               </a:defRPr>
             </a:lvl5pPr>
-            <a:lvl6pPr indent="-317500" lvl="5" marL="2743200">
+            <a:lvl6pPr marL="2743200" lvl="5" indent="-317500">
               <a:lnSpc>
                 <a:spcPct val="115000"/>
               </a:lnSpc>
@@ -5871,7 +6033,7 @@
                 <a:sym typeface="Roboto"/>
               </a:defRPr>
             </a:lvl6pPr>
-            <a:lvl7pPr indent="-317500" lvl="6" marL="3200400">
+            <a:lvl7pPr marL="3200400" lvl="6" indent="-317500">
               <a:lnSpc>
                 <a:spcPct val="115000"/>
               </a:lnSpc>
@@ -5897,7 +6059,7 @@
                 <a:sym typeface="Roboto"/>
               </a:defRPr>
             </a:lvl7pPr>
-            <a:lvl8pPr indent="-317500" lvl="7" marL="3657600">
+            <a:lvl8pPr marL="3657600" lvl="7" indent="-317500">
               <a:lnSpc>
                 <a:spcPct val="115000"/>
               </a:lnSpc>
@@ -5923,7 +6085,7 @@
                 <a:sym typeface="Roboto"/>
               </a:defRPr>
             </a:lvl8pPr>
-            <a:lvl9pPr indent="-317500" lvl="8" marL="4114800">
+            <a:lvl9pPr marL="4114800" lvl="8" indent="-317500">
               <a:lnSpc>
                 <a:spcPct val="115000"/>
               </a:lnSpc>
@@ -5950,15 +6112,19 @@
               </a:defRPr>
             </a:lvl9pPr>
           </a:lstStyle>
-          <a:p/>
+          <a:p>
+            <a:endParaRPr/>
+          </a:p>
         </p:txBody>
       </p:sp>
       <p:sp>
         <p:nvSpPr>
           <p:cNvPr id="8" name="Google Shape;8;p1"/>
-          <p:cNvSpPr txBox="1"/>
+          <p:cNvSpPr txBox="1">
+            <a:spLocks noGrp="1"/>
+          </p:cNvSpPr>
           <p:nvPr>
-            <p:ph idx="12" type="sldNum"/>
+            <p:ph type="sldNum" idx="12"/>
           </p:nvPr>
         </p:nvSpPr>
         <p:spPr>
@@ -5975,7 +6141,7 @@
           </a:ln>
         </p:spPr>
         <p:txBody>
-          <a:bodyPr anchorCtr="0" anchor="ctr" bIns="91425" lIns="91425" spcFirstLastPara="1" rIns="91425" wrap="square" tIns="91425">
+          <a:bodyPr spcFirstLastPara="1" wrap="square" lIns="91425" tIns="91425" rIns="91425" bIns="91425" anchor="ctr" anchorCtr="0">
             <a:noAutofit/>
           </a:bodyPr>
           <a:lstStyle>
@@ -6089,7 +6255,7 @@
             </a:lvl9pPr>
           </a:lstStyle>
           <a:p>
-            <a:pPr indent="0" lvl="0" marL="0" rtl="0" algn="r">
+            <a:pPr marL="0" lvl="0" indent="0" algn="r" rtl="0">
               <a:spcBef>
                 <a:spcPts val="0"/>
               </a:spcBef>
@@ -6108,7 +6274,7 @@
       </p:sp>
     </p:spTree>
   </p:cSld>
-  <p:clrMap accent1="accent1" accent2="accent2" accent3="accent3" accent4="accent4" accent5="accent5" accent6="accent6" bg1="lt1" bg2="dk2" tx1="dk1" tx2="lt2" folHlink="folHlink" hlink="hlink"/>
+  <p:clrMap bg1="lt1" tx1="dk1" bg2="dk2" tx2="lt2" accent1="accent1" accent2="accent2" accent3="accent3" accent4="accent4" accent5="accent5" accent6="accent6" hlink="hlink" folHlink="folHlink"/>
   <p:sldLayoutIdLst>
     <p:sldLayoutId id="2147483648" r:id="rId1"/>
     <p:sldLayoutId id="2147483649" r:id="rId2"/>
@@ -6122,10 +6288,10 @@
     <p:sldLayoutId id="2147483657" r:id="rId10"/>
     <p:sldLayoutId id="2147483658" r:id="rId11"/>
   </p:sldLayoutIdLst>
-  <p:hf dt="0" ftr="0" hdr="0" sldNum="0"/>
+  <p:hf sldNum="0" hdr="0" ftr="0" dt="0"/>
   <p:txStyles>
     <p:titleStyle>
-      <a:defPPr lvl="0" marR="0" rtl="0" algn="l">
+      <a:defPPr marR="0" lvl="0" algn="l" rtl="0">
         <a:lnSpc>
           <a:spcPct val="100000"/>
         </a:lnSpc>
@@ -6136,7 +6302,7 @@
           <a:spcPts val="0"/>
         </a:spcAft>
       </a:defPPr>
-      <a:lvl1pPr lvl="0" marR="0" rtl="0" algn="l">
+      <a:lvl1pPr marR="0" lvl="0" algn="l" rtl="0">
         <a:lnSpc>
           <a:spcPct val="100000"/>
         </a:lnSpc>
@@ -6150,7 +6316,7 @@
           <a:srgbClr val="000000"/>
         </a:buClr>
         <a:buFont typeface="Arial"/>
-        <a:defRPr b="0" i="0" sz="1400" u="none" cap="none" strike="noStrike">
+        <a:defRPr sz="1400" b="0" i="0" u="none" strike="noStrike" cap="none">
           <a:solidFill>
             <a:srgbClr val="000000"/>
           </a:solidFill>
@@ -6160,7 +6326,7 @@
           <a:sym typeface="Arial"/>
         </a:defRPr>
       </a:lvl1pPr>
-      <a:lvl2pPr lvl="1" marR="0" rtl="0" algn="l">
+      <a:lvl2pPr marR="0" lvl="1" algn="l" rtl="0">
         <a:lnSpc>
           <a:spcPct val="100000"/>
         </a:lnSpc>
@@ -6174,7 +6340,7 @@
           <a:srgbClr val="000000"/>
         </a:buClr>
         <a:buFont typeface="Arial"/>
-        <a:defRPr b="0" i="0" sz="1400" u="none" cap="none" strike="noStrike">
+        <a:defRPr sz="1400" b="0" i="0" u="none" strike="noStrike" cap="none">
           <a:solidFill>
             <a:srgbClr val="000000"/>
           </a:solidFill>
@@ -6184,7 +6350,7 @@
           <a:sym typeface="Arial"/>
         </a:defRPr>
       </a:lvl2pPr>
-      <a:lvl3pPr lvl="2" marR="0" rtl="0" algn="l">
+      <a:lvl3pPr marR="0" lvl="2" algn="l" rtl="0">
         <a:lnSpc>
           <a:spcPct val="100000"/>
         </a:lnSpc>
@@ -6198,7 +6364,7 @@
           <a:srgbClr val="000000"/>
         </a:buClr>
         <a:buFont typeface="Arial"/>
-        <a:defRPr b="0" i="0" sz="1400" u="none" cap="none" strike="noStrike">
+        <a:defRPr sz="1400" b="0" i="0" u="none" strike="noStrike" cap="none">
           <a:solidFill>
             <a:srgbClr val="000000"/>
           </a:solidFill>
@@ -6208,7 +6374,7 @@
           <a:sym typeface="Arial"/>
         </a:defRPr>
       </a:lvl3pPr>
-      <a:lvl4pPr lvl="3" marR="0" rtl="0" algn="l">
+      <a:lvl4pPr marR="0" lvl="3" algn="l" rtl="0">
         <a:lnSpc>
           <a:spcPct val="100000"/>
         </a:lnSpc>
@@ -6222,7 +6388,7 @@
           <a:srgbClr val="000000"/>
         </a:buClr>
         <a:buFont typeface="Arial"/>
-        <a:defRPr b="0" i="0" sz="1400" u="none" cap="none" strike="noStrike">
+        <a:defRPr sz="1400" b="0" i="0" u="none" strike="noStrike" cap="none">
           <a:solidFill>
             <a:srgbClr val="000000"/>
           </a:solidFill>
@@ -6232,7 +6398,7 @@
           <a:sym typeface="Arial"/>
         </a:defRPr>
       </a:lvl4pPr>
-      <a:lvl5pPr lvl="4" marR="0" rtl="0" algn="l">
+      <a:lvl5pPr marR="0" lvl="4" algn="l" rtl="0">
         <a:lnSpc>
           <a:spcPct val="100000"/>
         </a:lnSpc>
@@ -6246,7 +6412,7 @@
           <a:srgbClr val="000000"/>
         </a:buClr>
         <a:buFont typeface="Arial"/>
-        <a:defRPr b="0" i="0" sz="1400" u="none" cap="none" strike="noStrike">
+        <a:defRPr sz="1400" b="0" i="0" u="none" strike="noStrike" cap="none">
           <a:solidFill>
             <a:srgbClr val="000000"/>
           </a:solidFill>
@@ -6256,7 +6422,7 @@
           <a:sym typeface="Arial"/>
         </a:defRPr>
       </a:lvl5pPr>
-      <a:lvl6pPr lvl="5" marR="0" rtl="0" algn="l">
+      <a:lvl6pPr marR="0" lvl="5" algn="l" rtl="0">
         <a:lnSpc>
           <a:spcPct val="100000"/>
         </a:lnSpc>
@@ -6270,7 +6436,7 @@
           <a:srgbClr val="000000"/>
         </a:buClr>
         <a:buFont typeface="Arial"/>
-        <a:defRPr b="0" i="0" sz="1400" u="none" cap="none" strike="noStrike">
+        <a:defRPr sz="1400" b="0" i="0" u="none" strike="noStrike" cap="none">
           <a:solidFill>
             <a:srgbClr val="000000"/>
           </a:solidFill>
@@ -6280,7 +6446,7 @@
           <a:sym typeface="Arial"/>
         </a:defRPr>
       </a:lvl6pPr>
-      <a:lvl7pPr lvl="6" marR="0" rtl="0" algn="l">
+      <a:lvl7pPr marR="0" lvl="6" algn="l" rtl="0">
         <a:lnSpc>
           <a:spcPct val="100000"/>
         </a:lnSpc>
@@ -6294,7 +6460,7 @@
           <a:srgbClr val="000000"/>
         </a:buClr>
         <a:buFont typeface="Arial"/>
-        <a:defRPr b="0" i="0" sz="1400" u="none" cap="none" strike="noStrike">
+        <a:defRPr sz="1400" b="0" i="0" u="none" strike="noStrike" cap="none">
           <a:solidFill>
             <a:srgbClr val="000000"/>
           </a:solidFill>
@@ -6304,7 +6470,7 @@
           <a:sym typeface="Arial"/>
         </a:defRPr>
       </a:lvl7pPr>
-      <a:lvl8pPr lvl="7" marR="0" rtl="0" algn="l">
+      <a:lvl8pPr marR="0" lvl="7" algn="l" rtl="0">
         <a:lnSpc>
           <a:spcPct val="100000"/>
         </a:lnSpc>
@@ -6318,7 +6484,7 @@
           <a:srgbClr val="000000"/>
         </a:buClr>
         <a:buFont typeface="Arial"/>
-        <a:defRPr b="0" i="0" sz="1400" u="none" cap="none" strike="noStrike">
+        <a:defRPr sz="1400" b="0" i="0" u="none" strike="noStrike" cap="none">
           <a:solidFill>
             <a:srgbClr val="000000"/>
           </a:solidFill>
@@ -6328,7 +6494,7 @@
           <a:sym typeface="Arial"/>
         </a:defRPr>
       </a:lvl8pPr>
-      <a:lvl9pPr lvl="8" marR="0" rtl="0" algn="l">
+      <a:lvl9pPr marR="0" lvl="8" algn="l" rtl="0">
         <a:lnSpc>
           <a:spcPct val="100000"/>
         </a:lnSpc>
@@ -6342,7 +6508,7 @@
           <a:srgbClr val="000000"/>
         </a:buClr>
         <a:buFont typeface="Arial"/>
-        <a:defRPr b="0" i="0" sz="1400" u="none" cap="none" strike="noStrike">
+        <a:defRPr sz="1400" b="0" i="0" u="none" strike="noStrike" cap="none">
           <a:solidFill>
             <a:srgbClr val="000000"/>
           </a:solidFill>
@@ -6354,7 +6520,7 @@
       </a:lvl9pPr>
     </p:titleStyle>
     <p:bodyStyle>
-      <a:defPPr lvl="0" marR="0" rtl="0" algn="l">
+      <a:defPPr marR="0" lvl="0" algn="l" rtl="0">
         <a:lnSpc>
           <a:spcPct val="100000"/>
         </a:lnSpc>
@@ -6365,7 +6531,7 @@
           <a:spcPts val="0"/>
         </a:spcAft>
       </a:defPPr>
-      <a:lvl1pPr lvl="0" marR="0" rtl="0" algn="l">
+      <a:lvl1pPr marR="0" lvl="0" algn="l" rtl="0">
         <a:lnSpc>
           <a:spcPct val="100000"/>
         </a:lnSpc>
@@ -6379,7 +6545,7 @@
           <a:srgbClr val="000000"/>
         </a:buClr>
         <a:buFont typeface="Arial"/>
-        <a:defRPr b="0" i="0" sz="1400" u="none" cap="none" strike="noStrike">
+        <a:defRPr sz="1400" b="0" i="0" u="none" strike="noStrike" cap="none">
           <a:solidFill>
             <a:srgbClr val="000000"/>
           </a:solidFill>
@@ -6389,7 +6555,7 @@
           <a:sym typeface="Arial"/>
         </a:defRPr>
       </a:lvl1pPr>
-      <a:lvl2pPr lvl="1" marR="0" rtl="0" algn="l">
+      <a:lvl2pPr marR="0" lvl="1" algn="l" rtl="0">
         <a:lnSpc>
           <a:spcPct val="100000"/>
         </a:lnSpc>
@@ -6403,7 +6569,7 @@
           <a:srgbClr val="000000"/>
         </a:buClr>
         <a:buFont typeface="Arial"/>
-        <a:defRPr b="0" i="0" sz="1400" u="none" cap="none" strike="noStrike">
+        <a:defRPr sz="1400" b="0" i="0" u="none" strike="noStrike" cap="none">
           <a:solidFill>
             <a:srgbClr val="000000"/>
           </a:solidFill>
@@ -6413,7 +6579,7 @@
           <a:sym typeface="Arial"/>
         </a:defRPr>
       </a:lvl2pPr>
-      <a:lvl3pPr lvl="2" marR="0" rtl="0" algn="l">
+      <a:lvl3pPr marR="0" lvl="2" algn="l" rtl="0">
         <a:lnSpc>
           <a:spcPct val="100000"/>
         </a:lnSpc>
@@ -6427,7 +6593,7 @@
           <a:srgbClr val="000000"/>
         </a:buClr>
         <a:buFont typeface="Arial"/>
-        <a:defRPr b="0" i="0" sz="1400" u="none" cap="none" strike="noStrike">
+        <a:defRPr sz="1400" b="0" i="0" u="none" strike="noStrike" cap="none">
           <a:solidFill>
             <a:srgbClr val="000000"/>
           </a:solidFill>
@@ -6437,7 +6603,7 @@
           <a:sym typeface="Arial"/>
         </a:defRPr>
       </a:lvl3pPr>
-      <a:lvl4pPr lvl="3" marR="0" rtl="0" algn="l">
+      <a:lvl4pPr marR="0" lvl="3" algn="l" rtl="0">
         <a:lnSpc>
           <a:spcPct val="100000"/>
         </a:lnSpc>
@@ -6451,7 +6617,7 @@
           <a:srgbClr val="000000"/>
         </a:buClr>
         <a:buFont typeface="Arial"/>
-        <a:defRPr b="0" i="0" sz="1400" u="none" cap="none" strike="noStrike">
+        <a:defRPr sz="1400" b="0" i="0" u="none" strike="noStrike" cap="none">
           <a:solidFill>
             <a:srgbClr val="000000"/>
           </a:solidFill>
@@ -6461,7 +6627,7 @@
           <a:sym typeface="Arial"/>
         </a:defRPr>
       </a:lvl4pPr>
-      <a:lvl5pPr lvl="4" marR="0" rtl="0" algn="l">
+      <a:lvl5pPr marR="0" lvl="4" algn="l" rtl="0">
         <a:lnSpc>
           <a:spcPct val="100000"/>
         </a:lnSpc>
@@ -6475,7 +6641,7 @@
           <a:srgbClr val="000000"/>
         </a:buClr>
         <a:buFont typeface="Arial"/>
-        <a:defRPr b="0" i="0" sz="1400" u="none" cap="none" strike="noStrike">
+        <a:defRPr sz="1400" b="0" i="0" u="none" strike="noStrike" cap="none">
           <a:solidFill>
             <a:srgbClr val="000000"/>
           </a:solidFill>
@@ -6485,7 +6651,7 @@
           <a:sym typeface="Arial"/>
         </a:defRPr>
       </a:lvl5pPr>
-      <a:lvl6pPr lvl="5" marR="0" rtl="0" algn="l">
+      <a:lvl6pPr marR="0" lvl="5" algn="l" rtl="0">
         <a:lnSpc>
           <a:spcPct val="100000"/>
         </a:lnSpc>
@@ -6499,7 +6665,7 @@
           <a:srgbClr val="000000"/>
         </a:buClr>
         <a:buFont typeface="Arial"/>
-        <a:defRPr b="0" i="0" sz="1400" u="none" cap="none" strike="noStrike">
+        <a:defRPr sz="1400" b="0" i="0" u="none" strike="noStrike" cap="none">
           <a:solidFill>
             <a:srgbClr val="000000"/>
           </a:solidFill>
@@ -6509,7 +6675,7 @@
           <a:sym typeface="Arial"/>
         </a:defRPr>
       </a:lvl6pPr>
-      <a:lvl7pPr lvl="6" marR="0" rtl="0" algn="l">
+      <a:lvl7pPr marR="0" lvl="6" algn="l" rtl="0">
         <a:lnSpc>
           <a:spcPct val="100000"/>
         </a:lnSpc>
@@ -6523,7 +6689,7 @@
           <a:srgbClr val="000000"/>
         </a:buClr>
         <a:buFont typeface="Arial"/>
-        <a:defRPr b="0" i="0" sz="1400" u="none" cap="none" strike="noStrike">
+        <a:defRPr sz="1400" b="0" i="0" u="none" strike="noStrike" cap="none">
           <a:solidFill>
             <a:srgbClr val="000000"/>
           </a:solidFill>
@@ -6533,7 +6699,7 @@
           <a:sym typeface="Arial"/>
         </a:defRPr>
       </a:lvl7pPr>
-      <a:lvl8pPr lvl="7" marR="0" rtl="0" algn="l">
+      <a:lvl8pPr marR="0" lvl="7" algn="l" rtl="0">
         <a:lnSpc>
           <a:spcPct val="100000"/>
         </a:lnSpc>
@@ -6547,7 +6713,7 @@
           <a:srgbClr val="000000"/>
         </a:buClr>
         <a:buFont typeface="Arial"/>
-        <a:defRPr b="0" i="0" sz="1400" u="none" cap="none" strike="noStrike">
+        <a:defRPr sz="1400" b="0" i="0" u="none" strike="noStrike" cap="none">
           <a:solidFill>
             <a:srgbClr val="000000"/>
           </a:solidFill>
@@ -6557,7 +6723,7 @@
           <a:sym typeface="Arial"/>
         </a:defRPr>
       </a:lvl8pPr>
-      <a:lvl9pPr lvl="8" marR="0" rtl="0" algn="l">
+      <a:lvl9pPr marR="0" lvl="8" algn="l" rtl="0">
         <a:lnSpc>
           <a:spcPct val="100000"/>
         </a:lnSpc>
@@ -6571,7 +6737,7 @@
           <a:srgbClr val="000000"/>
         </a:buClr>
         <a:buFont typeface="Arial"/>
-        <a:defRPr b="0" i="0" sz="1400" u="none" cap="none" strike="noStrike">
+        <a:defRPr sz="1400" b="0" i="0" u="none" strike="noStrike" cap="none">
           <a:solidFill>
             <a:srgbClr val="000000"/>
           </a:solidFill>
@@ -6583,7 +6749,7 @@
       </a:lvl9pPr>
     </p:bodyStyle>
     <p:otherStyle>
-      <a:defPPr lvl="0" marR="0" rtl="0" algn="l">
+      <a:defPPr marR="0" lvl="0" algn="l" rtl="0">
         <a:lnSpc>
           <a:spcPct val="100000"/>
         </a:lnSpc>
@@ -6594,7 +6760,7 @@
           <a:spcPts val="0"/>
         </a:spcAft>
       </a:defPPr>
-      <a:lvl1pPr lvl="0" marR="0" rtl="0" algn="l">
+      <a:lvl1pPr marR="0" lvl="0" algn="l" rtl="0">
         <a:lnSpc>
           <a:spcPct val="100000"/>
         </a:lnSpc>
@@ -6608,7 +6774,7 @@
           <a:srgbClr val="000000"/>
         </a:buClr>
         <a:buFont typeface="Arial"/>
-        <a:defRPr b="0" i="0" sz="1400" u="none" cap="none" strike="noStrike">
+        <a:defRPr sz="1400" b="0" i="0" u="none" strike="noStrike" cap="none">
           <a:solidFill>
             <a:srgbClr val="000000"/>
           </a:solidFill>
@@ -6618,7 +6784,7 @@
           <a:sym typeface="Arial"/>
         </a:defRPr>
       </a:lvl1pPr>
-      <a:lvl2pPr lvl="1" marR="0" rtl="0" algn="l">
+      <a:lvl2pPr marR="0" lvl="1" algn="l" rtl="0">
         <a:lnSpc>
           <a:spcPct val="100000"/>
         </a:lnSpc>
@@ -6632,7 +6798,7 @@
           <a:srgbClr val="000000"/>
         </a:buClr>
         <a:buFont typeface="Arial"/>
-        <a:defRPr b="0" i="0" sz="1400" u="none" cap="none" strike="noStrike">
+        <a:defRPr sz="1400" b="0" i="0" u="none" strike="noStrike" cap="none">
           <a:solidFill>
             <a:srgbClr val="000000"/>
           </a:solidFill>
@@ -6642,7 +6808,7 @@
           <a:sym typeface="Arial"/>
         </a:defRPr>
       </a:lvl2pPr>
-      <a:lvl3pPr lvl="2" marR="0" rtl="0" algn="l">
+      <a:lvl3pPr marR="0" lvl="2" algn="l" rtl="0">
         <a:lnSpc>
           <a:spcPct val="100000"/>
         </a:lnSpc>
@@ -6656,7 +6822,7 @@
           <a:srgbClr val="000000"/>
         </a:buClr>
         <a:buFont typeface="Arial"/>
-        <a:defRPr b="0" i="0" sz="1400" u="none" cap="none" strike="noStrike">
+        <a:defRPr sz="1400" b="0" i="0" u="none" strike="noStrike" cap="none">
           <a:solidFill>
             <a:srgbClr val="000000"/>
           </a:solidFill>
@@ -6666,7 +6832,7 @@
           <a:sym typeface="Arial"/>
         </a:defRPr>
       </a:lvl3pPr>
-      <a:lvl4pPr lvl="3" marR="0" rtl="0" algn="l">
+      <a:lvl4pPr marR="0" lvl="3" algn="l" rtl="0">
         <a:lnSpc>
           <a:spcPct val="100000"/>
         </a:lnSpc>
@@ -6680,7 +6846,7 @@
           <a:srgbClr val="000000"/>
         </a:buClr>
         <a:buFont typeface="Arial"/>
-        <a:defRPr b="0" i="0" sz="1400" u="none" cap="none" strike="noStrike">
+        <a:defRPr sz="1400" b="0" i="0" u="none" strike="noStrike" cap="none">
           <a:solidFill>
             <a:srgbClr val="000000"/>
           </a:solidFill>
@@ -6690,7 +6856,7 @@
           <a:sym typeface="Arial"/>
         </a:defRPr>
       </a:lvl4pPr>
-      <a:lvl5pPr lvl="4" marR="0" rtl="0" algn="l">
+      <a:lvl5pPr marR="0" lvl="4" algn="l" rtl="0">
         <a:lnSpc>
           <a:spcPct val="100000"/>
         </a:lnSpc>
@@ -6704,7 +6870,7 @@
           <a:srgbClr val="000000"/>
         </a:buClr>
         <a:buFont typeface="Arial"/>
-        <a:defRPr b="0" i="0" sz="1400" u="none" cap="none" strike="noStrike">
+        <a:defRPr sz="1400" b="0" i="0" u="none" strike="noStrike" cap="none">
           <a:solidFill>
             <a:srgbClr val="000000"/>
           </a:solidFill>
@@ -6714,7 +6880,7 @@
           <a:sym typeface="Arial"/>
         </a:defRPr>
       </a:lvl5pPr>
-      <a:lvl6pPr lvl="5" marR="0" rtl="0" algn="l">
+      <a:lvl6pPr marR="0" lvl="5" algn="l" rtl="0">
         <a:lnSpc>
           <a:spcPct val="100000"/>
         </a:lnSpc>
@@ -6728,7 +6894,7 @@
           <a:srgbClr val="000000"/>
         </a:buClr>
         <a:buFont typeface="Arial"/>
-        <a:defRPr b="0" i="0" sz="1400" u="none" cap="none" strike="noStrike">
+        <a:defRPr sz="1400" b="0" i="0" u="none" strike="noStrike" cap="none">
           <a:solidFill>
             <a:srgbClr val="000000"/>
           </a:solidFill>
@@ -6738,7 +6904,7 @@
           <a:sym typeface="Arial"/>
         </a:defRPr>
       </a:lvl6pPr>
-      <a:lvl7pPr lvl="6" marR="0" rtl="0" algn="l">
+      <a:lvl7pPr marR="0" lvl="6" algn="l" rtl="0">
         <a:lnSpc>
           <a:spcPct val="100000"/>
         </a:lnSpc>
@@ -6752,7 +6918,7 @@
           <a:srgbClr val="000000"/>
         </a:buClr>
         <a:buFont typeface="Arial"/>
-        <a:defRPr b="0" i="0" sz="1400" u="none" cap="none" strike="noStrike">
+        <a:defRPr sz="1400" b="0" i="0" u="none" strike="noStrike" cap="none">
           <a:solidFill>
             <a:srgbClr val="000000"/>
           </a:solidFill>
@@ -6762,7 +6928,7 @@
           <a:sym typeface="Arial"/>
         </a:defRPr>
       </a:lvl7pPr>
-      <a:lvl8pPr lvl="7" marR="0" rtl="0" algn="l">
+      <a:lvl8pPr marR="0" lvl="7" algn="l" rtl="0">
         <a:lnSpc>
           <a:spcPct val="100000"/>
         </a:lnSpc>
@@ -6776,7 +6942,7 @@
           <a:srgbClr val="000000"/>
         </a:buClr>
         <a:buFont typeface="Arial"/>
-        <a:defRPr b="0" i="0" sz="1400" u="none" cap="none" strike="noStrike">
+        <a:defRPr sz="1400" b="0" i="0" u="none" strike="noStrike" cap="none">
           <a:solidFill>
             <a:srgbClr val="000000"/>
           </a:solidFill>
@@ -6786,7 +6952,7 @@
           <a:sym typeface="Arial"/>
         </a:defRPr>
       </a:lvl8pPr>
-      <a:lvl9pPr lvl="8" marR="0" rtl="0" algn="l">
+      <a:lvl9pPr marR="0" lvl="8" algn="l" rtl="0">
         <a:lnSpc>
           <a:spcPct val="100000"/>
         </a:lnSpc>
@@ -6800,7 +6966,7 @@
           <a:srgbClr val="000000"/>
         </a:buClr>
         <a:buFont typeface="Arial"/>
-        <a:defRPr b="0" i="0" sz="1400" u="none" cap="none" strike="noStrike">
+        <a:defRPr sz="1400" b="0" i="0" u="none" strike="noStrike" cap="none">
           <a:solidFill>
             <a:srgbClr val="000000"/>
           </a:solidFill>
@@ -6816,11 +6982,11 @@
 </file>
 
 <file path=ppt/slides/slide1.xml><?xml version="1.0" encoding="utf-8"?>
-<p:sld xmlns:a="http://schemas.openxmlformats.org/drawingml/2006/main" xmlns:r="http://schemas.openxmlformats.org/officeDocument/2006/relationships" xmlns:mc="http://schemas.openxmlformats.org/markup-compatibility/2006" xmlns:mv="urn:schemas-microsoft-com:mac:vml" xmlns:p="http://schemas.openxmlformats.org/presentationml/2006/main" xmlns:c="http://schemas.openxmlformats.org/drawingml/2006/chart" xmlns:dgm="http://schemas.openxmlformats.org/drawingml/2006/diagram" xmlns:o="urn:schemas-microsoft-com:office:office" xmlns:v="urn:schemas-microsoft-com:vml" xmlns:pvml="urn:schemas-microsoft-com:office:powerpoint" xmlns:com="http://schemas.openxmlformats.org/drawingml/2006/compatibility" xmlns:p14="http://schemas.microsoft.com/office/powerpoint/2010/main" xmlns:p15="http://schemas.microsoft.com/office/powerpoint/2012/main" xmlns:ahyp="http://schemas.microsoft.com/office/drawing/2018/hyperlinkcolor">
+<p:sld xmlns:a="http://schemas.openxmlformats.org/drawingml/2006/main" xmlns:r="http://schemas.openxmlformats.org/officeDocument/2006/relationships" xmlns:p="http://schemas.openxmlformats.org/presentationml/2006/main">
   <p:cSld>
     <p:spTree>
       <p:nvGrpSpPr>
-        <p:cNvPr id="62" name="Shape 62"/>
+        <p:cNvPr id="1" name="Shape 62"/>
         <p:cNvGrpSpPr/>
         <p:nvPr/>
       </p:nvGrpSpPr>
@@ -6835,7 +7001,9 @@
       <p:sp>
         <p:nvSpPr>
           <p:cNvPr id="63" name="Google Shape;63;p13"/>
-          <p:cNvSpPr txBox="1"/>
+          <p:cNvSpPr txBox="1">
+            <a:spLocks noGrp="1"/>
+          </p:cNvSpPr>
           <p:nvPr>
             <p:ph type="ctrTitle"/>
           </p:nvPr>
@@ -6850,12 +7018,12 @@
           </a:prstGeom>
         </p:spPr>
         <p:txBody>
-          <a:bodyPr anchorCtr="0" anchor="b" bIns="91425" lIns="91425" spcFirstLastPara="1" rIns="91425" wrap="square" tIns="91425">
+          <a:bodyPr spcFirstLastPara="1" wrap="square" lIns="91425" tIns="91425" rIns="91425" bIns="91425" anchor="b" anchorCtr="0">
             <a:noAutofit/>
           </a:bodyPr>
           <a:lstStyle/>
           <a:p>
-            <a:pPr indent="0" lvl="0" marL="0" rtl="0" algn="ctr">
+            <a:pPr marL="0" lvl="0" indent="0" algn="ctr" rtl="0">
               <a:spcBef>
                 <a:spcPts val="0"/>
               </a:spcBef>
@@ -6892,12 +7060,12 @@
           </a:ln>
         </p:spPr>
         <p:txBody>
-          <a:bodyPr anchorCtr="0" anchor="t" bIns="91425" lIns="91425" spcFirstLastPara="1" rIns="91425" wrap="square" tIns="91425">
+          <a:bodyPr spcFirstLastPara="1" wrap="square" lIns="91425" tIns="91425" rIns="91425" bIns="91425" anchor="t" anchorCtr="0">
             <a:noAutofit/>
           </a:bodyPr>
           <a:lstStyle/>
           <a:p>
-            <a:pPr indent="-336550" lvl="0" marL="457200" rtl="0" algn="ctr">
+            <a:pPr marL="457200" lvl="0" indent="-336550" algn="ctr" rtl="0">
               <a:spcBef>
                 <a:spcPts val="0"/>
               </a:spcBef>
@@ -6944,11 +7112,11 @@
 </file>
 
 <file path=ppt/slides/slide2.xml><?xml version="1.0" encoding="utf-8"?>
-<p:sld xmlns:a="http://schemas.openxmlformats.org/drawingml/2006/main" xmlns:r="http://schemas.openxmlformats.org/officeDocument/2006/relationships" xmlns:mc="http://schemas.openxmlformats.org/markup-compatibility/2006" xmlns:mv="urn:schemas-microsoft-com:mac:vml" xmlns:p="http://schemas.openxmlformats.org/presentationml/2006/main" xmlns:c="http://schemas.openxmlformats.org/drawingml/2006/chart" xmlns:dgm="http://schemas.openxmlformats.org/drawingml/2006/diagram" xmlns:o="urn:schemas-microsoft-com:office:office" xmlns:v="urn:schemas-microsoft-com:vml" xmlns:pvml="urn:schemas-microsoft-com:office:powerpoint" xmlns:com="http://schemas.openxmlformats.org/drawingml/2006/compatibility" xmlns:p14="http://schemas.microsoft.com/office/powerpoint/2010/main" xmlns:p15="http://schemas.microsoft.com/office/powerpoint/2012/main" xmlns:ahyp="http://schemas.microsoft.com/office/drawing/2018/hyperlinkcolor">
+<p:sld xmlns:a="http://schemas.openxmlformats.org/drawingml/2006/main" xmlns:r="http://schemas.openxmlformats.org/officeDocument/2006/relationships" xmlns:p="http://schemas.openxmlformats.org/presentationml/2006/main">
   <p:cSld>
     <p:spTree>
       <p:nvGrpSpPr>
-        <p:cNvPr id="68" name="Shape 68"/>
+        <p:cNvPr id="1" name="Shape 68"/>
         <p:cNvGrpSpPr/>
         <p:nvPr/>
       </p:nvGrpSpPr>
@@ -6963,7 +7131,9 @@
       <p:sp>
         <p:nvSpPr>
           <p:cNvPr id="69" name="Google Shape;69;p14"/>
-          <p:cNvSpPr txBox="1"/>
+          <p:cNvSpPr txBox="1">
+            <a:spLocks noGrp="1"/>
+          </p:cNvSpPr>
           <p:nvPr>
             <p:ph type="title"/>
           </p:nvPr>
@@ -6978,12 +7148,12 @@
           </a:prstGeom>
         </p:spPr>
         <p:txBody>
-          <a:bodyPr anchorCtr="0" anchor="b" bIns="91425" lIns="91425" spcFirstLastPara="1" rIns="91425" wrap="square" tIns="91425">
+          <a:bodyPr spcFirstLastPara="1" wrap="square" lIns="91425" tIns="91425" rIns="91425" bIns="91425" anchor="b" anchorCtr="0">
             <a:noAutofit/>
           </a:bodyPr>
           <a:lstStyle/>
           <a:p>
-            <a:pPr indent="0" lvl="0" marL="0" rtl="0" algn="ctr">
+            <a:pPr marL="0" lvl="0" indent="0" algn="ctr" rtl="0">
               <a:spcBef>
                 <a:spcPts val="0"/>
               </a:spcBef>
@@ -7003,9 +7173,11 @@
       <p:sp>
         <p:nvSpPr>
           <p:cNvPr id="70" name="Google Shape;70;p14"/>
-          <p:cNvSpPr txBox="1"/>
+          <p:cNvSpPr txBox="1">
+            <a:spLocks noGrp="1"/>
+          </p:cNvSpPr>
           <p:nvPr>
-            <p:ph idx="1" type="body"/>
+            <p:ph type="body" idx="1"/>
           </p:nvPr>
         </p:nvSpPr>
         <p:spPr>
@@ -7016,23 +7188,23 @@
           <a:prstGeom prst="rect">
             <a:avLst/>
           </a:prstGeom>
-          <a:ln cap="flat" cmpd="sng" w="9525">
+          <a:ln w="9525" cap="flat" cmpd="sng">
             <a:solidFill>
               <a:srgbClr val="FFFFFF"/>
             </a:solidFill>
             <a:prstDash val="solid"/>
             <a:round/>
-            <a:headEnd len="sm" w="sm" type="none"/>
-            <a:tailEnd len="sm" w="sm" type="none"/>
+            <a:headEnd type="none" w="sm" len="sm"/>
+            <a:tailEnd type="none" w="sm" len="sm"/>
           </a:ln>
         </p:spPr>
         <p:txBody>
-          <a:bodyPr anchorCtr="0" anchor="t" bIns="91425" lIns="91425" spcFirstLastPara="1" rIns="91425" wrap="square" tIns="91425">
+          <a:bodyPr spcFirstLastPara="1" wrap="square" lIns="91425" tIns="91425" rIns="91425" bIns="91425" anchor="t" anchorCtr="0">
             <a:noAutofit/>
           </a:bodyPr>
           <a:lstStyle/>
           <a:p>
-            <a:pPr indent="0" lvl="0" marL="0" marR="0" rtl="0" algn="just">
+            <a:pPr marL="0" marR="0" lvl="0" indent="0" algn="just" rtl="0">
               <a:lnSpc>
                 <a:spcPct val="115000"/>
               </a:lnSpc>
@@ -7046,11 +7218,7 @@
             </a:pPr>
             <a:r>
               <a:rPr lang="en"/>
-              <a:t>It </a:t>
-            </a:r>
-            <a:r>
-              <a:rPr lang="en"/>
-              <a:t>gets two inputs, one is marked as incoming entry and the other one with opposite sign as output. This relates the model having external inputs i.e. model incorporates both the past values of the time series and current values as well.</a:t>
+              <a:t>It gets two inputs, one is marked as incoming entry and the other one with opposite sign as output. This relates the model having external inputs i.e. model incorporates both the past values of the time series and current values as well.</a:t>
             </a:r>
             <a:endParaRPr sz="1250">
               <a:solidFill>
@@ -7066,7 +7234,7 @@
             </a:endParaRPr>
           </a:p>
           <a:p>
-            <a:pPr indent="0" lvl="0" marL="0" marR="0" rtl="0" algn="just">
+            <a:pPr marL="0" marR="0" lvl="0" indent="0" algn="just" rtl="0">
               <a:lnSpc>
                 <a:spcPct val="115000"/>
               </a:lnSpc>
@@ -7085,7 +7253,7 @@
             <a:endParaRPr/>
           </a:p>
           <a:p>
-            <a:pPr indent="0" lvl="0" marL="0" marR="0" rtl="0" algn="ctr">
+            <a:pPr marL="0" marR="0" lvl="0" indent="0" algn="ctr" rtl="0">
               <a:lnSpc>
                 <a:spcPct val="115000"/>
               </a:lnSpc>
@@ -7112,7 +7280,7 @@
             </a:endParaRPr>
           </a:p>
           <a:p>
-            <a:pPr indent="0" lvl="0" marL="0" marR="0" rtl="0" algn="ctr">
+            <a:pPr marL="0" marR="0" lvl="0" indent="0" algn="ctr" rtl="0">
               <a:lnSpc>
                 <a:spcPct val="115000"/>
               </a:lnSpc>
@@ -7131,7 +7299,7 @@
             <a:endParaRPr sz="1400"/>
           </a:p>
           <a:p>
-            <a:pPr indent="0" lvl="0" marL="0" rtl="0" algn="l">
+            <a:pPr marL="0" lvl="0" indent="0" algn="l" rtl="0">
               <a:spcBef>
                 <a:spcPts val="1600"/>
               </a:spcBef>
@@ -7140,9 +7308,6 @@
               </a:spcAft>
               <a:buNone/>
             </a:pPr>
-            <a:r>
-              <a:t/>
-            </a:r>
             <a:endParaRPr/>
           </a:p>
         </p:txBody>
@@ -7156,11 +7321,11 @@
 </file>
 
 <file path=ppt/slides/slide3.xml><?xml version="1.0" encoding="utf-8"?>
-<p:sld xmlns:a="http://schemas.openxmlformats.org/drawingml/2006/main" xmlns:r="http://schemas.openxmlformats.org/officeDocument/2006/relationships" xmlns:mc="http://schemas.openxmlformats.org/markup-compatibility/2006" xmlns:mv="urn:schemas-microsoft-com:mac:vml" xmlns:p="http://schemas.openxmlformats.org/presentationml/2006/main" xmlns:c="http://schemas.openxmlformats.org/drawingml/2006/chart" xmlns:dgm="http://schemas.openxmlformats.org/drawingml/2006/diagram" xmlns:o="urn:schemas-microsoft-com:office:office" xmlns:v="urn:schemas-microsoft-com:vml" xmlns:pvml="urn:schemas-microsoft-com:office:powerpoint" xmlns:com="http://schemas.openxmlformats.org/drawingml/2006/compatibility" xmlns:p14="http://schemas.microsoft.com/office/powerpoint/2010/main" xmlns:p15="http://schemas.microsoft.com/office/powerpoint/2012/main" xmlns:ahyp="http://schemas.microsoft.com/office/drawing/2018/hyperlinkcolor">
+<p:sld xmlns:a="http://schemas.openxmlformats.org/drawingml/2006/main" xmlns:r="http://schemas.openxmlformats.org/officeDocument/2006/relationships" xmlns:p="http://schemas.openxmlformats.org/presentationml/2006/main">
   <p:cSld>
     <p:spTree>
       <p:nvGrpSpPr>
-        <p:cNvPr id="74" name="Shape 74"/>
+        <p:cNvPr id="1" name="Shape 74"/>
         <p:cNvGrpSpPr/>
         <p:nvPr/>
       </p:nvGrpSpPr>
@@ -7175,9 +7340,11 @@
       <p:sp>
         <p:nvSpPr>
           <p:cNvPr id="75" name="Google Shape;75;p15"/>
-          <p:cNvSpPr txBox="1"/>
+          <p:cNvSpPr txBox="1">
+            <a:spLocks noGrp="1"/>
+          </p:cNvSpPr>
           <p:nvPr>
-            <p:ph idx="4294967295" type="title"/>
+            <p:ph type="title" idx="4294967295"/>
           </p:nvPr>
         </p:nvSpPr>
         <p:spPr>
@@ -7190,12 +7357,12 @@
           </a:prstGeom>
         </p:spPr>
         <p:txBody>
-          <a:bodyPr anchorCtr="0" anchor="b" bIns="91425" lIns="91425" spcFirstLastPara="1" rIns="91425" wrap="square" tIns="91425">
+          <a:bodyPr spcFirstLastPara="1" wrap="square" lIns="91425" tIns="91425" rIns="91425" bIns="91425" anchor="b" anchorCtr="0">
             <a:noAutofit/>
           </a:bodyPr>
           <a:lstStyle/>
           <a:p>
-            <a:pPr indent="0" lvl="0" marL="0" rtl="0" algn="l">
+            <a:pPr marL="0" lvl="0" indent="0" algn="l" rtl="0">
               <a:spcBef>
                 <a:spcPts val="0"/>
               </a:spcBef>
@@ -7215,9 +7382,11 @@
       <p:sp>
         <p:nvSpPr>
           <p:cNvPr id="76" name="Google Shape;76;p15"/>
-          <p:cNvSpPr txBox="1"/>
+          <p:cNvSpPr txBox="1">
+            <a:spLocks noGrp="1"/>
+          </p:cNvSpPr>
           <p:nvPr>
-            <p:ph idx="4294967295" type="body"/>
+            <p:ph type="body" idx="4294967295"/>
           </p:nvPr>
         </p:nvSpPr>
         <p:spPr>
@@ -7230,12 +7399,12 @@
           </a:prstGeom>
         </p:spPr>
         <p:txBody>
-          <a:bodyPr anchorCtr="0" anchor="t" bIns="91425" lIns="91425" spcFirstLastPara="1" rIns="91425" wrap="square" tIns="91425">
+          <a:bodyPr spcFirstLastPara="1" wrap="square" lIns="91425" tIns="91425" rIns="91425" bIns="91425" anchor="t" anchorCtr="0">
             <a:noAutofit/>
           </a:bodyPr>
           <a:lstStyle/>
           <a:p>
-            <a:pPr indent="0" lvl="0" marL="0" rtl="0" algn="l">
+            <a:pPr marL="0" lvl="0" indent="0" algn="l" rtl="0">
               <a:spcBef>
                 <a:spcPts val="0"/>
               </a:spcBef>
@@ -7275,23 +7444,25 @@
             <a:avLst/>
           </a:prstGeom>
           <a:noFill/>
-          <a:ln cap="flat" cmpd="sng" w="9525">
+          <a:ln w="9525" cap="flat" cmpd="sng">
             <a:solidFill>
               <a:schemeClr val="lt2"/>
             </a:solidFill>
             <a:prstDash val="solid"/>
             <a:round/>
-            <a:headEnd len="sm" w="sm" type="none"/>
-            <a:tailEnd len="sm" w="sm" type="none"/>
+            <a:headEnd type="none" w="sm" len="sm"/>
+            <a:tailEnd type="none" w="sm" len="sm"/>
           </a:ln>
         </p:spPr>
       </p:cxnSp>
       <p:sp>
         <p:nvSpPr>
           <p:cNvPr id="78" name="Google Shape;78;p15"/>
-          <p:cNvSpPr txBox="1"/>
+          <p:cNvSpPr txBox="1">
+            <a:spLocks noGrp="1"/>
+          </p:cNvSpPr>
           <p:nvPr>
-            <p:ph idx="4294967295" type="body"/>
+            <p:ph type="body" idx="4294967295"/>
           </p:nvPr>
         </p:nvSpPr>
         <p:spPr>
@@ -7304,12 +7475,12 @@
           </a:prstGeom>
         </p:spPr>
         <p:txBody>
-          <a:bodyPr anchorCtr="0" anchor="t" bIns="91425" lIns="91425" spcFirstLastPara="1" rIns="91425" wrap="square" tIns="91425">
+          <a:bodyPr spcFirstLastPara="1" wrap="square" lIns="91425" tIns="91425" rIns="91425" bIns="91425" anchor="t" anchorCtr="0">
             <a:noAutofit/>
           </a:bodyPr>
           <a:lstStyle/>
           <a:p>
-            <a:pPr indent="0" lvl="0" marL="0" marR="0" rtl="0" algn="just">
+            <a:pPr marL="0" marR="0" lvl="0" indent="0" algn="just" rtl="0">
               <a:lnSpc>
                 <a:spcPct val="115000"/>
               </a:lnSpc>
@@ -7339,7 +7510,7 @@
             </a:endParaRPr>
           </a:p>
           <a:p>
-            <a:pPr indent="0" lvl="0" marL="0" rtl="0" algn="l">
+            <a:pPr marL="0" lvl="0" indent="0" algn="l" rtl="0">
               <a:spcBef>
                 <a:spcPts val="1600"/>
               </a:spcBef>
@@ -7348,9 +7519,6 @@
               </a:spcAft>
               <a:buNone/>
             </a:pPr>
-            <a:r>
-              <a:t/>
-            </a:r>
             <a:endParaRPr sz="1400"/>
           </a:p>
         </p:txBody>
@@ -7358,9 +7526,11 @@
       <p:sp>
         <p:nvSpPr>
           <p:cNvPr id="79" name="Google Shape;79;p15"/>
-          <p:cNvSpPr txBox="1"/>
+          <p:cNvSpPr txBox="1">
+            <a:spLocks noGrp="1"/>
+          </p:cNvSpPr>
           <p:nvPr>
-            <p:ph idx="4294967295" type="body"/>
+            <p:ph type="body" idx="4294967295"/>
           </p:nvPr>
         </p:nvSpPr>
         <p:spPr>
@@ -7373,12 +7543,12 @@
           </a:prstGeom>
         </p:spPr>
         <p:txBody>
-          <a:bodyPr anchorCtr="0" anchor="t" bIns="91425" lIns="91425" spcFirstLastPara="1" rIns="91425" wrap="square" tIns="91425">
+          <a:bodyPr spcFirstLastPara="1" wrap="square" lIns="91425" tIns="91425" rIns="91425" bIns="91425" anchor="t" anchorCtr="0">
             <a:noAutofit/>
           </a:bodyPr>
           <a:lstStyle/>
           <a:p>
-            <a:pPr indent="0" lvl="0" marL="0" rtl="0" algn="l">
+            <a:pPr marL="0" lvl="0" indent="0" algn="l" rtl="0">
               <a:spcBef>
                 <a:spcPts val="0"/>
               </a:spcBef>
@@ -7418,23 +7588,25 @@
             <a:avLst/>
           </a:prstGeom>
           <a:noFill/>
-          <a:ln cap="flat" cmpd="sng" w="9525">
+          <a:ln w="9525" cap="flat" cmpd="sng">
             <a:solidFill>
               <a:schemeClr val="lt2"/>
             </a:solidFill>
             <a:prstDash val="solid"/>
             <a:round/>
-            <a:headEnd len="sm" w="sm" type="none"/>
-            <a:tailEnd len="sm" w="sm" type="none"/>
+            <a:headEnd type="none" w="sm" len="sm"/>
+            <a:tailEnd type="none" w="sm" len="sm"/>
           </a:ln>
         </p:spPr>
       </p:cxnSp>
       <p:sp>
         <p:nvSpPr>
           <p:cNvPr id="81" name="Google Shape;81;p15"/>
-          <p:cNvSpPr txBox="1"/>
+          <p:cNvSpPr txBox="1">
+            <a:spLocks noGrp="1"/>
+          </p:cNvSpPr>
           <p:nvPr>
-            <p:ph idx="4294967295" type="body"/>
+            <p:ph type="body" idx="4294967295"/>
           </p:nvPr>
         </p:nvSpPr>
         <p:spPr>
@@ -7447,12 +7619,12 @@
           </a:prstGeom>
         </p:spPr>
         <p:txBody>
-          <a:bodyPr anchorCtr="0" anchor="t" bIns="91425" lIns="91425" spcFirstLastPara="1" rIns="91425" wrap="square" tIns="91425">
+          <a:bodyPr spcFirstLastPara="1" wrap="square" lIns="91425" tIns="91425" rIns="91425" bIns="91425" anchor="t" anchorCtr="0">
             <a:noAutofit/>
           </a:bodyPr>
           <a:lstStyle/>
           <a:p>
-            <a:pPr indent="0" lvl="0" marL="0" rtl="0" algn="l">
+            <a:pPr marL="0" lvl="0" indent="0" algn="l" rtl="0">
               <a:spcBef>
                 <a:spcPts val="0"/>
               </a:spcBef>
@@ -7463,7 +7635,15 @@
             </a:pPr>
             <a:r>
               <a:rPr lang="en" sz="1400"/>
-              <a:t>NARX worked efficiently in rainfall based flow prediction in advance of 24 hours on the basis of current rainfall rates with almost 99% accuracy.</a:t>
+              <a:t>NARX worked efficiently in rainfall based flow prediction in advance of 24 hours on the basis of current rainfall rates with almost </a:t>
+            </a:r>
+            <a:r>
+              <a:rPr lang="en" sz="1400" smtClean="0"/>
+              <a:t>90% </a:t>
+            </a:r>
+            <a:r>
+              <a:rPr lang="en" sz="1400"/>
+              <a:t>accuracy.</a:t>
             </a:r>
             <a:endParaRPr sz="1250">
               <a:solidFill>
@@ -7479,7 +7659,7 @@
             </a:endParaRPr>
           </a:p>
           <a:p>
-            <a:pPr indent="0" lvl="0" marL="0" rtl="0" algn="l">
+            <a:pPr marL="0" lvl="0" indent="0" algn="l" rtl="0">
               <a:spcBef>
                 <a:spcPts val="1600"/>
               </a:spcBef>
@@ -7488,9 +7668,6 @@
               </a:spcAft>
               <a:buNone/>
             </a:pPr>
-            <a:r>
-              <a:t/>
-            </a:r>
             <a:endParaRPr sz="1400"/>
           </a:p>
         </p:txBody>
@@ -7504,11 +7681,11 @@
 </file>
 
 <file path=ppt/slides/slide4.xml><?xml version="1.0" encoding="utf-8"?>
-<p:sld xmlns:a="http://schemas.openxmlformats.org/drawingml/2006/main" xmlns:r="http://schemas.openxmlformats.org/officeDocument/2006/relationships" xmlns:mc="http://schemas.openxmlformats.org/markup-compatibility/2006" xmlns:mv="urn:schemas-microsoft-com:mac:vml" xmlns:p="http://schemas.openxmlformats.org/presentationml/2006/main" xmlns:c="http://schemas.openxmlformats.org/drawingml/2006/chart" xmlns:dgm="http://schemas.openxmlformats.org/drawingml/2006/diagram" xmlns:o="urn:schemas-microsoft-com:office:office" xmlns:v="urn:schemas-microsoft-com:vml" xmlns:pvml="urn:schemas-microsoft-com:office:powerpoint" xmlns:com="http://schemas.openxmlformats.org/drawingml/2006/compatibility" xmlns:p14="http://schemas.microsoft.com/office/powerpoint/2010/main" xmlns:p15="http://schemas.microsoft.com/office/powerpoint/2012/main" xmlns:ahyp="http://schemas.microsoft.com/office/drawing/2018/hyperlinkcolor">
+<p:sld xmlns:a="http://schemas.openxmlformats.org/drawingml/2006/main" xmlns:r="http://schemas.openxmlformats.org/officeDocument/2006/relationships" xmlns:p="http://schemas.openxmlformats.org/presentationml/2006/main">
   <p:cSld>
     <p:spTree>
       <p:nvGrpSpPr>
-        <p:cNvPr id="85" name="Shape 85"/>
+        <p:cNvPr id="1" name="Shape 85"/>
         <p:cNvGrpSpPr/>
         <p:nvPr/>
       </p:nvGrpSpPr>
@@ -7523,7 +7700,9 @@
       <p:sp>
         <p:nvSpPr>
           <p:cNvPr id="86" name="Google Shape;86;p16"/>
-          <p:cNvSpPr txBox="1"/>
+          <p:cNvSpPr txBox="1">
+            <a:spLocks noGrp="1"/>
+          </p:cNvSpPr>
           <p:nvPr>
             <p:ph type="title"/>
           </p:nvPr>
@@ -7538,12 +7717,12 @@
           </a:prstGeom>
         </p:spPr>
         <p:txBody>
-          <a:bodyPr anchorCtr="0" anchor="b" bIns="91425" lIns="91425" spcFirstLastPara="1" rIns="91425" wrap="square" tIns="91425">
+          <a:bodyPr spcFirstLastPara="1" wrap="square" lIns="91425" tIns="91425" rIns="91425" bIns="91425" anchor="b" anchorCtr="0">
             <a:noAutofit/>
           </a:bodyPr>
           <a:lstStyle/>
           <a:p>
-            <a:pPr indent="0" lvl="0" marL="0" rtl="0" algn="ctr">
+            <a:pPr marL="0" lvl="0" indent="0" algn="ctr" rtl="0">
               <a:spcBef>
                 <a:spcPts val="0"/>
               </a:spcBef>
@@ -7563,9 +7742,11 @@
       <p:sp>
         <p:nvSpPr>
           <p:cNvPr id="87" name="Google Shape;87;p16"/>
-          <p:cNvSpPr txBox="1"/>
+          <p:cNvSpPr txBox="1">
+            <a:spLocks noGrp="1"/>
+          </p:cNvSpPr>
           <p:nvPr>
-            <p:ph idx="1" type="body"/>
+            <p:ph type="body" idx="1"/>
           </p:nvPr>
         </p:nvSpPr>
         <p:spPr>
@@ -7576,23 +7757,23 @@
           <a:prstGeom prst="rect">
             <a:avLst/>
           </a:prstGeom>
-          <a:ln cap="flat" cmpd="sng" w="9525">
+          <a:ln w="9525" cap="flat" cmpd="sng">
             <a:solidFill>
               <a:srgbClr val="FFFFFF"/>
             </a:solidFill>
             <a:prstDash val="solid"/>
             <a:round/>
-            <a:headEnd len="sm" w="sm" type="none"/>
-            <a:tailEnd len="sm" w="sm" type="none"/>
+            <a:headEnd type="none" w="sm" len="sm"/>
+            <a:tailEnd type="none" w="sm" len="sm"/>
           </a:ln>
         </p:spPr>
         <p:txBody>
-          <a:bodyPr anchorCtr="0" anchor="t" bIns="91425" lIns="91425" spcFirstLastPara="1" rIns="91425" wrap="square" tIns="91425">
+          <a:bodyPr spcFirstLastPara="1" wrap="square" lIns="91425" tIns="91425" rIns="91425" bIns="91425" anchor="t" anchorCtr="0">
             <a:noAutofit/>
           </a:bodyPr>
           <a:lstStyle/>
           <a:p>
-            <a:pPr indent="0" lvl="0" marL="0" marR="0" rtl="0" algn="just">
+            <a:pPr marL="0" marR="0" lvl="0" indent="0" algn="just" rtl="0">
               <a:lnSpc>
                 <a:spcPct val="115000"/>
               </a:lnSpc>
@@ -7622,7 +7803,7 @@
             </a:endParaRPr>
           </a:p>
           <a:p>
-            <a:pPr indent="0" lvl="0" marL="0" marR="0" rtl="0" algn="just">
+            <a:pPr marL="0" marR="0" lvl="0" indent="0" algn="just" rtl="0">
               <a:lnSpc>
                 <a:spcPct val="115000"/>
               </a:lnSpc>
@@ -7641,7 +7822,7 @@
             <a:endParaRPr/>
           </a:p>
           <a:p>
-            <a:pPr indent="0" lvl="0" marL="0" marR="0" rtl="0" algn="ctr">
+            <a:pPr marL="0" marR="0" lvl="0" indent="0" algn="ctr" rtl="0">
               <a:lnSpc>
                 <a:spcPct val="115000"/>
               </a:lnSpc>
@@ -7662,7 +7843,7 @@
               <a:t>β</a:t>
             </a:r>
             <a:r>
-              <a:rPr baseline="-25000" lang="en" sz="2000">
+              <a:rPr lang="en" sz="2000" baseline="-25000">
                 <a:solidFill>
                   <a:srgbClr val="FF9900"/>
                 </a:solidFill>
@@ -7678,7 +7859,7 @@
               <a:t> + (β</a:t>
             </a:r>
             <a:r>
-              <a:rPr baseline="-25000" lang="en" sz="2000">
+              <a:rPr lang="en" sz="2000" baseline="-25000">
                 <a:solidFill>
                   <a:srgbClr val="FF9900"/>
                 </a:solidFill>
@@ -7694,7 +7875,7 @@
               <a:t> * X</a:t>
             </a:r>
             <a:r>
-              <a:rPr baseline="-25000" lang="en" sz="2000">
+              <a:rPr lang="en" sz="2000" baseline="-25000">
                 <a:solidFill>
                   <a:srgbClr val="FF9900"/>
                 </a:solidFill>
@@ -7710,7 +7891,7 @@
               <a:t>) + (β</a:t>
             </a:r>
             <a:r>
-              <a:rPr baseline="-25000" lang="en" sz="2000">
+              <a:rPr lang="en" sz="2000" baseline="-25000">
                 <a:solidFill>
                   <a:srgbClr val="FF9900"/>
                 </a:solidFill>
@@ -7726,7 +7907,7 @@
               <a:t> * X</a:t>
             </a:r>
             <a:r>
-              <a:rPr baseline="-25000" lang="en" sz="2000">
+              <a:rPr lang="en" sz="2000" baseline="-25000">
                 <a:solidFill>
                   <a:srgbClr val="FF9900"/>
                 </a:solidFill>
@@ -7748,7 +7929,7 @@
             </a:endParaRPr>
           </a:p>
           <a:p>
-            <a:pPr indent="0" lvl="0" marL="0" marR="0" rtl="0" algn="ctr">
+            <a:pPr marL="0" marR="0" lvl="0" indent="0" algn="ctr" rtl="0">
               <a:lnSpc>
                 <a:spcPct val="115000"/>
               </a:lnSpc>
@@ -7762,14 +7943,10 @@
             </a:pPr>
             <a:r>
               <a:rPr lang="en" sz="1400"/>
-              <a:t>where</a:t>
+              <a:t>where β</a:t>
             </a:r>
             <a:r>
-              <a:rPr lang="en" sz="1400"/>
-              <a:t> β</a:t>
-            </a:r>
-            <a:r>
-              <a:rPr baseline="-25000" lang="en" sz="1400"/>
+              <a:rPr lang="en" sz="1400" baseline="-25000"/>
               <a:t>0</a:t>
             </a:r>
             <a:r>
@@ -7777,7 +7954,7 @@
               <a:t> is the point of intersection in the slope, β</a:t>
             </a:r>
             <a:r>
-              <a:rPr baseline="-25000" lang="en" sz="1400"/>
+              <a:rPr lang="en" sz="1400" baseline="-25000"/>
               <a:t>1</a:t>
             </a:r>
             <a:r>
@@ -7785,7 +7962,7 @@
               <a:t> and β</a:t>
             </a:r>
             <a:r>
-              <a:rPr baseline="-25000" lang="en" sz="1400"/>
+              <a:rPr lang="en" sz="1400" baseline="-25000"/>
               <a:t>2</a:t>
             </a:r>
             <a:r>
@@ -7793,7 +7970,7 @@
               <a:t> represent the slope of the hyperplane and X</a:t>
             </a:r>
             <a:r>
-              <a:rPr baseline="-25000" lang="en" sz="1400"/>
+              <a:rPr lang="en" sz="1400" baseline="-25000"/>
               <a:t>1</a:t>
             </a:r>
             <a:r>
@@ -7801,7 +7978,7 @@
               <a:t> &amp; X</a:t>
             </a:r>
             <a:r>
-              <a:rPr baseline="-25000" lang="en" sz="1400"/>
+              <a:rPr lang="en" sz="1400" baseline="-25000"/>
               <a:t>2</a:t>
             </a:r>
             <a:r>
@@ -7811,7 +7988,7 @@
             <a:endParaRPr sz="1400"/>
           </a:p>
           <a:p>
-            <a:pPr indent="0" lvl="0" marL="0" rtl="0" algn="l">
+            <a:pPr marL="0" lvl="0" indent="0" algn="l" rtl="0">
               <a:spcBef>
                 <a:spcPts val="1600"/>
               </a:spcBef>
@@ -7820,9 +7997,6 @@
               </a:spcAft>
               <a:buNone/>
             </a:pPr>
-            <a:r>
-              <a:t/>
-            </a:r>
             <a:endParaRPr/>
           </a:p>
         </p:txBody>
@@ -7836,11 +8010,11 @@
 </file>
 
 <file path=ppt/slides/slide5.xml><?xml version="1.0" encoding="utf-8"?>
-<p:sld xmlns:a="http://schemas.openxmlformats.org/drawingml/2006/main" xmlns:r="http://schemas.openxmlformats.org/officeDocument/2006/relationships" xmlns:mc="http://schemas.openxmlformats.org/markup-compatibility/2006" xmlns:mv="urn:schemas-microsoft-com:mac:vml" xmlns:p="http://schemas.openxmlformats.org/presentationml/2006/main" xmlns:c="http://schemas.openxmlformats.org/drawingml/2006/chart" xmlns:dgm="http://schemas.openxmlformats.org/drawingml/2006/diagram" xmlns:o="urn:schemas-microsoft-com:office:office" xmlns:v="urn:schemas-microsoft-com:vml" xmlns:pvml="urn:schemas-microsoft-com:office:powerpoint" xmlns:com="http://schemas.openxmlformats.org/drawingml/2006/compatibility" xmlns:p14="http://schemas.microsoft.com/office/powerpoint/2010/main" xmlns:p15="http://schemas.microsoft.com/office/powerpoint/2012/main" xmlns:ahyp="http://schemas.microsoft.com/office/drawing/2018/hyperlinkcolor">
+<p:sld xmlns:a="http://schemas.openxmlformats.org/drawingml/2006/main" xmlns:r="http://schemas.openxmlformats.org/officeDocument/2006/relationships" xmlns:p="http://schemas.openxmlformats.org/presentationml/2006/main">
   <p:cSld>
     <p:spTree>
       <p:nvGrpSpPr>
-        <p:cNvPr id="91" name="Shape 91"/>
+        <p:cNvPr id="1" name="Shape 91"/>
         <p:cNvGrpSpPr/>
         <p:nvPr/>
       </p:nvGrpSpPr>
@@ -7855,9 +8029,11 @@
       <p:sp>
         <p:nvSpPr>
           <p:cNvPr id="92" name="Google Shape;92;p17"/>
-          <p:cNvSpPr txBox="1"/>
+          <p:cNvSpPr txBox="1">
+            <a:spLocks noGrp="1"/>
+          </p:cNvSpPr>
           <p:nvPr>
-            <p:ph idx="2" type="body"/>
+            <p:ph type="body" idx="2"/>
           </p:nvPr>
         </p:nvSpPr>
         <p:spPr>
@@ -7870,12 +8046,12 @@
           </a:prstGeom>
         </p:spPr>
         <p:txBody>
-          <a:bodyPr anchorCtr="0" anchor="ctr" bIns="91425" lIns="91425" spcFirstLastPara="1" rIns="91425" wrap="square" tIns="91425">
+          <a:bodyPr spcFirstLastPara="1" wrap="square" lIns="91425" tIns="91425" rIns="91425" bIns="91425" anchor="ctr" anchorCtr="0">
             <a:noAutofit/>
           </a:bodyPr>
           <a:lstStyle/>
           <a:p>
-            <a:pPr indent="-330200" lvl="0" marL="457200" rtl="0" algn="just">
+            <a:pPr marL="457200" lvl="0" indent="-330200" algn="just" rtl="0">
               <a:spcBef>
                 <a:spcPts val="0"/>
               </a:spcBef>
@@ -7892,7 +8068,7 @@
             <a:endParaRPr sz="1600"/>
           </a:p>
           <a:p>
-            <a:pPr indent="-330200" lvl="0" marL="457200" rtl="0" algn="just">
+            <a:pPr marL="457200" lvl="0" indent="-330200" algn="just" rtl="0">
               <a:spcBef>
                 <a:spcPts val="0"/>
               </a:spcBef>
@@ -7909,7 +8085,7 @@
             <a:endParaRPr sz="1600"/>
           </a:p>
           <a:p>
-            <a:pPr indent="0" lvl="0" marL="0" rtl="0" algn="l">
+            <a:pPr marL="0" lvl="0" indent="0" algn="l" rtl="0">
               <a:spcBef>
                 <a:spcPts val="1600"/>
               </a:spcBef>
@@ -7918,13 +8094,10 @@
               </a:spcAft>
               <a:buNone/>
             </a:pPr>
-            <a:r>
-              <a:t/>
-            </a:r>
             <a:endParaRPr sz="1600"/>
           </a:p>
           <a:p>
-            <a:pPr indent="0" lvl="0" marL="0" rtl="0" algn="l">
+            <a:pPr marL="0" lvl="0" indent="0" algn="l" rtl="0">
               <a:spcBef>
                 <a:spcPts val="1600"/>
               </a:spcBef>
@@ -7933,9 +8106,6 @@
               </a:spcAft>
               <a:buNone/>
             </a:pPr>
-            <a:r>
-              <a:t/>
-            </a:r>
             <a:endParaRPr sz="1600"/>
           </a:p>
         </p:txBody>
@@ -7943,7 +8113,9 @@
       <p:sp>
         <p:nvSpPr>
           <p:cNvPr id="93" name="Google Shape;93;p17"/>
-          <p:cNvSpPr txBox="1"/>
+          <p:cNvSpPr txBox="1">
+            <a:spLocks noGrp="1"/>
+          </p:cNvSpPr>
           <p:nvPr>
             <p:ph type="title"/>
           </p:nvPr>
@@ -7958,12 +8130,12 @@
           </a:prstGeom>
         </p:spPr>
         <p:txBody>
-          <a:bodyPr anchorCtr="0" anchor="ctr" bIns="91425" lIns="91425" spcFirstLastPara="1" rIns="91425" wrap="square" tIns="91425">
+          <a:bodyPr spcFirstLastPara="1" wrap="square" lIns="91425" tIns="91425" rIns="91425" bIns="91425" anchor="ctr" anchorCtr="0">
             <a:noAutofit/>
           </a:bodyPr>
           <a:lstStyle/>
           <a:p>
-            <a:pPr indent="0" lvl="0" marL="0" rtl="0" algn="ctr">
+            <a:pPr marL="0" lvl="0" indent="0" algn="ctr" rtl="0">
               <a:spcBef>
                 <a:spcPts val="0"/>
               </a:spcBef>
@@ -7989,11 +8161,11 @@
 </file>
 
 <file path=ppt/slides/slide6.xml><?xml version="1.0" encoding="utf-8"?>
-<p:sld xmlns:a="http://schemas.openxmlformats.org/drawingml/2006/main" xmlns:r="http://schemas.openxmlformats.org/officeDocument/2006/relationships" xmlns:mc="http://schemas.openxmlformats.org/markup-compatibility/2006" xmlns:mv="urn:schemas-microsoft-com:mac:vml" xmlns:p="http://schemas.openxmlformats.org/presentationml/2006/main" xmlns:c="http://schemas.openxmlformats.org/drawingml/2006/chart" xmlns:dgm="http://schemas.openxmlformats.org/drawingml/2006/diagram" xmlns:o="urn:schemas-microsoft-com:office:office" xmlns:v="urn:schemas-microsoft-com:vml" xmlns:pvml="urn:schemas-microsoft-com:office:powerpoint" xmlns:com="http://schemas.openxmlformats.org/drawingml/2006/compatibility" xmlns:p14="http://schemas.microsoft.com/office/powerpoint/2010/main" xmlns:p15="http://schemas.microsoft.com/office/powerpoint/2012/main" xmlns:ahyp="http://schemas.microsoft.com/office/drawing/2018/hyperlinkcolor">
+<p:sld xmlns:a="http://schemas.openxmlformats.org/drawingml/2006/main" xmlns:r="http://schemas.openxmlformats.org/officeDocument/2006/relationships" xmlns:p="http://schemas.openxmlformats.org/presentationml/2006/main">
   <p:cSld>
     <p:spTree>
       <p:nvGrpSpPr>
-        <p:cNvPr id="97" name="Shape 97"/>
+        <p:cNvPr id="1" name="Shape 97"/>
         <p:cNvGrpSpPr/>
         <p:nvPr/>
       </p:nvGrpSpPr>
@@ -8008,9 +8180,11 @@
       <p:sp>
         <p:nvSpPr>
           <p:cNvPr id="98" name="Google Shape;98;p18"/>
-          <p:cNvSpPr txBox="1"/>
+          <p:cNvSpPr txBox="1">
+            <a:spLocks noGrp="1"/>
+          </p:cNvSpPr>
           <p:nvPr>
-            <p:ph idx="2" type="body"/>
+            <p:ph type="body" idx="2"/>
           </p:nvPr>
         </p:nvSpPr>
         <p:spPr>
@@ -8023,12 +8197,12 @@
           </a:prstGeom>
         </p:spPr>
         <p:txBody>
-          <a:bodyPr anchorCtr="0" anchor="ctr" bIns="91425" lIns="91425" spcFirstLastPara="1" rIns="91425" wrap="square" tIns="91425">
+          <a:bodyPr spcFirstLastPara="1" wrap="square" lIns="91425" tIns="91425" rIns="91425" bIns="91425" anchor="ctr" anchorCtr="0">
             <a:noAutofit/>
           </a:bodyPr>
           <a:lstStyle/>
           <a:p>
-            <a:pPr indent="0" lvl="0" marL="0" rtl="0" algn="l">
+            <a:pPr marL="0" lvl="0" indent="0" algn="l" rtl="0">
               <a:spcBef>
                 <a:spcPts val="0"/>
               </a:spcBef>
@@ -8037,13 +8211,10 @@
               </a:spcAft>
               <a:buNone/>
             </a:pPr>
-            <a:r>
-              <a:t/>
-            </a:r>
             <a:endParaRPr sz="1600"/>
           </a:p>
           <a:p>
-            <a:pPr indent="-330200" lvl="0" marL="457200" rtl="0" algn="just">
+            <a:pPr marL="457200" lvl="0" indent="-330200" algn="just" rtl="0">
               <a:spcBef>
                 <a:spcPts val="1600"/>
               </a:spcBef>
@@ -8060,7 +8231,7 @@
             <a:endParaRPr sz="1600"/>
           </a:p>
           <a:p>
-            <a:pPr indent="-330200" lvl="0" marL="457200" rtl="0" algn="just">
+            <a:pPr marL="457200" lvl="0" indent="-330200" algn="just" rtl="0">
               <a:spcBef>
                 <a:spcPts val="0"/>
               </a:spcBef>
@@ -8081,7 +8252,9 @@
       <p:sp>
         <p:nvSpPr>
           <p:cNvPr id="99" name="Google Shape;99;p18"/>
-          <p:cNvSpPr txBox="1"/>
+          <p:cNvSpPr txBox="1">
+            <a:spLocks noGrp="1"/>
+          </p:cNvSpPr>
           <p:nvPr>
             <p:ph type="title"/>
           </p:nvPr>
@@ -8096,12 +8269,12 @@
           </a:prstGeom>
         </p:spPr>
         <p:txBody>
-          <a:bodyPr anchorCtr="0" anchor="ctr" bIns="91425" lIns="91425" spcFirstLastPara="1" rIns="91425" wrap="square" tIns="91425">
+          <a:bodyPr spcFirstLastPara="1" wrap="square" lIns="91425" tIns="91425" rIns="91425" bIns="91425" anchor="ctr" anchorCtr="0">
             <a:noAutofit/>
           </a:bodyPr>
           <a:lstStyle/>
           <a:p>
-            <a:pPr indent="0" lvl="0" marL="0" rtl="0" algn="ctr">
+            <a:pPr marL="0" lvl="0" indent="0" algn="ctr" rtl="0">
               <a:spcBef>
                 <a:spcPts val="0"/>
               </a:spcBef>
@@ -8127,11 +8300,11 @@
 </file>
 
 <file path=ppt/slides/slide7.xml><?xml version="1.0" encoding="utf-8"?>
-<p:sld xmlns:a="http://schemas.openxmlformats.org/drawingml/2006/main" xmlns:r="http://schemas.openxmlformats.org/officeDocument/2006/relationships" xmlns:mc="http://schemas.openxmlformats.org/markup-compatibility/2006" xmlns:mv="urn:schemas-microsoft-com:mac:vml" xmlns:p="http://schemas.openxmlformats.org/presentationml/2006/main" xmlns:c="http://schemas.openxmlformats.org/drawingml/2006/chart" xmlns:dgm="http://schemas.openxmlformats.org/drawingml/2006/diagram" xmlns:o="urn:schemas-microsoft-com:office:office" xmlns:v="urn:schemas-microsoft-com:vml" xmlns:pvml="urn:schemas-microsoft-com:office:powerpoint" xmlns:com="http://schemas.openxmlformats.org/drawingml/2006/compatibility" xmlns:p14="http://schemas.microsoft.com/office/powerpoint/2010/main" xmlns:p15="http://schemas.microsoft.com/office/powerpoint/2012/main" xmlns:ahyp="http://schemas.microsoft.com/office/drawing/2018/hyperlinkcolor">
+<p:sld xmlns:a="http://schemas.openxmlformats.org/drawingml/2006/main" xmlns:r="http://schemas.openxmlformats.org/officeDocument/2006/relationships" xmlns:p="http://schemas.openxmlformats.org/presentationml/2006/main">
   <p:cSld>
     <p:spTree>
       <p:nvGrpSpPr>
-        <p:cNvPr id="103" name="Shape 103"/>
+        <p:cNvPr id="1" name="Shape 103"/>
         <p:cNvGrpSpPr/>
         <p:nvPr/>
       </p:nvGrpSpPr>
@@ -8146,7 +8319,9 @@
       <p:sp>
         <p:nvSpPr>
           <p:cNvPr id="104" name="Google Shape;104;p19"/>
-          <p:cNvSpPr txBox="1"/>
+          <p:cNvSpPr txBox="1">
+            <a:spLocks noGrp="1"/>
+          </p:cNvSpPr>
           <p:nvPr>
             <p:ph type="title"/>
           </p:nvPr>
@@ -8161,12 +8336,12 @@
           </a:prstGeom>
         </p:spPr>
         <p:txBody>
-          <a:bodyPr anchorCtr="0" anchor="b" bIns="91425" lIns="91425" spcFirstLastPara="1" rIns="91425" wrap="square" tIns="91425">
+          <a:bodyPr spcFirstLastPara="1" wrap="square" lIns="91425" tIns="91425" rIns="91425" bIns="91425" anchor="b" anchorCtr="0">
             <a:noAutofit/>
           </a:bodyPr>
           <a:lstStyle/>
           <a:p>
-            <a:pPr indent="0" lvl="0" marL="0" rtl="0" algn="ctr">
+            <a:pPr marL="0" lvl="0" indent="0" algn="ctr" rtl="0">
               <a:spcBef>
                 <a:spcPts val="0"/>
               </a:spcBef>
@@ -8186,9 +8361,11 @@
       <p:sp>
         <p:nvSpPr>
           <p:cNvPr id="105" name="Google Shape;105;p19"/>
-          <p:cNvSpPr txBox="1"/>
+          <p:cNvSpPr txBox="1">
+            <a:spLocks noGrp="1"/>
+          </p:cNvSpPr>
           <p:nvPr>
-            <p:ph idx="1" type="body"/>
+            <p:ph type="body" idx="1"/>
           </p:nvPr>
         </p:nvSpPr>
         <p:spPr>
@@ -8199,23 +8376,23 @@
           <a:prstGeom prst="rect">
             <a:avLst/>
           </a:prstGeom>
-          <a:ln cap="flat" cmpd="sng" w="9525">
+          <a:ln w="9525" cap="flat" cmpd="sng">
             <a:solidFill>
               <a:srgbClr val="FFFFFF"/>
             </a:solidFill>
             <a:prstDash val="solid"/>
             <a:round/>
-            <a:headEnd len="sm" w="sm" type="none"/>
-            <a:tailEnd len="sm" w="sm" type="none"/>
+            <a:headEnd type="none" w="sm" len="sm"/>
+            <a:tailEnd type="none" w="sm" len="sm"/>
           </a:ln>
         </p:spPr>
         <p:txBody>
-          <a:bodyPr anchorCtr="0" anchor="t" bIns="91425" lIns="91425" spcFirstLastPara="1" rIns="91425" wrap="square" tIns="91425">
+          <a:bodyPr spcFirstLastPara="1" wrap="square" lIns="91425" tIns="91425" rIns="91425" bIns="91425" anchor="t" anchorCtr="0">
             <a:noAutofit/>
           </a:bodyPr>
           <a:lstStyle/>
           <a:p>
-            <a:pPr indent="0" lvl="0" marL="0" rtl="0" algn="ctr">
+            <a:pPr marL="0" lvl="0" indent="0" algn="ctr" rtl="0">
               <a:spcBef>
                 <a:spcPts val="0"/>
               </a:spcBef>
@@ -8226,11 +8403,7 @@
             </a:pPr>
             <a:r>
               <a:rPr lang="en"/>
-              <a:t>F</a:t>
-            </a:r>
-            <a:r>
-              <a:rPr lang="en"/>
-              <a:t>lood forecasting and the techniques targeted were the SVM and NARX. NARX is a type of neural network and is widely used in terms of time series prediction. Based on the comparison, literature review and synthesis, it is concluded that use of statistical methods with NARX can provide highly accurate and promising results for flood forecast. This study was quite helpful in elaborating the mechanism of those proposed techniques and their comparison with each other so that onecan get to know which method is better and how.</a:t>
+              <a:t>Flood forecasting and the techniques targeted were the SVM and NARX. NARX is a type of neural network and is widely used in terms of time series prediction. Based on the comparison, literature review and synthesis, it is concluded that use of statistical methods with NARX can provide highly accurate and promising results for flood forecast. This study was quite helpful in elaborating the mechanism of those proposed techniques and their comparison with each other so that onecan get to know which method is better and how.</a:t>
             </a:r>
             <a:endParaRPr/>
           </a:p>
@@ -8245,11 +8418,11 @@
 </file>
 
 <file path=ppt/slides/slide8.xml><?xml version="1.0" encoding="utf-8"?>
-<p:sld xmlns:a="http://schemas.openxmlformats.org/drawingml/2006/main" xmlns:r="http://schemas.openxmlformats.org/officeDocument/2006/relationships" xmlns:mc="http://schemas.openxmlformats.org/markup-compatibility/2006" xmlns:mv="urn:schemas-microsoft-com:mac:vml" xmlns:p="http://schemas.openxmlformats.org/presentationml/2006/main" xmlns:c="http://schemas.openxmlformats.org/drawingml/2006/chart" xmlns:dgm="http://schemas.openxmlformats.org/drawingml/2006/diagram" xmlns:o="urn:schemas-microsoft-com:office:office" xmlns:v="urn:schemas-microsoft-com:vml" xmlns:pvml="urn:schemas-microsoft-com:office:powerpoint" xmlns:com="http://schemas.openxmlformats.org/drawingml/2006/compatibility" xmlns:p14="http://schemas.microsoft.com/office/powerpoint/2010/main" xmlns:p15="http://schemas.microsoft.com/office/powerpoint/2012/main" xmlns:ahyp="http://schemas.microsoft.com/office/drawing/2018/hyperlinkcolor">
+<p:sld xmlns:a="http://schemas.openxmlformats.org/drawingml/2006/main" xmlns:r="http://schemas.openxmlformats.org/officeDocument/2006/relationships" xmlns:p="http://schemas.openxmlformats.org/presentationml/2006/main">
   <p:cSld>
     <p:spTree>
       <p:nvGrpSpPr>
-        <p:cNvPr id="109" name="Shape 109"/>
+        <p:cNvPr id="1" name="Shape 109"/>
         <p:cNvGrpSpPr/>
         <p:nvPr/>
       </p:nvGrpSpPr>
@@ -8264,9 +8437,11 @@
       <p:sp>
         <p:nvSpPr>
           <p:cNvPr id="110" name="Google Shape;110;p20"/>
-          <p:cNvSpPr txBox="1"/>
+          <p:cNvSpPr txBox="1">
+            <a:spLocks noGrp="1"/>
+          </p:cNvSpPr>
           <p:nvPr>
-            <p:ph idx="2" type="body"/>
+            <p:ph type="body" idx="2"/>
           </p:nvPr>
         </p:nvSpPr>
         <p:spPr>
@@ -8279,12 +8454,12 @@
           </a:prstGeom>
         </p:spPr>
         <p:txBody>
-          <a:bodyPr anchorCtr="0" anchor="ctr" bIns="91425" lIns="91425" spcFirstLastPara="1" rIns="91425" wrap="square" tIns="91425">
+          <a:bodyPr spcFirstLastPara="1" wrap="square" lIns="91425" tIns="91425" rIns="91425" bIns="91425" anchor="ctr" anchorCtr="0">
             <a:noAutofit/>
           </a:bodyPr>
           <a:lstStyle/>
           <a:p>
-            <a:pPr indent="0" lvl="0" marL="0" rtl="0" algn="l">
+            <a:pPr marL="0" lvl="0" indent="0" algn="l" rtl="0">
               <a:lnSpc>
                 <a:spcPct val="100000"/>
               </a:lnSpc>
@@ -8313,7 +8488,7 @@
             </a:endParaRPr>
           </a:p>
           <a:p>
-            <a:pPr indent="0" lvl="0" marL="0" rtl="0" algn="l">
+            <a:pPr marL="0" lvl="0" indent="0" algn="l" rtl="0">
               <a:lnSpc>
                 <a:spcPct val="100000"/>
               </a:lnSpc>
@@ -8325,9 +8500,6 @@
               </a:spcAft>
               <a:buNone/>
             </a:pPr>
-            <a:r>
-              <a:t/>
-            </a:r>
             <a:endParaRPr sz="1600">
               <a:latin typeface="Roboto Slab"/>
               <a:ea typeface="Roboto Slab"/>
@@ -8336,7 +8508,7 @@
             </a:endParaRPr>
           </a:p>
           <a:p>
-            <a:pPr indent="-317500" lvl="0" marL="457200" rtl="0" algn="l">
+            <a:pPr marL="457200" lvl="0" indent="-317500" algn="l" rtl="0">
               <a:lnSpc>
                 <a:spcPct val="100000"/>
               </a:lnSpc>
@@ -8371,7 +8543,9 @@
       <p:sp>
         <p:nvSpPr>
           <p:cNvPr id="111" name="Google Shape;111;p20"/>
-          <p:cNvSpPr txBox="1"/>
+          <p:cNvSpPr txBox="1">
+            <a:spLocks noGrp="1"/>
+          </p:cNvSpPr>
           <p:nvPr>
             <p:ph type="title"/>
           </p:nvPr>
@@ -8386,12 +8560,12 @@
           </a:prstGeom>
         </p:spPr>
         <p:txBody>
-          <a:bodyPr anchorCtr="0" anchor="ctr" bIns="91425" lIns="91425" spcFirstLastPara="1" rIns="91425" wrap="square" tIns="91425">
+          <a:bodyPr spcFirstLastPara="1" wrap="square" lIns="91425" tIns="91425" rIns="91425" bIns="91425" anchor="ctr" anchorCtr="0">
             <a:noAutofit/>
           </a:bodyPr>
           <a:lstStyle/>
           <a:p>
-            <a:pPr indent="0" lvl="0" marL="0" rtl="0" algn="ctr">
+            <a:pPr marL="0" lvl="0" indent="0" algn="ctr" rtl="0">
               <a:spcBef>
                 <a:spcPts val="0"/>
               </a:spcBef>
@@ -8417,7 +8591,7 @@
 </file>
 
 <file path=ppt/theme/theme1.xml><?xml version="1.0" encoding="utf-8"?>
-<a:theme xmlns:a="http://schemas.openxmlformats.org/drawingml/2006/main" xmlns:r="http://schemas.openxmlformats.org/officeDocument/2006/relationships" name="Marina">
+<a:theme xmlns:a="http://schemas.openxmlformats.org/drawingml/2006/main" name="Marina">
   <a:themeElements>
     <a:clrScheme name="Marina">
       <a:dk1>
@@ -8692,11 +8866,13 @@
       </a:bgFillStyleLst>
     </a:fmtScheme>
   </a:themeElements>
+  <a:objectDefaults/>
+  <a:extraClrSchemeLst/>
 </a:theme>
 </file>
 
 <file path=ppt/theme/theme2.xml><?xml version="1.0" encoding="utf-8"?>
-<a:theme xmlns:a="http://schemas.openxmlformats.org/drawingml/2006/main" xmlns:r="http://schemas.openxmlformats.org/officeDocument/2006/relationships">
+<a:theme xmlns:a="http://schemas.openxmlformats.org/drawingml/2006/main">
   <a:themeElements>
     <a:clrScheme name="Default">
       <a:dk1>
@@ -8971,5 +9147,7 @@
       </a:bgFillStyleLst>
     </a:fmtScheme>
   </a:themeElements>
+  <a:objectDefaults/>
+  <a:extraClrSchemeLst/>
 </a:theme>
 </file>
</xml_diff>